<commit_message>
Update remote user use case table. Flip questions and demo on last slide.
</commit_message>
<xml_diff>
--- a/Test Framework Final Presentation.pptx
+++ b/Test Framework Final Presentation.pptx
@@ -6147,7 +6147,7 @@
           <p:cNvPr id="2" name="Title 1">
             <a:extLst>
               <a:ext uri="{FF2B5EF4-FFF2-40B4-BE49-F238E27FC236}">
-                <a16:creationId xmlns:a16="http://schemas.microsoft.com/office/drawing/2014/main" xmlns="" id="{3016A5BA-F72A-4CD9-AF4C-68ADAC202004}"/>
+                <a16:creationId xmlns:a16="http://schemas.microsoft.com/office/drawing/2014/main" id="{3016A5BA-F72A-4CD9-AF4C-68ADAC202004}"/>
               </a:ext>
             </a:extLst>
           </p:cNvPr>
@@ -6175,7 +6175,7 @@
           <p:cNvPr id="3" name="Content Placeholder 2">
             <a:extLst>
               <a:ext uri="{FF2B5EF4-FFF2-40B4-BE49-F238E27FC236}">
-                <a16:creationId xmlns:a16="http://schemas.microsoft.com/office/drawing/2014/main" xmlns="" id="{BAC61804-0702-4E9C-9632-1F546949E17F}"/>
+                <a16:creationId xmlns:a16="http://schemas.microsoft.com/office/drawing/2014/main" id="{BAC61804-0702-4E9C-9632-1F546949E17F}"/>
               </a:ext>
             </a:extLst>
           </p:cNvPr>
@@ -7572,10 +7572,9 @@
           <a:lstStyle/>
           <a:p>
             <a:r>
-              <a:rPr lang="en-US" dirty="0" smtClean="0"/>
+              <a:rPr lang="en-US" dirty="0"/>
               <a:t>Architectural Design</a:t>
             </a:r>
-            <a:endParaRPr lang="en-US" dirty="0"/>
           </a:p>
         </p:txBody>
       </p:sp>
@@ -7596,31 +7595,7 @@
           <a:p>
             <a:r>
               <a:rPr lang="en-US" dirty="0"/>
-              <a:t>The Test Framework System consists of the procedures, documentation, </a:t>
-            </a:r>
-            <a:r>
-              <a:rPr lang="en-US" dirty="0" smtClean="0"/>
-              <a:t>user interfaces, test </a:t>
-            </a:r>
-            <a:r>
-              <a:rPr lang="en-US" dirty="0"/>
-              <a:t>engine(s), </a:t>
-            </a:r>
-            <a:r>
-              <a:rPr lang="en-US" dirty="0" smtClean="0"/>
-              <a:t>test </a:t>
-            </a:r>
-            <a:r>
-              <a:rPr lang="en-US" dirty="0"/>
-              <a:t>server(s), database, </a:t>
-            </a:r>
-            <a:r>
-              <a:rPr lang="en-US" dirty="0" smtClean="0"/>
-              <a:t>test cases, test </a:t>
-            </a:r>
-            <a:r>
-              <a:rPr lang="en-US" dirty="0"/>
-              <a:t>logs, and test results.  The Test System can be utilized in one of two ways:</a:t>
+              <a:t>The Test Framework System consists of the procedures, documentation, user interfaces, test engine(s), test server(s), database, test cases, test logs, and test results.  The Test System can be utilized in one of two ways:</a:t>
             </a:r>
           </a:p>
           <a:p>
@@ -7688,10 +7663,9 @@
           <a:lstStyle/>
           <a:p>
             <a:r>
-              <a:rPr lang="en-US" dirty="0" smtClean="0"/>
+              <a:rPr lang="en-US" dirty="0"/>
               <a:t>Architectural Design – Locally Installed</a:t>
             </a:r>
-            <a:endParaRPr lang="en-US" dirty="0"/>
           </a:p>
         </p:txBody>
       </p:sp>
@@ -7780,7 +7754,7 @@
           <a:graphicData uri="http://schemas.openxmlformats.org/presentationml/2006/ole">
             <mc:AlternateContent xmlns:mc="http://schemas.openxmlformats.org/markup-compatibility/2006">
               <mc:Choice xmlns:v="urn:schemas-microsoft-com:vml" Requires="v">
-                <p:oleObj spid="_x0000_s1035" name="Visio" r:id="rId3" imgW="7657994" imgH="4595001" progId="Visio.Drawing.15">
+                <p:oleObj spid="_x0000_s1038" name="Visio" r:id="rId3" imgW="7657994" imgH="4595001" progId="Visio.Drawing.15">
                   <p:embed/>
                 </p:oleObj>
               </mc:Choice>
@@ -7880,10 +7854,9 @@
           <a:lstStyle/>
           <a:p>
             <a:r>
-              <a:rPr lang="en-US" dirty="0" smtClean="0"/>
+              <a:rPr lang="en-US" dirty="0"/>
               <a:t>Architectural Design – Local Install</a:t>
             </a:r>
-            <a:endParaRPr lang="en-US" dirty="0"/>
           </a:p>
         </p:txBody>
       </p:sp>
@@ -7911,21 +7884,13 @@
           <a:p>
             <a:r>
               <a:rPr lang="en-US" dirty="0"/>
-              <a:t>In this context, the entire Test Framework System is installed locally on the user’s machine</a:t>
-            </a:r>
-            <a:r>
-              <a:rPr lang="en-US" dirty="0" smtClean="0"/>
-              <a:t>.</a:t>
-            </a:r>
-          </a:p>
-          <a:p>
-            <a:r>
-              <a:rPr lang="en-US" dirty="0" smtClean="0"/>
-              <a:t>The </a:t>
-            </a:r>
-            <a:r>
-              <a:rPr lang="en-US" dirty="0"/>
-              <a:t>system presents a built-in native GUI, which allows the user to interact with the system.  </a:t>
+              <a:t>In this context, the entire Test Framework System is installed locally on the user’s machine.</a:t>
+            </a:r>
+          </a:p>
+          <a:p>
+            <a:r>
+              <a:rPr lang="en-US" dirty="0"/>
+              <a:t>The system presents a built-in native GUI, which allows the user to interact with the system.  </a:t>
             </a:r>
           </a:p>
           <a:p>
@@ -8003,10 +7968,9 @@
           <a:lstStyle/>
           <a:p>
             <a:r>
-              <a:rPr lang="en-US" dirty="0" smtClean="0"/>
+              <a:rPr lang="en-US" dirty="0"/>
               <a:t>Architectural Design – Remote System</a:t>
             </a:r>
-            <a:endParaRPr lang="en-US" dirty="0"/>
           </a:p>
         </p:txBody>
       </p:sp>
@@ -8158,7 +8122,7 @@
           <a:graphicData uri="http://schemas.openxmlformats.org/presentationml/2006/ole">
             <mc:AlternateContent xmlns:mc="http://schemas.openxmlformats.org/markup-compatibility/2006">
               <mc:Choice xmlns:v="urn:schemas-microsoft-com:vml" Requires="v">
-                <p:oleObj spid="_x0000_s2061" name="Visio" r:id="rId3" imgW="9349846" imgH="6446661" progId="Visio.Drawing.15">
+                <p:oleObj spid="_x0000_s2064" name="Visio" r:id="rId3" imgW="9349846" imgH="6446661" progId="Visio.Drawing.15">
                   <p:embed/>
                 </p:oleObj>
               </mc:Choice>
@@ -8256,10 +8220,9 @@
           <a:lstStyle/>
           <a:p>
             <a:r>
-              <a:rPr lang="en-US" dirty="0" smtClean="0"/>
+              <a:rPr lang="en-US" dirty="0"/>
               <a:t>Architectural Design – Remote System</a:t>
             </a:r>
-            <a:endParaRPr lang="en-US" dirty="0"/>
           </a:p>
         </p:txBody>
       </p:sp>
@@ -8293,58 +8256,25 @@
           <a:p>
             <a:r>
               <a:rPr lang="en-US" dirty="0"/>
-              <a:t>The Web User Interface is accessed via the user’s web browser</a:t>
-            </a:r>
-            <a:r>
-              <a:rPr lang="en-US" dirty="0" smtClean="0"/>
-              <a:t>.</a:t>
-            </a:r>
-          </a:p>
-          <a:p>
-            <a:r>
-              <a:rPr lang="en-US" dirty="0" smtClean="0"/>
-              <a:t>The </a:t>
-            </a:r>
-            <a:r>
-              <a:rPr lang="en-US" dirty="0"/>
-              <a:t>GUI will show and allow management of available Test Engines contained and configured in the Test Server database</a:t>
-            </a:r>
-            <a:r>
-              <a:rPr lang="en-US" dirty="0" smtClean="0"/>
-              <a:t>.</a:t>
-            </a:r>
-          </a:p>
-          <a:p>
-            <a:r>
-              <a:rPr lang="en-US" dirty="0" smtClean="0"/>
-              <a:t>The </a:t>
-            </a:r>
-            <a:r>
-              <a:rPr lang="en-US" dirty="0"/>
-              <a:t>GUI will allow multiple test cases to be selected and run with the </a:t>
-            </a:r>
-            <a:r>
-              <a:rPr lang="en-US" dirty="0" smtClean="0"/>
-              <a:t>Browser </a:t>
-            </a:r>
-            <a:r>
-              <a:rPr lang="en-US" dirty="0"/>
-              <a:t>for Tests </a:t>
-            </a:r>
-            <a:r>
-              <a:rPr lang="en-US" dirty="0" smtClean="0"/>
-              <a:t>Dialog.</a:t>
-            </a:r>
-            <a:endParaRPr lang="en-US" dirty="0"/>
-          </a:p>
-          <a:p>
-            <a:r>
-              <a:rPr lang="en-US" dirty="0" smtClean="0"/>
-              <a:t>The </a:t>
-            </a:r>
-            <a:r>
-              <a:rPr lang="en-US" dirty="0"/>
-              <a:t>Test Server acts as the web/application server in this environment.  It contains the routines for login, authentication, list of Test Engine servers/workstations, and configuration of each Test Engine, and archived test results.</a:t>
+              <a:t>The Web User Interface is accessed via the user’s web browser.</a:t>
+            </a:r>
+          </a:p>
+          <a:p>
+            <a:r>
+              <a:rPr lang="en-US" dirty="0"/>
+              <a:t>The GUI will show and allow management of available Test Engines contained and configured in the Test Server database.</a:t>
+            </a:r>
+          </a:p>
+          <a:p>
+            <a:r>
+              <a:rPr lang="en-US" dirty="0"/>
+              <a:t>The GUI will allow multiple test cases to be selected and run with the Browser for Tests Dialog.</a:t>
+            </a:r>
+          </a:p>
+          <a:p>
+            <a:r>
+              <a:rPr lang="en-US" dirty="0"/>
+              <a:t>The Test Server acts as the web/application server in this environment.  It contains the routines for login, authentication, list of Test Engine servers/workstations, and configuration of each Test Engine, and archived test results.</a:t>
             </a:r>
           </a:p>
           <a:p>
@@ -8352,16 +8282,11 @@
               <a:rPr lang="en-US" dirty="0"/>
               <a:t>The Test Engine(s) are the heart of this system.  They are where the actual test cases are run. </a:t>
             </a:r>
-            <a:endParaRPr lang="en-US" dirty="0" smtClean="0"/>
-          </a:p>
-          <a:p>
-            <a:r>
-              <a:rPr lang="en-US" dirty="0" smtClean="0"/>
-              <a:t>The </a:t>
-            </a:r>
-            <a:r>
-              <a:rPr lang="en-US" dirty="0"/>
-              <a:t>Test Database stores Test System Data for each test case, as well as system and corresponding test engine configuration, test cases and latest test execution results.</a:t>
+          </a:p>
+          <a:p>
+            <a:r>
+              <a:rPr lang="en-US" dirty="0"/>
+              <a:t>The Test Database stores Test System Data for each test case, as well as system and corresponding test engine configuration, test cases and latest test execution results.</a:t>
             </a:r>
           </a:p>
           <a:p>
@@ -8373,15 +8298,7 @@
           <a:p>
             <a:r>
               <a:rPr lang="en-US" dirty="0"/>
-              <a:t>The remote user is permitted to register his or her machine with </a:t>
-            </a:r>
-            <a:r>
-              <a:rPr lang="en-US" dirty="0" smtClean="0"/>
-              <a:t>a test server </a:t>
-            </a:r>
-            <a:r>
-              <a:rPr lang="en-US" dirty="0"/>
-              <a:t>as an additional resource for those test servers in the system.</a:t>
+              <a:t>The remote user is permitted to register his or her machine with a test server as an additional resource for those test servers in the system.</a:t>
             </a:r>
           </a:p>
           <a:p>
@@ -8446,10 +8363,9 @@
           <a:lstStyle/>
           <a:p>
             <a:r>
-              <a:rPr lang="en-US" dirty="0" smtClean="0"/>
+              <a:rPr lang="en-US" dirty="0"/>
               <a:t>Key Architectural Components of the System</a:t>
             </a:r>
-            <a:endParaRPr lang="en-US" dirty="0"/>
           </a:p>
         </p:txBody>
       </p:sp>
@@ -8615,7 +8531,6 @@
               <a:rPr lang="en-US" dirty="0"/>
               <a:t>, as well as can be saved in a log file.</a:t>
             </a:r>
-            <a:endParaRPr lang="en-US" dirty="0"/>
           </a:p>
         </p:txBody>
       </p:sp>
@@ -8672,18 +8587,9 @@
           <a:lstStyle/>
           <a:p>
             <a:r>
-              <a:rPr lang="en-US" sz="3200" dirty="0" smtClean="0"/>
-              <a:t>Architectural View Perspectives: </a:t>
-            </a:r>
-            <a:r>
               <a:rPr lang="en-US" sz="3200" dirty="0"/>
-              <a:t>Use </a:t>
-            </a:r>
-            <a:r>
-              <a:rPr lang="en-US" sz="3200" dirty="0" smtClean="0"/>
-              <a:t>Cases</a:t>
-            </a:r>
-            <a:endParaRPr lang="en-US" sz="3200" dirty="0"/>
+              <a:t>Architectural View Perspectives: Use Cases</a:t>
+            </a:r>
           </a:p>
         </p:txBody>
       </p:sp>
@@ -8692,7 +8598,7 @@
           <p:cNvPr id="6" name="Picture 5">
             <a:extLst>
               <a:ext uri="{FF2B5EF4-FFF2-40B4-BE49-F238E27FC236}">
-                <a16:creationId xmlns:a16="http://schemas.microsoft.com/office/drawing/2014/main" xmlns="" id="{2CE94564-7E21-42B5-B0C3-7B175B692FB4}"/>
+                <a16:creationId xmlns:a16="http://schemas.microsoft.com/office/drawing/2014/main" id="{2CE94564-7E21-42B5-B0C3-7B175B692FB4}"/>
               </a:ext>
             </a:extLst>
           </p:cNvPr>
@@ -8722,7 +8628,7 @@
           <p:cNvPr id="8" name="Picture 7">
             <a:extLst>
               <a:ext uri="{FF2B5EF4-FFF2-40B4-BE49-F238E27FC236}">
-                <a16:creationId xmlns:a16="http://schemas.microsoft.com/office/drawing/2014/main" xmlns="" id="{9A5C1814-5B60-480F-9900-D25FA371C13D}"/>
+                <a16:creationId xmlns:a16="http://schemas.microsoft.com/office/drawing/2014/main" id="{9A5C1814-5B60-480F-9900-D25FA371C13D}"/>
               </a:ext>
             </a:extLst>
           </p:cNvPr>
@@ -8832,7 +8738,7 @@
           <a:graphicData uri="http://schemas.openxmlformats.org/presentationml/2006/ole">
             <mc:AlternateContent xmlns:mc="http://schemas.openxmlformats.org/markup-compatibility/2006">
               <mc:Choice xmlns:v="urn:schemas-microsoft-com:vml" Requires="v">
-                <p:oleObj spid="_x0000_s3083" name="Visio" r:id="rId5" imgW="4667213" imgH="5038832" progId="Visio.Drawing.15">
+                <p:oleObj spid="_x0000_s3086" name="Visio" r:id="rId5" imgW="4667213" imgH="5038832" progId="Visio.Drawing.15">
                   <p:embed/>
                 </p:oleObj>
               </mc:Choice>
@@ -8926,13 +8832,8 @@
           <a:p>
             <a:r>
               <a:rPr lang="en-US" sz="3200" dirty="0"/>
-              <a:t>Architectural View Perspectives: </a:t>
-            </a:r>
-            <a:r>
-              <a:rPr lang="en-US" sz="3200" dirty="0" smtClean="0"/>
-              <a:t>Sequence</a:t>
-            </a:r>
-            <a:endParaRPr lang="en-US" sz="3200" dirty="0"/>
+              <a:t>Architectural View Perspectives: Sequence</a:t>
+            </a:r>
           </a:p>
         </p:txBody>
       </p:sp>
@@ -9021,7 +8922,7 @@
           <a:graphicData uri="http://schemas.openxmlformats.org/presentationml/2006/ole">
             <mc:AlternateContent xmlns:mc="http://schemas.openxmlformats.org/markup-compatibility/2006">
               <mc:Choice xmlns:v="urn:schemas-microsoft-com:vml" Requires="v">
-                <p:oleObj spid="_x0000_s4106" name="Visio" r:id="rId3" imgW="6749898" imgH="5289535" progId="Visio.Drawing.15">
+                <p:oleObj spid="_x0000_s4109" name="Visio" r:id="rId3" imgW="6749898" imgH="5289535" progId="Visio.Drawing.15">
                   <p:embed/>
                 </p:oleObj>
               </mc:Choice>
@@ -9235,11 +9136,7 @@
           <a:p>
             <a:r>
               <a:rPr lang="en-US" sz="3200" dirty="0"/>
-              <a:t>Architectural View Perspectives: Class </a:t>
-            </a:r>
-            <a:r>
-              <a:rPr lang="en-US" sz="3200" dirty="0"/>
-              <a:t>Diagram</a:t>
+              <a:t>Architectural View Perspectives: Class Diagram</a:t>
             </a:r>
           </a:p>
         </p:txBody>
@@ -9329,7 +9226,7 @@
           <a:graphicData uri="http://schemas.openxmlformats.org/presentationml/2006/ole">
             <mc:AlternateContent xmlns:mc="http://schemas.openxmlformats.org/markup-compatibility/2006">
               <mc:Choice xmlns:v="urn:schemas-microsoft-com:vml" Requires="v">
-                <p:oleObj spid="_x0000_s5128" name="Visio" r:id="rId3" imgW="13167360" imgH="8610537" progId="Visio.Drawing.15">
+                <p:oleObj spid="_x0000_s5131" name="Visio" r:id="rId3" imgW="13167360" imgH="8610537" progId="Visio.Drawing.15">
                   <p:embed/>
                 </p:oleObj>
               </mc:Choice>
@@ -9420,10 +9317,9 @@
           <a:lstStyle/>
           <a:p>
             <a:r>
-              <a:rPr lang="en-US" dirty="0" smtClean="0"/>
+              <a:rPr lang="en-US" dirty="0"/>
               <a:t>Application Architecture Model</a:t>
             </a:r>
-            <a:endParaRPr lang="en-US" dirty="0"/>
           </a:p>
         </p:txBody>
       </p:sp>
@@ -9445,38 +9341,21 @@
           <a:lstStyle/>
           <a:p>
             <a:r>
-              <a:rPr lang="en-US" dirty="0" smtClean="0"/>
-              <a:t>The </a:t>
-            </a:r>
-            <a:r>
-              <a:rPr lang="en-US" dirty="0"/>
-              <a:t>application architecture </a:t>
-            </a:r>
-            <a:r>
-              <a:rPr lang="en-US" dirty="0" smtClean="0"/>
-              <a:t>model or application template </a:t>
-            </a:r>
-            <a:r>
-              <a:rPr lang="en-US" dirty="0"/>
-              <a:t>most closely approximates an event driven model</a:t>
-            </a:r>
-            <a:r>
-              <a:rPr lang="en-US" dirty="0" smtClean="0"/>
-              <a:t>.</a:t>
-            </a:r>
-          </a:p>
-          <a:p>
-            <a:r>
-              <a:rPr lang="en-US" dirty="0" smtClean="0"/>
+              <a:rPr lang="en-US" dirty="0"/>
+              <a:t>The application architecture model or application template most closely approximates an event driven model.</a:t>
+            </a:r>
+          </a:p>
+          <a:p>
+            <a:r>
+              <a:rPr lang="en-US" dirty="0"/>
               <a:t>All applications have more than one model.  This could actually been viewed as a combination of models, event driven for the user interface, as well as the tests that are assigned to a thread in the pool and executed.</a:t>
             </a:r>
           </a:p>
           <a:p>
             <a:r>
-              <a:rPr lang="en-US" dirty="0" smtClean="0"/>
+              <a:rPr lang="en-US" dirty="0"/>
               <a:t>Could also be viewed as a transaction processing system.  One transaction for each test.</a:t>
             </a:r>
-            <a:endParaRPr lang="en-US" dirty="0"/>
           </a:p>
         </p:txBody>
       </p:sp>
@@ -9526,10 +9405,9 @@
           <a:lstStyle/>
           <a:p>
             <a:r>
-              <a:rPr lang="en-US" dirty="0" smtClean="0"/>
+              <a:rPr lang="en-US" dirty="0"/>
               <a:t>Architectural Patterns</a:t>
             </a:r>
-            <a:endParaRPr lang="en-US" dirty="0"/>
           </a:p>
         </p:txBody>
       </p:sp>
@@ -9549,71 +9427,35 @@
           <a:lstStyle/>
           <a:p>
             <a:r>
-              <a:rPr lang="en-US" b="1" dirty="0" smtClean="0"/>
-              <a:t>Architectural </a:t>
-            </a:r>
-            <a:r>
               <a:rPr lang="en-US" b="1" dirty="0"/>
-              <a:t>Patterns for Remote Installation</a:t>
-            </a:r>
-          </a:p>
-          <a:p>
-            <a:r>
-              <a:rPr lang="en-US" dirty="0"/>
-              <a:t>The Client-Server pattern was chosen for the remote installation</a:t>
-            </a:r>
-            <a:r>
-              <a:rPr lang="en-US" dirty="0" smtClean="0"/>
-              <a:t>.</a:t>
+              <a:t>Architectural Patterns for Remote Installation</a:t>
+            </a:r>
+          </a:p>
+          <a:p>
+            <a:r>
+              <a:rPr lang="en-US" dirty="0"/>
+              <a:t>The Client-Server pattern was chosen for the remote installation.</a:t>
             </a:r>
           </a:p>
           <a:p>
             <a:pPr lvl="1"/>
             <a:r>
-              <a:rPr lang="en-US" dirty="0" smtClean="0"/>
-              <a:t>The </a:t>
-            </a:r>
-            <a:r>
-              <a:rPr lang="en-US" dirty="0"/>
-              <a:t>web browser functions as the presentation or thin client front-end</a:t>
-            </a:r>
-            <a:r>
-              <a:rPr lang="en-US" dirty="0" smtClean="0"/>
-              <a:t>.</a:t>
+              <a:rPr lang="en-US" dirty="0"/>
+              <a:t>The web browser functions as the presentation or thin client front-end.</a:t>
             </a:r>
           </a:p>
           <a:p>
             <a:pPr lvl="1"/>
             <a:r>
-              <a:rPr lang="en-US" dirty="0" smtClean="0"/>
-              <a:t>The </a:t>
-            </a:r>
-            <a:r>
-              <a:rPr lang="en-US" dirty="0"/>
-              <a:t>Test Server is the web/application server in this </a:t>
-            </a:r>
-            <a:r>
-              <a:rPr lang="en-US" dirty="0" smtClean="0"/>
-              <a:t>environment.  It </a:t>
-            </a:r>
-            <a:r>
-              <a:rPr lang="en-US" dirty="0"/>
-              <a:t>serves requests to the web browser client for screen updates in the way of test results, Test Engine availability, and Test Engine configuration information</a:t>
-            </a:r>
-            <a:r>
-              <a:rPr lang="en-US" dirty="0" smtClean="0"/>
-              <a:t>.</a:t>
+              <a:rPr lang="en-US" dirty="0"/>
+              <a:t>The Test Server is the web/application server in this environment.  It serves requests to the web browser client for screen updates in the way of test results, Test Engine availability, and Test Engine configuration information.</a:t>
             </a:r>
           </a:p>
           <a:p>
             <a:pPr lvl="1"/>
             <a:r>
-              <a:rPr lang="en-US" dirty="0" smtClean="0"/>
-              <a:t>The Test Server Database stores </a:t>
-            </a:r>
-            <a:r>
-              <a:rPr lang="en-US" dirty="0"/>
-              <a:t>test results, test cases, as well as Test Engine availability and configuration data in the Test Database.</a:t>
+              <a:rPr lang="en-US" dirty="0"/>
+              <a:t>The Test Server Database stores test results, test cases, as well as Test Engine availability and configuration data in the Test Database.</a:t>
             </a:r>
           </a:p>
           <a:p>
@@ -9673,10 +9515,9 @@
           <a:lstStyle/>
           <a:p>
             <a:r>
-              <a:rPr lang="en-US" dirty="0" smtClean="0"/>
+              <a:rPr lang="en-US" dirty="0"/>
               <a:t>Architectural Patterns</a:t>
             </a:r>
-            <a:endParaRPr lang="en-US" dirty="0"/>
           </a:p>
         </p:txBody>
       </p:sp>
@@ -9703,135 +9544,66 @@
           <a:lstStyle/>
           <a:p>
             <a:r>
-              <a:rPr lang="en-US" b="1" dirty="0" smtClean="0"/>
-              <a:t>Architectural </a:t>
-            </a:r>
-            <a:r>
               <a:rPr lang="en-US" b="1" dirty="0"/>
-              <a:t>Patterns for Local Installation</a:t>
-            </a:r>
-          </a:p>
-          <a:p>
-            <a:r>
-              <a:rPr lang="en-US" dirty="0"/>
-              <a:t>The architectural pattern that most closely approximates the local installation is the Model View Controller (MVC) pattern</a:t>
-            </a:r>
-            <a:r>
-              <a:rPr lang="en-US" dirty="0" smtClean="0"/>
-              <a:t>.</a:t>
-            </a:r>
-          </a:p>
-          <a:p>
-            <a:r>
-              <a:rPr lang="en-US" dirty="0" smtClean="0"/>
-              <a:t>In </a:t>
-            </a:r>
-            <a:r>
-              <a:rPr lang="en-US" dirty="0"/>
-              <a:t>this case this architecture pattern was chosen as the view is the GUI and separate from the test </a:t>
-            </a:r>
-            <a:r>
-              <a:rPr lang="en-US" dirty="0" smtClean="0"/>
-              <a:t>engine</a:t>
-            </a:r>
-          </a:p>
-          <a:p>
-            <a:r>
-              <a:rPr lang="en-US" dirty="0" smtClean="0"/>
-              <a:t>The Test engine is the controller </a:t>
-            </a:r>
-            <a:r>
-              <a:rPr lang="en-US" dirty="0"/>
-              <a:t>which is executing multiple threads of execution (test cases) in the background concurrently</a:t>
-            </a:r>
-            <a:r>
-              <a:rPr lang="en-US" dirty="0" smtClean="0"/>
-              <a:t>.</a:t>
-            </a:r>
-          </a:p>
-          <a:p>
-            <a:r>
-              <a:rPr lang="en-US" dirty="0" smtClean="0"/>
-              <a:t>The actual </a:t>
-            </a:r>
-            <a:r>
-              <a:rPr lang="en-US" dirty="0"/>
-              <a:t>test cases and test data is the data </a:t>
-            </a:r>
-            <a:r>
-              <a:rPr lang="en-US" dirty="0" smtClean="0"/>
-              <a:t>model in this architecture.</a:t>
-            </a:r>
-            <a:endParaRPr lang="en-US" dirty="0"/>
-          </a:p>
-          <a:p>
-            <a:r>
-              <a:rPr lang="en-US" dirty="0" smtClean="0"/>
-              <a:t>This </a:t>
-            </a:r>
-            <a:r>
-              <a:rPr lang="en-US" dirty="0"/>
-              <a:t>particular pattern was chosen as it </a:t>
-            </a:r>
-            <a:r>
-              <a:rPr lang="en-US" dirty="0" smtClean="0"/>
-              <a:t>will:</a:t>
+              <a:t>Architectural Patterns for Local Installation</a:t>
+            </a:r>
+          </a:p>
+          <a:p>
+            <a:r>
+              <a:rPr lang="en-US" dirty="0"/>
+              <a:t>The architectural pattern that most closely approximates the local installation is the Model View Controller (MVC) pattern.</a:t>
+            </a:r>
+          </a:p>
+          <a:p>
+            <a:r>
+              <a:rPr lang="en-US" dirty="0"/>
+              <a:t>In this case this architecture pattern was chosen as the view is the GUI and separate from the test engine</a:t>
+            </a:r>
+          </a:p>
+          <a:p>
+            <a:r>
+              <a:rPr lang="en-US" dirty="0"/>
+              <a:t>The Test engine is the controller which is executing multiple threads of execution (test cases) in the background concurrently.</a:t>
+            </a:r>
+          </a:p>
+          <a:p>
+            <a:r>
+              <a:rPr lang="en-US" dirty="0"/>
+              <a:t>The actual test cases and test data is the data model in this architecture.</a:t>
+            </a:r>
+          </a:p>
+          <a:p>
+            <a:r>
+              <a:rPr lang="en-US" dirty="0"/>
+              <a:t>This particular pattern was chosen as it will:</a:t>
             </a:r>
           </a:p>
           <a:p>
             <a:pPr lvl="1"/>
             <a:r>
-              <a:rPr lang="en-US" dirty="0" smtClean="0"/>
-              <a:t>Deliver </a:t>
-            </a:r>
-            <a:r>
-              <a:rPr lang="en-US" dirty="0"/>
-              <a:t>sufficient </a:t>
-            </a:r>
-            <a:r>
-              <a:rPr lang="en-US" dirty="0" smtClean="0"/>
-              <a:t>performance.</a:t>
+              <a:rPr lang="en-US" dirty="0"/>
+              <a:t>Deliver sufficient performance.</a:t>
             </a:r>
           </a:p>
           <a:p>
             <a:pPr lvl="1"/>
             <a:r>
-              <a:rPr lang="en-US" dirty="0" smtClean="0"/>
-              <a:t>Allow </a:t>
-            </a:r>
-            <a:r>
-              <a:rPr lang="en-US" dirty="0"/>
-              <a:t>for loose coupling to make modifications and maintenance of the system </a:t>
-            </a:r>
-            <a:r>
-              <a:rPr lang="en-US" dirty="0" smtClean="0"/>
-              <a:t>easier.</a:t>
+              <a:rPr lang="en-US" dirty="0"/>
+              <a:t>Allow for loose coupling to make modifications and maintenance of the system easier.</a:t>
             </a:r>
           </a:p>
           <a:p>
             <a:pPr lvl="1"/>
             <a:r>
-              <a:rPr lang="en-US" dirty="0" smtClean="0"/>
-              <a:t>Separate </a:t>
-            </a:r>
-            <a:r>
-              <a:rPr lang="en-US" dirty="0"/>
-              <a:t>the functionality of presentation and test execution</a:t>
-            </a:r>
-            <a:r>
-              <a:rPr lang="en-US" dirty="0" smtClean="0"/>
-              <a:t>.</a:t>
+              <a:rPr lang="en-US" dirty="0"/>
+              <a:t>Separate the functionality of presentation and test execution.</a:t>
             </a:r>
           </a:p>
           <a:p>
             <a:pPr lvl="1"/>
             <a:r>
-              <a:rPr lang="en-US" dirty="0" smtClean="0"/>
-              <a:t>It </a:t>
-            </a:r>
-            <a:r>
-              <a:rPr lang="en-US" dirty="0"/>
-              <a:t>further lends itself to a possible web GUI for a local installation as a future enhancement.</a:t>
+              <a:rPr lang="en-US" dirty="0"/>
+              <a:t>It further lends itself to a possible web GUI for a local installation as a future enhancement.</a:t>
             </a:r>
           </a:p>
           <a:p>
@@ -9885,10 +9657,9 @@
           <a:lstStyle/>
           <a:p>
             <a:r>
-              <a:rPr lang="en-US" dirty="0" smtClean="0"/>
+              <a:rPr lang="en-US" dirty="0"/>
               <a:t>System Models:  Use Case – Local User </a:t>
             </a:r>
-            <a:endParaRPr lang="en-US" dirty="0"/>
           </a:p>
         </p:txBody>
       </p:sp>
@@ -9977,7 +9748,7 @@
           <a:graphicData uri="http://schemas.openxmlformats.org/presentationml/2006/ole">
             <mc:AlternateContent xmlns:mc="http://schemas.openxmlformats.org/markup-compatibility/2006">
               <mc:Choice xmlns:v="urn:schemas-microsoft-com:vml" Requires="v">
-                <p:oleObj spid="_x0000_s6156" name="Visio" r:id="rId3" imgW="5210104" imgH="3724541" progId="Visio.Drawing.15">
+                <p:oleObj spid="_x0000_s6159" name="Visio" r:id="rId3" imgW="5210104" imgH="3724541" progId="Visio.Drawing.15">
                   <p:embed/>
                 </p:oleObj>
               </mc:Choice>
@@ -10068,10 +9839,9 @@
           <a:lstStyle/>
           <a:p>
             <a:r>
-              <a:rPr lang="en-US" dirty="0" smtClean="0"/>
+              <a:rPr lang="en-US" dirty="0"/>
               <a:t>Local User – Run Test</a:t>
             </a:r>
-            <a:endParaRPr lang="en-US" dirty="0"/>
           </a:p>
         </p:txBody>
       </p:sp>
@@ -10154,10 +9924,9 @@
           <a:lstStyle/>
           <a:p>
             <a:r>
-              <a:rPr lang="en-US" dirty="0" smtClean="0"/>
+              <a:rPr lang="en-US" dirty="0"/>
               <a:t>Register Local Machine as Test Engine</a:t>
             </a:r>
-            <a:endParaRPr lang="en-US" dirty="0"/>
           </a:p>
         </p:txBody>
       </p:sp>
@@ -10245,10 +10014,9 @@
           <a:lstStyle/>
           <a:p>
             <a:r>
-              <a:rPr lang="en-US" dirty="0" smtClean="0"/>
+              <a:rPr lang="en-US" dirty="0"/>
               <a:t>Deregister Local Machine with Test Server</a:t>
             </a:r>
-            <a:endParaRPr lang="en-US" dirty="0"/>
           </a:p>
         </p:txBody>
       </p:sp>
@@ -10331,10 +10099,9 @@
           <a:lstStyle/>
           <a:p>
             <a:r>
-              <a:rPr lang="en-US" dirty="0" smtClean="0"/>
+              <a:rPr lang="en-US" dirty="0"/>
               <a:t>Export Test Results</a:t>
             </a:r>
-            <a:endParaRPr lang="en-US" dirty="0"/>
           </a:p>
         </p:txBody>
       </p:sp>
@@ -10422,10 +10189,9 @@
           <a:lstStyle/>
           <a:p>
             <a:r>
-              <a:rPr lang="en-US" dirty="0" smtClean="0"/>
+              <a:rPr lang="en-US" dirty="0"/>
               <a:t>Activity Diagram – Local User</a:t>
             </a:r>
-            <a:endParaRPr lang="en-US" dirty="0"/>
           </a:p>
         </p:txBody>
       </p:sp>
@@ -10519,7 +10285,7 @@
           <p:cNvPr id="6" name="Picture 5">
             <a:extLst>
               <a:ext uri="{FF2B5EF4-FFF2-40B4-BE49-F238E27FC236}">
-                <a16:creationId xmlns:a16="http://schemas.microsoft.com/office/drawing/2014/main" xmlns="" id="{42F62902-0B99-45F6-8313-405C7CFCB586}"/>
+                <a16:creationId xmlns:a16="http://schemas.microsoft.com/office/drawing/2014/main" id="{42F62902-0B99-45F6-8313-405C7CFCB586}"/>
               </a:ext>
             </a:extLst>
           </p:cNvPr>
@@ -10590,10 +10356,9 @@
           <a:lstStyle/>
           <a:p>
             <a:r>
-              <a:rPr lang="en-US" dirty="0" smtClean="0"/>
+              <a:rPr lang="en-US" dirty="0"/>
               <a:t>System Models: Use Case Remote Use</a:t>
             </a:r>
-            <a:endParaRPr lang="en-US" dirty="0"/>
           </a:p>
         </p:txBody>
       </p:sp>
@@ -10682,7 +10447,7 @@
           <a:graphicData uri="http://schemas.openxmlformats.org/presentationml/2006/ole">
             <mc:AlternateContent xmlns:mc="http://schemas.openxmlformats.org/markup-compatibility/2006">
               <mc:Choice xmlns:v="urn:schemas-microsoft-com:vml" Requires="v">
-                <p:oleObj spid="_x0000_s7174" name="Visio" r:id="rId3" imgW="5549798" imgH="3727121" progId="Visio.Drawing.15">
+                <p:oleObj spid="_x0000_s7177" name="Visio" r:id="rId3" imgW="5549798" imgH="3727121" progId="Visio.Drawing.15">
                   <p:embed/>
                 </p:oleObj>
               </mc:Choice>
@@ -10767,14 +10532,14 @@
             <p:ph idx="1"/>
             <p:extLst>
               <p:ext uri="{D42A27DB-BD31-4B8C-83A1-F6EECF244321}">
-                <p14:modId xmlns:p14="http://schemas.microsoft.com/office/powerpoint/2010/main" val="177009517"/>
+                <p14:modId xmlns:p14="http://schemas.microsoft.com/office/powerpoint/2010/main" val="87058641"/>
               </p:ext>
             </p:extLst>
           </p:nvPr>
         </p:nvGraphicFramePr>
         <p:xfrm>
-          <a:off x="1009291" y="60385"/>
-          <a:ext cx="7919049" cy="9004859"/>
+          <a:off x="501291" y="270367"/>
+          <a:ext cx="9419949" cy="6076801"/>
         </p:xfrm>
         <a:graphic>
           <a:graphicData uri="http://schemas.openxmlformats.org/drawingml/2006/table">
@@ -10783,10 +10548,22 @@
                 <a:tableStyleId>{5C22544A-7EE6-4342-B048-85BDC9FD1C3A}</a:tableStyleId>
               </a:tblPr>
               <a:tblGrid>
-                <a:gridCol w="1629740"/>
-                <a:gridCol w="6289309"/>
+                <a:gridCol w="1534570">
+                  <a:extLst>
+                    <a:ext uri="{9D8B030D-6E8A-4147-A177-3AD203B41FA5}">
+                      <a16:colId xmlns:a16="http://schemas.microsoft.com/office/drawing/2014/main" val="20000"/>
+                    </a:ext>
+                  </a:extLst>
+                </a:gridCol>
+                <a:gridCol w="7885379">
+                  <a:extLst>
+                    <a:ext uri="{9D8B030D-6E8A-4147-A177-3AD203B41FA5}">
+                      <a16:colId xmlns:a16="http://schemas.microsoft.com/office/drawing/2014/main" val="20001"/>
+                    </a:ext>
+                  </a:extLst>
+                </a:gridCol>
               </a:tblGrid>
-              <a:tr h="265439">
+              <a:tr h="204315">
                 <a:tc>
                   <a:txBody>
                     <a:bodyPr/>
@@ -10804,12 +10581,12 @@
                         </a:spcAft>
                       </a:pPr>
                       <a:r>
-                        <a:rPr lang="en-US" sz="600" dirty="0">
+                        <a:rPr lang="en-US" sz="1000" dirty="0">
                           <a:effectLst/>
                         </a:rPr>
                         <a:t>Title:</a:t>
                       </a:r>
-                      <a:endParaRPr lang="en-US" sz="600" dirty="0">
+                      <a:endParaRPr lang="en-US" sz="1000" dirty="0">
                         <a:effectLst/>
                         <a:latin typeface="Calibri" panose="020F0502020204030204" pitchFamily="34" charset="0"/>
                         <a:ea typeface="Calibri" panose="020F0502020204030204" pitchFamily="34" charset="0"/>
@@ -10836,12 +10613,12 @@
                         </a:spcAft>
                       </a:pPr>
                       <a:r>
-                        <a:rPr lang="en-US" sz="600">
+                        <a:rPr lang="en-US" sz="1000">
                           <a:effectLst/>
                         </a:rPr>
                         <a:t>Remote User Use Case</a:t>
                       </a:r>
-                      <a:endParaRPr lang="en-US" sz="600">
+                      <a:endParaRPr lang="en-US" sz="1000">
                         <a:effectLst/>
                         <a:latin typeface="Calibri" panose="020F0502020204030204" pitchFamily="34" charset="0"/>
                         <a:ea typeface="Calibri" panose="020F0502020204030204" pitchFamily="34" charset="0"/>
@@ -10851,8 +10628,13 @@
                   </a:txBody>
                   <a:tcPr marL="36195" marR="36195" marT="0" marB="0"/>
                 </a:tc>
+                <a:extLst>
+                  <a:ext uri="{0D108BD9-81ED-4DB2-BD59-A6C34878D82A}">
+                    <a16:rowId xmlns:a16="http://schemas.microsoft.com/office/drawing/2014/main" val="10000"/>
+                  </a:ext>
+                </a:extLst>
               </a:tr>
-              <a:tr h="1615119">
+              <a:tr h="827069">
                 <a:tc>
                   <a:txBody>
                     <a:bodyPr/>
@@ -10870,12 +10652,12 @@
                         </a:spcAft>
                       </a:pPr>
                       <a:r>
-                        <a:rPr lang="en-US" sz="600">
+                        <a:rPr lang="en-US" sz="1000">
                           <a:effectLst/>
                         </a:rPr>
                         <a:t>Description:</a:t>
                       </a:r>
-                      <a:endParaRPr lang="en-US" sz="600">
+                      <a:endParaRPr lang="en-US" sz="1000">
                         <a:effectLst/>
                         <a:latin typeface="Calibri" panose="020F0502020204030204" pitchFamily="34" charset="0"/>
                         <a:ea typeface="Calibri" panose="020F0502020204030204" pitchFamily="34" charset="0"/>
@@ -10902,42 +10684,22 @@
                         </a:spcAft>
                       </a:pPr>
                       <a:r>
-                        <a:rPr lang="en-US" sz="1400" dirty="0">
+                        <a:rPr lang="en-US" sz="1000" dirty="0">
                           <a:effectLst/>
                         </a:rPr>
                         <a:t>The remote user may login to the test server via a web application to perform several actions. These can include viewing test engine configurations so to understand the test platform capabilities, configuring test engines to a selectable to of platform capabilities, run test (or tests) on selected test engines, viewing and exporting archived test for a particular test engine. Upon completion of desired test activities, the remote user may also logout of the system.</a:t>
                       </a:r>
                     </a:p>
-                    <a:p>
-                      <a:pPr marL="0" marR="0">
-                        <a:lnSpc>
-                          <a:spcPct val="107000"/>
-                        </a:lnSpc>
-                        <a:spcBef>
-                          <a:spcPts val="0"/>
-                        </a:spcBef>
-                        <a:spcAft>
-                          <a:spcPts val="800"/>
-                        </a:spcAft>
-                      </a:pPr>
-                      <a:r>
-                        <a:rPr lang="en-US" sz="1400" dirty="0">
-                          <a:effectLst/>
-                        </a:rPr>
-                        <a:t> </a:t>
-                      </a:r>
-                      <a:endParaRPr lang="en-US" sz="1400" dirty="0">
-                        <a:effectLst/>
-                        <a:latin typeface="Calibri" panose="020F0502020204030204" pitchFamily="34" charset="0"/>
-                        <a:ea typeface="Calibri" panose="020F0502020204030204" pitchFamily="34" charset="0"/>
-                        <a:cs typeface="Times New Roman" panose="02020603050405020304" pitchFamily="18" charset="0"/>
-                      </a:endParaRPr>
-                    </a:p>
                   </a:txBody>
                   <a:tcPr marL="36195" marR="36195" marT="0" marB="0"/>
                 </a:tc>
+                <a:extLst>
+                  <a:ext uri="{0D108BD9-81ED-4DB2-BD59-A6C34878D82A}">
+                    <a16:rowId xmlns:a16="http://schemas.microsoft.com/office/drawing/2014/main" val="10001"/>
+                  </a:ext>
+                </a:extLst>
               </a:tr>
-              <a:tr h="265439">
+              <a:tr h="204315">
                 <a:tc>
                   <a:txBody>
                     <a:bodyPr/>
@@ -10955,12 +10717,12 @@
                         </a:spcAft>
                       </a:pPr>
                       <a:r>
-                        <a:rPr lang="en-US" sz="600">
+                        <a:rPr lang="en-US" sz="1000">
                           <a:effectLst/>
                         </a:rPr>
                         <a:t>Actors:</a:t>
                       </a:r>
-                      <a:endParaRPr lang="en-US" sz="600">
+                      <a:endParaRPr lang="en-US" sz="1000">
                         <a:effectLst/>
                         <a:latin typeface="Calibri" panose="020F0502020204030204" pitchFamily="34" charset="0"/>
                         <a:ea typeface="Calibri" panose="020F0502020204030204" pitchFamily="34" charset="0"/>
@@ -10987,12 +10749,12 @@
                         </a:spcAft>
                       </a:pPr>
                       <a:r>
-                        <a:rPr lang="en-US" sz="1400" dirty="0">
+                        <a:rPr lang="en-US" sz="1000" dirty="0">
                           <a:effectLst/>
                         </a:rPr>
                         <a:t>Remote User</a:t>
                       </a:r>
-                      <a:endParaRPr lang="en-US" sz="1400" dirty="0">
+                      <a:endParaRPr lang="en-US" sz="1000" dirty="0">
                         <a:effectLst/>
                         <a:latin typeface="Calibri" panose="020F0502020204030204" pitchFamily="34" charset="0"/>
                         <a:ea typeface="Calibri" panose="020F0502020204030204" pitchFamily="34" charset="0"/>
@@ -11002,8 +10764,13 @@
                   </a:txBody>
                   <a:tcPr marL="36195" marR="36195" marT="0" marB="0"/>
                 </a:tc>
+                <a:extLst>
+                  <a:ext uri="{0D108BD9-81ED-4DB2-BD59-A6C34878D82A}">
+                    <a16:rowId xmlns:a16="http://schemas.microsoft.com/office/drawing/2014/main" val="10002"/>
+                  </a:ext>
+                </a:extLst>
               </a:tr>
-              <a:tr h="265439">
+              <a:tr h="204315">
                 <a:tc>
                   <a:txBody>
                     <a:bodyPr/>
@@ -11021,12 +10788,12 @@
                         </a:spcAft>
                       </a:pPr>
                       <a:r>
-                        <a:rPr lang="en-US" sz="600">
+                        <a:rPr lang="en-US" sz="1000">
                           <a:effectLst/>
                         </a:rPr>
                         <a:t>Stimulus (Trigger)</a:t>
                       </a:r>
-                      <a:endParaRPr lang="en-US" sz="600">
+                      <a:endParaRPr lang="en-US" sz="1000">
                         <a:effectLst/>
                         <a:latin typeface="Calibri" panose="020F0502020204030204" pitchFamily="34" charset="0"/>
                         <a:ea typeface="Calibri" panose="020F0502020204030204" pitchFamily="34" charset="0"/>
@@ -11053,12 +10820,12 @@
                         </a:spcAft>
                       </a:pPr>
                       <a:r>
-                        <a:rPr lang="en-US" sz="1400" dirty="0">
+                        <a:rPr lang="en-US" sz="1000" dirty="0">
                           <a:effectLst/>
                         </a:rPr>
                         <a:t>Remote User enters the URL of the web application and successfully logs into the test server.</a:t>
                       </a:r>
-                      <a:endParaRPr lang="en-US" sz="1400" dirty="0">
+                      <a:endParaRPr lang="en-US" sz="1000" dirty="0">
                         <a:effectLst/>
                         <a:latin typeface="Calibri" panose="020F0502020204030204" pitchFamily="34" charset="0"/>
                         <a:ea typeface="Calibri" panose="020F0502020204030204" pitchFamily="34" charset="0"/>
@@ -11068,8 +10835,13 @@
                   </a:txBody>
                   <a:tcPr marL="36195" marR="36195" marT="0" marB="0"/>
                 </a:tc>
+                <a:extLst>
+                  <a:ext uri="{0D108BD9-81ED-4DB2-BD59-A6C34878D82A}">
+                    <a16:rowId xmlns:a16="http://schemas.microsoft.com/office/drawing/2014/main" val="10003"/>
+                  </a:ext>
+                </a:extLst>
               </a:tr>
-              <a:tr h="265439">
+              <a:tr h="204315">
                 <a:tc>
                   <a:txBody>
                     <a:bodyPr/>
@@ -11087,12 +10859,12 @@
                         </a:spcAft>
                       </a:pPr>
                       <a:r>
-                        <a:rPr lang="en-US" sz="600">
+                        <a:rPr lang="en-US" sz="1000">
                           <a:effectLst/>
                         </a:rPr>
                         <a:t>Preconditions:</a:t>
                       </a:r>
-                      <a:endParaRPr lang="en-US" sz="600">
+                      <a:endParaRPr lang="en-US" sz="1000">
                         <a:effectLst/>
                         <a:latin typeface="Calibri" panose="020F0502020204030204" pitchFamily="34" charset="0"/>
                         <a:ea typeface="Calibri" panose="020F0502020204030204" pitchFamily="34" charset="0"/>
@@ -11119,12 +10891,12 @@
                         </a:spcAft>
                       </a:pPr>
                       <a:r>
-                        <a:rPr lang="en-US" sz="1400" dirty="0">
+                        <a:rPr lang="en-US" sz="1000" dirty="0">
                           <a:effectLst/>
                         </a:rPr>
                         <a:t>Test Server URL is accessible and available to host the remote user web application.</a:t>
                       </a:r>
-                      <a:endParaRPr lang="en-US" sz="1400" dirty="0">
+                      <a:endParaRPr lang="en-US" sz="1000" dirty="0">
                         <a:effectLst/>
                         <a:latin typeface="Calibri" panose="020F0502020204030204" pitchFamily="34" charset="0"/>
                         <a:ea typeface="Calibri" panose="020F0502020204030204" pitchFamily="34" charset="0"/>
@@ -11134,8 +10906,13 @@
                   </a:txBody>
                   <a:tcPr marL="36195" marR="36195" marT="0" marB="0"/>
                 </a:tc>
+                <a:extLst>
+                  <a:ext uri="{0D108BD9-81ED-4DB2-BD59-A6C34878D82A}">
+                    <a16:rowId xmlns:a16="http://schemas.microsoft.com/office/drawing/2014/main" val="10004"/>
+                  </a:ext>
+                </a:extLst>
               </a:tr>
-              <a:tr h="1376711">
+              <a:tr h="1452744">
                 <a:tc>
                   <a:txBody>
                     <a:bodyPr/>
@@ -11153,12 +10930,12 @@
                         </a:spcAft>
                       </a:pPr>
                       <a:r>
-                        <a:rPr lang="en-US" sz="600">
+                        <a:rPr lang="en-US" sz="1000">
                           <a:effectLst/>
                         </a:rPr>
                         <a:t>Postconditions:</a:t>
                       </a:r>
-                      <a:endParaRPr lang="en-US" sz="600">
+                      <a:endParaRPr lang="en-US" sz="1000">
                         <a:effectLst/>
                         <a:latin typeface="Calibri" panose="020F0502020204030204" pitchFamily="34" charset="0"/>
                         <a:ea typeface="Calibri" panose="020F0502020204030204" pitchFamily="34" charset="0"/>
@@ -11185,7 +10962,7 @@
                         </a:spcAft>
                       </a:pPr>
                       <a:r>
-                        <a:rPr lang="en-US" sz="1400" dirty="0">
+                        <a:rPr lang="en-US" sz="1000" dirty="0">
                           <a:effectLst/>
                         </a:rPr>
                         <a:t>The desired actions are performed.</a:t>
@@ -11206,7 +10983,7 @@
                         <a:buAutoNum type="arabicPeriod"/>
                       </a:pPr>
                       <a:r>
-                        <a:rPr lang="en-US" sz="1400" dirty="0">
+                        <a:rPr lang="en-US" sz="1000" dirty="0">
                           <a:effectLst/>
                         </a:rPr>
                         <a:t>Test configuration(s) successfully viewed.</a:t>
@@ -11227,7 +11004,7 @@
                         <a:buAutoNum type="arabicPeriod"/>
                       </a:pPr>
                       <a:r>
-                        <a:rPr lang="en-US" sz="1400" dirty="0">
+                        <a:rPr lang="en-US" sz="1000" dirty="0">
                           <a:effectLst/>
                         </a:rPr>
                         <a:t>Test configuration(s) successfully configured.</a:t>
@@ -11248,7 +11025,7 @@
                         <a:buAutoNum type="arabicPeriod"/>
                       </a:pPr>
                       <a:r>
-                        <a:rPr lang="en-US" sz="1400" dirty="0">
+                        <a:rPr lang="en-US" sz="1000" dirty="0">
                           <a:effectLst/>
                         </a:rPr>
                         <a:t>Test(s) successfully executed.</a:t>
@@ -11269,7 +11046,7 @@
                         <a:buAutoNum type="arabicPeriod"/>
                       </a:pPr>
                       <a:r>
-                        <a:rPr lang="en-US" sz="1400" dirty="0">
+                        <a:rPr lang="en-US" sz="1000" dirty="0">
                           <a:effectLst/>
                         </a:rPr>
                         <a:t>Test logs successfully viewed.</a:t>
@@ -11290,7 +11067,7 @@
                         <a:buAutoNum type="arabicPeriod"/>
                       </a:pPr>
                       <a:r>
-                        <a:rPr lang="en-US" sz="1400" dirty="0">
+                        <a:rPr lang="en-US" sz="1000" dirty="0">
                           <a:effectLst/>
                         </a:rPr>
                         <a:t>Test log archives successfully exported.</a:t>
@@ -11311,7 +11088,7 @@
                         <a:buAutoNum type="arabicPeriod"/>
                       </a:pPr>
                       <a:r>
-                        <a:rPr lang="en-US" sz="1400" dirty="0">
+                        <a:rPr lang="en-US" sz="1000" dirty="0">
                           <a:effectLst/>
                         </a:rPr>
                         <a:t>Login successful.</a:t>
@@ -11332,12 +11109,12 @@
                         <a:buAutoNum type="arabicPeriod"/>
                       </a:pPr>
                       <a:r>
-                        <a:rPr lang="en-US" sz="1400" dirty="0">
+                        <a:rPr lang="en-US" sz="1000" dirty="0">
                           <a:effectLst/>
                         </a:rPr>
                         <a:t>Logout successful.</a:t>
                       </a:r>
-                      <a:endParaRPr lang="en-US" sz="1400" dirty="0">
+                      <a:endParaRPr lang="en-US" sz="1000" dirty="0">
                         <a:effectLst/>
                         <a:latin typeface="Calibri" panose="020F0502020204030204" pitchFamily="34" charset="0"/>
                         <a:ea typeface="Calibri" panose="020F0502020204030204" pitchFamily="34" charset="0"/>
@@ -11347,8 +11124,13 @@
                   </a:txBody>
                   <a:tcPr marL="36195" marR="36195" marT="0" marB="0"/>
                 </a:tc>
+                <a:extLst>
+                  <a:ext uri="{0D108BD9-81ED-4DB2-BD59-A6C34878D82A}">
+                    <a16:rowId xmlns:a16="http://schemas.microsoft.com/office/drawing/2014/main" val="10005"/>
+                  </a:ext>
+                </a:extLst>
               </a:tr>
-              <a:tr h="1376711">
+              <a:tr h="1346553">
                 <a:tc>
                   <a:txBody>
                     <a:bodyPr/>
@@ -11366,23 +11148,23 @@
                         </a:spcAft>
                       </a:pPr>
                       <a:r>
-                        <a:rPr lang="en-US" sz="600">
+                        <a:rPr lang="en-US" sz="1000">
                           <a:effectLst/>
                         </a:rPr>
                         <a:t>Main </a:t>
                       </a:r>
                       <a:br>
-                        <a:rPr lang="en-US" sz="600">
+                        <a:rPr lang="en-US" sz="1000">
                           <a:effectLst/>
                         </a:rPr>
                       </a:br>
                       <a:r>
-                        <a:rPr lang="en-US" sz="600">
+                        <a:rPr lang="en-US" sz="1000">
                           <a:effectLst/>
                         </a:rPr>
                         <a:t>Success Scenario:</a:t>
                       </a:r>
-                      <a:endParaRPr lang="en-US" sz="600">
+                      <a:endParaRPr lang="en-US" sz="1000">
                         <a:effectLst/>
                         <a:latin typeface="Calibri" panose="020F0502020204030204" pitchFamily="34" charset="0"/>
                         <a:ea typeface="Calibri" panose="020F0502020204030204" pitchFamily="34" charset="0"/>
@@ -11411,7 +11193,7 @@
                         <a:buAutoNum type="arabicPeriod"/>
                       </a:pPr>
                       <a:r>
-                        <a:rPr lang="en-US" sz="1400" dirty="0">
+                        <a:rPr lang="en-US" sz="1000" dirty="0">
                           <a:effectLst/>
                         </a:rPr>
                         <a:t>Remote user logs into the system.</a:t>
@@ -11432,7 +11214,7 @@
                         <a:buAutoNum type="arabicPeriod"/>
                       </a:pPr>
                       <a:r>
-                        <a:rPr lang="en-US" sz="1400" dirty="0">
+                        <a:rPr lang="en-US" sz="1000" dirty="0">
                           <a:effectLst/>
                         </a:rPr>
                         <a:t>Remote user views test engine configurations.</a:t>
@@ -11453,7 +11235,7 @@
                         <a:buAutoNum type="arabicPeriod"/>
                       </a:pPr>
                       <a:r>
-                        <a:rPr lang="en-US" sz="1400" dirty="0">
+                        <a:rPr lang="en-US" sz="1000" dirty="0">
                           <a:effectLst/>
                         </a:rPr>
                         <a:t>Remote user selects platform capabilities and configures test engines.</a:t>
@@ -11474,7 +11256,7 @@
                         <a:buAutoNum type="arabicPeriod"/>
                       </a:pPr>
                       <a:r>
-                        <a:rPr lang="en-US" sz="1400" dirty="0">
+                        <a:rPr lang="en-US" sz="1000" dirty="0">
                           <a:effectLst/>
                         </a:rPr>
                         <a:t>Remote user runs test on test engines.</a:t>
@@ -11495,7 +11277,7 @@
                         <a:buAutoNum type="arabicPeriod"/>
                       </a:pPr>
                       <a:r>
-                        <a:rPr lang="en-US" sz="1400" dirty="0">
+                        <a:rPr lang="en-US" sz="1000" dirty="0">
                           <a:effectLst/>
                         </a:rPr>
                         <a:t>Remote user logs out.</a:t>
@@ -11514,7 +11296,7 @@
                         </a:spcAft>
                       </a:pPr>
                       <a:r>
-                        <a:rPr lang="en-US" sz="1400" dirty="0">
+                        <a:rPr lang="en-US" sz="1000" dirty="0">
                           <a:effectLst/>
                         </a:rPr>
                         <a:t> </a:t>
@@ -11533,12 +11315,12 @@
                         </a:spcAft>
                       </a:pPr>
                       <a:r>
-                        <a:rPr lang="en-US" sz="1400" dirty="0">
+                        <a:rPr lang="en-US" sz="1000" dirty="0">
                           <a:effectLst/>
                         </a:rPr>
                         <a:t>* Other operation supported, as mentioned, such as viewing and exporting log files. The “test run” scenario, however, is the main success scenario.</a:t>
                       </a:r>
-                      <a:endParaRPr lang="en-US" sz="1400" dirty="0">
+                      <a:endParaRPr lang="en-US" sz="1000" dirty="0">
                         <a:effectLst/>
                         <a:latin typeface="Calibri" panose="020F0502020204030204" pitchFamily="34" charset="0"/>
                         <a:ea typeface="Calibri" panose="020F0502020204030204" pitchFamily="34" charset="0"/>
@@ -11548,8 +11330,13 @@
                   </a:txBody>
                   <a:tcPr marL="36195" marR="36195" marT="0" marB="0"/>
                 </a:tc>
+                <a:extLst>
+                  <a:ext uri="{0D108BD9-81ED-4DB2-BD59-A6C34878D82A}">
+                    <a16:rowId xmlns:a16="http://schemas.microsoft.com/office/drawing/2014/main" val="10006"/>
+                  </a:ext>
+                </a:extLst>
               </a:tr>
-              <a:tr h="1064513">
+              <a:tr h="989158">
                 <a:tc>
                   <a:txBody>
                     <a:bodyPr/>
@@ -11567,12 +11354,12 @@
                         </a:spcAft>
                       </a:pPr>
                       <a:r>
-                        <a:rPr lang="en-US" sz="600">
+                        <a:rPr lang="en-US" sz="1000">
                           <a:effectLst/>
                         </a:rPr>
                         <a:t>Extensions:</a:t>
                       </a:r>
-                      <a:endParaRPr lang="en-US" sz="600">
+                      <a:endParaRPr lang="en-US" sz="1000">
                         <a:effectLst/>
                         <a:latin typeface="Calibri" panose="020F0502020204030204" pitchFamily="34" charset="0"/>
                         <a:ea typeface="Calibri" panose="020F0502020204030204" pitchFamily="34" charset="0"/>
@@ -11601,20 +11388,20 @@
                         <a:buAutoNum type="arabicPeriod"/>
                       </a:pPr>
                       <a:r>
-                        <a:rPr lang="en-US" sz="600">
+                        <a:rPr lang="en-US" sz="1000">
                           <a:effectLst/>
                         </a:rPr>
                         <a:t>The remote user’s login information is rejected by the web application. </a:t>
                       </a:r>
                       <a:r>
-                        <a:rPr lang="en-US" sz="600">
+                        <a:rPr lang="en-US" sz="1000">
                           <a:effectLst/>
                           <a:sym typeface="Wingdings" panose="05000000000000000000" pitchFamily="2" charset="2"/>
                         </a:rPr>
                         <a:t></a:t>
                       </a:r>
                       <a:r>
-                        <a:rPr lang="en-US" sz="600">
+                        <a:rPr lang="en-US" sz="1000">
                           <a:effectLst/>
                         </a:rPr>
                         <a:t> The remote user is presented with the login screen again.</a:t>
@@ -11635,20 +11422,20 @@
                         <a:buAutoNum type="arabicPeriod"/>
                       </a:pPr>
                       <a:r>
-                        <a:rPr lang="en-US" sz="600">
+                        <a:rPr lang="en-US" sz="1000">
                           <a:effectLst/>
                         </a:rPr>
                         <a:t>Test engines unavailable to execute. </a:t>
                       </a:r>
                       <a:r>
-                        <a:rPr lang="en-US" sz="600">
+                        <a:rPr lang="en-US" sz="1000">
                           <a:effectLst/>
                           <a:sym typeface="Wingdings" panose="05000000000000000000" pitchFamily="2" charset="2"/>
                         </a:rPr>
                         <a:t></a:t>
                       </a:r>
                       <a:r>
-                        <a:rPr lang="en-US" sz="600">
+                        <a:rPr lang="en-US" sz="1000">
                           <a:effectLst/>
                         </a:rPr>
                         <a:t> The test engine returns failure back to the Test Server.</a:t>
@@ -11669,20 +11456,20 @@
                         <a:buAutoNum type="arabicPeriod"/>
                       </a:pPr>
                       <a:r>
-                        <a:rPr lang="en-US" sz="600">
+                        <a:rPr lang="en-US" sz="1000">
                           <a:effectLst/>
                         </a:rPr>
                         <a:t>No test engines match the capabilities selected. </a:t>
                       </a:r>
                       <a:r>
-                        <a:rPr lang="en-US" sz="600">
+                        <a:rPr lang="en-US" sz="1000">
                           <a:effectLst/>
                           <a:sym typeface="Wingdings" panose="05000000000000000000" pitchFamily="2" charset="2"/>
                         </a:rPr>
                         <a:t></a:t>
                       </a:r>
                       <a:r>
-                        <a:rPr lang="en-US" sz="600">
+                        <a:rPr lang="en-US" sz="1000">
                           <a:effectLst/>
                         </a:rPr>
                         <a:t> Test engine prohibits test execute. Allows, test capabilities to be reset.</a:t>
@@ -11701,12 +11488,12 @@
                         </a:spcAft>
                       </a:pPr>
                       <a:r>
-                        <a:rPr lang="en-US" sz="600">
+                        <a:rPr lang="en-US" sz="1000">
                           <a:effectLst/>
                         </a:rPr>
                         <a:t> </a:t>
                       </a:r>
-                      <a:endParaRPr lang="en-US" sz="600">
+                      <a:endParaRPr lang="en-US" sz="1000">
                         <a:effectLst/>
                         <a:latin typeface="Calibri" panose="020F0502020204030204" pitchFamily="34" charset="0"/>
                         <a:ea typeface="Calibri" panose="020F0502020204030204" pitchFamily="34" charset="0"/>
@@ -11716,8 +11503,13 @@
                   </a:txBody>
                   <a:tcPr marL="36195" marR="36195" marT="0" marB="0"/>
                 </a:tc>
+                <a:extLst>
+                  <a:ext uri="{0D108BD9-81ED-4DB2-BD59-A6C34878D82A}">
+                    <a16:rowId xmlns:a16="http://schemas.microsoft.com/office/drawing/2014/main" val="10007"/>
+                  </a:ext>
+                </a:extLst>
               </a:tr>
-              <a:tr h="769908">
+              <a:tr h="592617">
                 <a:tc>
                   <a:txBody>
                     <a:bodyPr/>
@@ -11735,12 +11527,12 @@
                         </a:spcAft>
                       </a:pPr>
                       <a:r>
-                        <a:rPr lang="en-US" sz="600">
+                        <a:rPr lang="en-US" sz="1000">
                           <a:effectLst/>
                         </a:rPr>
                         <a:t>Priority:</a:t>
                       </a:r>
-                      <a:endParaRPr lang="en-US" sz="600">
+                      <a:endParaRPr lang="en-US" sz="1000">
                         <a:effectLst/>
                         <a:latin typeface="Calibri" panose="020F0502020204030204" pitchFamily="34" charset="0"/>
                         <a:ea typeface="Calibri" panose="020F0502020204030204" pitchFamily="34" charset="0"/>
@@ -11767,50 +11559,12 @@
                         </a:spcAft>
                       </a:pPr>
                       <a:r>
-                        <a:rPr lang="en-US" sz="600" dirty="0">
+                        <a:rPr lang="en-US" sz="1000" dirty="0">
                           <a:effectLst/>
                         </a:rPr>
                         <a:t>2</a:t>
                       </a:r>
-                    </a:p>
-                    <a:p>
-                      <a:pPr marL="0" marR="0">
-                        <a:lnSpc>
-                          <a:spcPct val="107000"/>
-                        </a:lnSpc>
-                        <a:spcBef>
-                          <a:spcPts val="0"/>
-                        </a:spcBef>
-                        <a:spcAft>
-                          <a:spcPts val="800"/>
-                        </a:spcAft>
-                      </a:pPr>
-                      <a:r>
-                        <a:rPr lang="en-US" sz="600" dirty="0">
-                          <a:effectLst/>
-                        </a:rPr>
-                        <a:t> </a:t>
-                      </a:r>
-                    </a:p>
-                    <a:p>
-                      <a:pPr marL="0" marR="0">
-                        <a:lnSpc>
-                          <a:spcPct val="107000"/>
-                        </a:lnSpc>
-                        <a:spcBef>
-                          <a:spcPts val="0"/>
-                        </a:spcBef>
-                        <a:spcAft>
-                          <a:spcPts val="800"/>
-                        </a:spcAft>
-                      </a:pPr>
-                      <a:r>
-                        <a:rPr lang="en-US" sz="600" dirty="0">
-                          <a:effectLst/>
-                        </a:rPr>
-                        <a:t> </a:t>
-                      </a:r>
-                      <a:endParaRPr lang="en-US" sz="600" dirty="0">
+                      <a:endParaRPr lang="en-US" sz="1000" dirty="0">
                         <a:effectLst/>
                         <a:latin typeface="Calibri" panose="020F0502020204030204" pitchFamily="34" charset="0"/>
                         <a:ea typeface="Calibri" panose="020F0502020204030204" pitchFamily="34" charset="0"/>
@@ -11820,6 +11574,11 @@
                   </a:txBody>
                   <a:tcPr marL="36195" marR="36195" marT="0" marB="0"/>
                 </a:tc>
+                <a:extLst>
+                  <a:ext uri="{0D108BD9-81ED-4DB2-BD59-A6C34878D82A}">
+                    <a16:rowId xmlns:a16="http://schemas.microsoft.com/office/drawing/2014/main" val="10008"/>
+                  </a:ext>
+                </a:extLst>
               </a:tr>
             </a:tbl>
           </a:graphicData>
@@ -11871,10 +11630,9 @@
           <a:lstStyle/>
           <a:p>
             <a:r>
-              <a:rPr lang="en-US" dirty="0" smtClean="0"/>
+              <a:rPr lang="en-US" dirty="0"/>
               <a:t>Remote User – Run Test</a:t>
             </a:r>
-            <a:endParaRPr lang="en-US" dirty="0"/>
           </a:p>
         </p:txBody>
       </p:sp>
@@ -11963,7 +11721,7 @@
           <a:graphicData uri="http://schemas.openxmlformats.org/presentationml/2006/ole">
             <mc:AlternateContent xmlns:mc="http://schemas.openxmlformats.org/markup-compatibility/2006">
               <mc:Choice xmlns:v="urn:schemas-microsoft-com:vml" Requires="v">
-                <p:oleObj spid="_x0000_s9222" name="Visio" r:id="rId3" imgW="6749898" imgH="5289535" progId="Visio.Drawing.15">
+                <p:oleObj spid="_x0000_s9225" name="Visio" r:id="rId3" imgW="6749898" imgH="5289535" progId="Visio.Drawing.15">
                   <p:embed/>
                 </p:oleObj>
               </mc:Choice>
@@ -12054,10 +11812,9 @@
           <a:lstStyle/>
           <a:p>
             <a:r>
-              <a:rPr lang="en-US" dirty="0" smtClean="0"/>
+              <a:rPr lang="en-US" dirty="0"/>
               <a:t>View and Configure Tests</a:t>
             </a:r>
-            <a:endParaRPr lang="en-US" dirty="0"/>
           </a:p>
         </p:txBody>
       </p:sp>
@@ -12146,7 +11903,7 @@
           <a:graphicData uri="http://schemas.openxmlformats.org/presentationml/2006/ole">
             <mc:AlternateContent xmlns:mc="http://schemas.openxmlformats.org/markup-compatibility/2006">
               <mc:Choice xmlns:v="urn:schemas-microsoft-com:vml" Requires="v">
-                <p:oleObj spid="_x0000_s10247" name="Visio" r:id="rId3" imgW="6699098" imgH="5816391" progId="Visio.Drawing.15">
+                <p:oleObj spid="_x0000_s10250" name="Visio" r:id="rId3" imgW="6699098" imgH="5816391" progId="Visio.Drawing.15">
                   <p:embed/>
                 </p:oleObj>
               </mc:Choice>
@@ -12237,10 +11994,9 @@
           <a:lstStyle/>
           <a:p>
             <a:r>
-              <a:rPr lang="en-US" dirty="0" smtClean="0"/>
+              <a:rPr lang="en-US" dirty="0"/>
               <a:t>View Archived Results</a:t>
             </a:r>
-            <a:endParaRPr lang="en-US" dirty="0"/>
           </a:p>
         </p:txBody>
       </p:sp>
@@ -12329,7 +12085,7 @@
           <a:graphicData uri="http://schemas.openxmlformats.org/presentationml/2006/ole">
             <mc:AlternateContent xmlns:mc="http://schemas.openxmlformats.org/markup-compatibility/2006">
               <mc:Choice xmlns:v="urn:schemas-microsoft-com:vml" Requires="v">
-                <p:oleObj spid="_x0000_s11272" name="Visio" r:id="rId3" imgW="5975299" imgH="4419376" progId="Visio.Drawing.15">
+                <p:oleObj spid="_x0000_s11275" name="Visio" r:id="rId3" imgW="5975299" imgH="4419376" progId="Visio.Drawing.15">
                   <p:embed/>
                 </p:oleObj>
               </mc:Choice>
@@ -12420,10 +12176,9 @@
           <a:lstStyle/>
           <a:p>
             <a:r>
-              <a:rPr lang="en-US" dirty="0" smtClean="0"/>
+              <a:rPr lang="en-US" dirty="0"/>
               <a:t>Remote User Export Test Results</a:t>
             </a:r>
-            <a:endParaRPr lang="en-US" dirty="0"/>
           </a:p>
         </p:txBody>
       </p:sp>
@@ -12512,7 +12267,7 @@
           <a:graphicData uri="http://schemas.openxmlformats.org/presentationml/2006/ole">
             <mc:AlternateContent xmlns:mc="http://schemas.openxmlformats.org/markup-compatibility/2006">
               <mc:Choice xmlns:v="urn:schemas-microsoft-com:vml" Requires="v">
-                <p:oleObj spid="_x0000_s12294" name="Visio" r:id="rId3" imgW="5975299" imgH="5860766" progId="Visio.Drawing.15">
+                <p:oleObj spid="_x0000_s12297" name="Visio" r:id="rId3" imgW="5975299" imgH="5860766" progId="Visio.Drawing.15">
                   <p:embed/>
                 </p:oleObj>
               </mc:Choice>
@@ -12612,10 +12367,9 @@
           <a:lstStyle/>
           <a:p>
             <a:r>
-              <a:rPr lang="en-US" dirty="0" smtClean="0"/>
+              <a:rPr lang="en-US" dirty="0"/>
               <a:t>Remote User Login</a:t>
             </a:r>
-            <a:endParaRPr lang="en-US" dirty="0"/>
           </a:p>
         </p:txBody>
       </p:sp>
@@ -12704,7 +12458,7 @@
           <a:graphicData uri="http://schemas.openxmlformats.org/presentationml/2006/ole">
             <mc:AlternateContent xmlns:mc="http://schemas.openxmlformats.org/markup-compatibility/2006">
               <mc:Choice xmlns:v="urn:schemas-microsoft-com:vml" Requires="v">
-                <p:oleObj spid="_x0000_s13320" name="Visio" r:id="rId3" imgW="6718198" imgH="5562645" progId="Visio.Drawing.15">
+                <p:oleObj spid="_x0000_s13323" name="Visio" r:id="rId3" imgW="6718198" imgH="5562645" progId="Visio.Drawing.15">
                   <p:embed/>
                 </p:oleObj>
               </mc:Choice>
@@ -12795,10 +12549,9 @@
           <a:lstStyle/>
           <a:p>
             <a:r>
-              <a:rPr lang="en-US" dirty="0" smtClean="0"/>
+              <a:rPr lang="en-US" dirty="0"/>
               <a:t>Remote Use: Activity Diagram</a:t>
             </a:r>
-            <a:endParaRPr lang="en-US" dirty="0"/>
           </a:p>
         </p:txBody>
       </p:sp>
@@ -12887,7 +12640,7 @@
           <a:graphicData uri="http://schemas.openxmlformats.org/presentationml/2006/ole">
             <mc:AlternateContent xmlns:mc="http://schemas.openxmlformats.org/markup-compatibility/2006">
               <mc:Choice xmlns:v="urn:schemas-microsoft-com:vml" Requires="v">
-                <p:oleObj spid="_x0000_s14344" name="Visio" r:id="rId3" imgW="8984086" imgH="5235129" progId="Visio.Drawing.15">
+                <p:oleObj spid="_x0000_s14347" name="Visio" r:id="rId3" imgW="8984086" imgH="5235129" progId="Visio.Drawing.15">
                   <p:embed/>
                 </p:oleObj>
               </mc:Choice>
@@ -12983,10 +12736,9 @@
           <a:lstStyle/>
           <a:p>
             <a:r>
-              <a:rPr lang="en-US" dirty="0" smtClean="0"/>
+              <a:rPr lang="en-US" dirty="0"/>
               <a:t>System Models: Use Case - Administrator</a:t>
             </a:r>
-            <a:endParaRPr lang="en-US" dirty="0"/>
           </a:p>
         </p:txBody>
       </p:sp>
@@ -13075,7 +12827,7 @@
           <a:graphicData uri="http://schemas.openxmlformats.org/presentationml/2006/ole">
             <mc:AlternateContent xmlns:mc="http://schemas.openxmlformats.org/markup-compatibility/2006">
               <mc:Choice xmlns:v="urn:schemas-microsoft-com:vml" Requires="v">
-                <p:oleObj spid="_x0000_s15365" name="Visio" r:id="rId3" imgW="4667213" imgH="5038832" progId="Visio.Drawing.15">
+                <p:oleObj spid="_x0000_s15368" name="Visio" r:id="rId3" imgW="4667213" imgH="5038832" progId="Visio.Drawing.15">
                   <p:embed/>
                 </p:oleObj>
               </mc:Choice>
@@ -13175,10 +12927,9 @@
           <a:lstStyle/>
           <a:p>
             <a:r>
-              <a:rPr lang="en-US" dirty="0" smtClean="0"/>
+              <a:rPr lang="en-US" dirty="0"/>
               <a:t>Administrator – Remove Users</a:t>
             </a:r>
-            <a:endParaRPr lang="en-US" dirty="0"/>
           </a:p>
         </p:txBody>
       </p:sp>
@@ -13267,7 +13018,7 @@
           <a:graphicData uri="http://schemas.openxmlformats.org/presentationml/2006/ole">
             <mc:AlternateContent xmlns:mc="http://schemas.openxmlformats.org/markup-compatibility/2006">
               <mc:Choice xmlns:v="urn:schemas-microsoft-com:vml" Requires="v">
-                <p:oleObj spid="_x0000_s16389" name="Visio" r:id="rId3" imgW="6164757" imgH="5554980" progId="Visio.Drawing.15">
+                <p:oleObj spid="_x0000_s16392" name="Visio" r:id="rId3" imgW="6164757" imgH="5554980" progId="Visio.Drawing.15">
                   <p:embed/>
                 </p:oleObj>
               </mc:Choice>
@@ -13552,10 +13303,9 @@
           <a:lstStyle/>
           <a:p>
             <a:r>
-              <a:rPr lang="en-US" dirty="0" smtClean="0"/>
+              <a:rPr lang="en-US" dirty="0"/>
               <a:t>Deregister a Test Engine</a:t>
             </a:r>
-            <a:endParaRPr lang="en-US" dirty="0"/>
           </a:p>
         </p:txBody>
       </p:sp>
@@ -13644,7 +13394,7 @@
           <a:graphicData uri="http://schemas.openxmlformats.org/presentationml/2006/ole">
             <mc:AlternateContent xmlns:mc="http://schemas.openxmlformats.org/markup-compatibility/2006">
               <mc:Choice xmlns:v="urn:schemas-microsoft-com:vml" Requires="v">
-                <p:oleObj spid="_x0000_s18437" name="Visio" r:id="rId3" imgW="6164757" imgH="5554980" progId="Visio.Drawing.15">
+                <p:oleObj spid="_x0000_s18440" name="Visio" r:id="rId3" imgW="6164757" imgH="5554980" progId="Visio.Drawing.15">
                   <p:embed/>
                 </p:oleObj>
               </mc:Choice>
@@ -13744,10 +13494,9 @@
           <a:lstStyle/>
           <a:p>
             <a:r>
-              <a:rPr lang="en-US" dirty="0" smtClean="0"/>
+              <a:rPr lang="en-US" dirty="0"/>
               <a:t>Administrator – Run Test</a:t>
             </a:r>
-            <a:endParaRPr lang="en-US" dirty="0"/>
           </a:p>
         </p:txBody>
       </p:sp>
@@ -13836,7 +13585,7 @@
           <a:graphicData uri="http://schemas.openxmlformats.org/presentationml/2006/ole">
             <mc:AlternateContent xmlns:mc="http://schemas.openxmlformats.org/markup-compatibility/2006">
               <mc:Choice xmlns:v="urn:schemas-microsoft-com:vml" Requires="v">
-                <p:oleObj spid="_x0000_s20485" name="Visio" r:id="rId3" imgW="6735938" imgH="5280519" progId="Visio.Drawing.15">
+                <p:oleObj spid="_x0000_s20488" name="Visio" r:id="rId3" imgW="6735938" imgH="5280519" progId="Visio.Drawing.15">
                   <p:embed/>
                 </p:oleObj>
               </mc:Choice>
@@ -13936,10 +13685,9 @@
           <a:lstStyle/>
           <a:p>
             <a:r>
-              <a:rPr lang="en-US" dirty="0" smtClean="0"/>
+              <a:rPr lang="en-US" dirty="0"/>
               <a:t>Administrator – View Archived Results</a:t>
             </a:r>
-            <a:endParaRPr lang="en-US" dirty="0"/>
           </a:p>
         </p:txBody>
       </p:sp>
@@ -14028,7 +13776,7 @@
           <a:graphicData uri="http://schemas.openxmlformats.org/presentationml/2006/ole">
             <mc:AlternateContent xmlns:mc="http://schemas.openxmlformats.org/markup-compatibility/2006">
               <mc:Choice xmlns:v="urn:schemas-microsoft-com:vml" Requires="v">
-                <p:oleObj spid="_x0000_s21509" name="Visio" r:id="rId3" imgW="6080973" imgH="4412169" progId="Visio.Drawing.15">
+                <p:oleObj spid="_x0000_s21512" name="Visio" r:id="rId3" imgW="6080973" imgH="4412169" progId="Visio.Drawing.15">
                   <p:embed/>
                 </p:oleObj>
               </mc:Choice>
@@ -14128,10 +13876,9 @@
           <a:lstStyle/>
           <a:p>
             <a:r>
-              <a:rPr lang="en-US" dirty="0" smtClean="0"/>
+              <a:rPr lang="en-US" dirty="0"/>
               <a:t>Administrator - Login</a:t>
             </a:r>
-            <a:endParaRPr lang="en-US" dirty="0"/>
           </a:p>
         </p:txBody>
       </p:sp>
@@ -14220,7 +13967,7 @@
           <a:graphicData uri="http://schemas.openxmlformats.org/presentationml/2006/ole">
             <mc:AlternateContent xmlns:mc="http://schemas.openxmlformats.org/markup-compatibility/2006">
               <mc:Choice xmlns:v="urn:schemas-microsoft-com:vml" Requires="v">
-                <p:oleObj spid="_x0000_s22533" name="Visio" r:id="rId3" imgW="6713397" imgH="5554980" progId="Visio.Drawing.15">
+                <p:oleObj spid="_x0000_s22536" name="Visio" r:id="rId3" imgW="6713397" imgH="5554980" progId="Visio.Drawing.15">
                   <p:embed/>
                 </p:oleObj>
               </mc:Choice>
@@ -14320,10 +14067,9 @@
           <a:lstStyle/>
           <a:p>
             <a:r>
-              <a:rPr lang="en-US" dirty="0" smtClean="0"/>
+              <a:rPr lang="en-US" dirty="0"/>
               <a:t>Administrator – View and Configure Tests</a:t>
             </a:r>
-            <a:endParaRPr lang="en-US" dirty="0"/>
           </a:p>
         </p:txBody>
       </p:sp>
@@ -14412,7 +14158,7 @@
           <a:graphicData uri="http://schemas.openxmlformats.org/presentationml/2006/ole">
             <mc:AlternateContent xmlns:mc="http://schemas.openxmlformats.org/markup-compatibility/2006">
               <mc:Choice xmlns:v="urn:schemas-microsoft-com:vml" Requires="v">
-                <p:oleObj spid="_x0000_s23557" name="Visio" r:id="rId3" imgW="6690431" imgH="5806534" progId="Visio.Drawing.15">
+                <p:oleObj spid="_x0000_s23560" name="Visio" r:id="rId3" imgW="6690431" imgH="5806534" progId="Visio.Drawing.15">
                   <p:embed/>
                 </p:oleObj>
               </mc:Choice>
@@ -14512,10 +14258,9 @@
           <a:lstStyle/>
           <a:p>
             <a:r>
-              <a:rPr lang="en-US" dirty="0" smtClean="0"/>
+              <a:rPr lang="en-US" dirty="0"/>
               <a:t>Administrator – Activity Diagram</a:t>
             </a:r>
-            <a:endParaRPr lang="en-US" dirty="0"/>
           </a:p>
         </p:txBody>
       </p:sp>
@@ -14604,7 +14349,7 @@
           <a:graphicData uri="http://schemas.openxmlformats.org/presentationml/2006/ole">
             <mc:AlternateContent xmlns:mc="http://schemas.openxmlformats.org/markup-compatibility/2006">
               <mc:Choice xmlns:v="urn:schemas-microsoft-com:vml" Requires="v">
-                <p:oleObj spid="_x0000_s24581" name="Visio" r:id="rId3" imgW="8984086" imgH="5943553" progId="Visio.Drawing.15">
+                <p:oleObj spid="_x0000_s24584" name="Visio" r:id="rId3" imgW="8984086" imgH="5943553" progId="Visio.Drawing.15">
                   <p:embed/>
                 </p:oleObj>
               </mc:Choice>
@@ -14727,17 +14472,13 @@
           <a:p>
             <a:r>
               <a:rPr lang="en-US" dirty="0"/>
-              <a:t>Questions</a:t>
-            </a:r>
-            <a:r>
-              <a:rPr lang="en-US" dirty="0" smtClean="0"/>
-              <a:t>?</a:t>
-            </a:r>
-          </a:p>
-          <a:p>
-            <a:r>
-              <a:rPr lang="en-US" dirty="0" smtClean="0"/>
               <a:t>Demo</a:t>
+            </a:r>
+          </a:p>
+          <a:p>
+            <a:r>
+              <a:rPr lang="en-US" dirty="0"/>
+              <a:t>Questions?</a:t>
             </a:r>
           </a:p>
           <a:p>
@@ -15245,10 +14986,9 @@
           <a:lstStyle/>
           <a:p>
             <a:r>
-              <a:rPr lang="en-US" dirty="0" smtClean="0"/>
+              <a:rPr lang="en-US" dirty="0"/>
               <a:t>Administrator – HA/DR Tests</a:t>
             </a:r>
-            <a:endParaRPr lang="en-US" dirty="0"/>
           </a:p>
         </p:txBody>
       </p:sp>
@@ -15337,7 +15077,7 @@
           <a:graphicData uri="http://schemas.openxmlformats.org/presentationml/2006/ole">
             <mc:AlternateContent xmlns:mc="http://schemas.openxmlformats.org/markup-compatibility/2006">
               <mc:Choice xmlns:v="urn:schemas-microsoft-com:vml" Requires="v">
-                <p:oleObj spid="_x0000_s17413" name="Visio" r:id="rId3" imgW="6393145" imgH="5554980" progId="Visio.Drawing.15">
+                <p:oleObj spid="_x0000_s17416" name="Visio" r:id="rId3" imgW="6393145" imgH="5554980" progId="Visio.Drawing.15">
                   <p:embed/>
                 </p:oleObj>
               </mc:Choice>
@@ -15442,10 +15182,9 @@
           <a:lstStyle/>
           <a:p>
             <a:r>
-              <a:rPr lang="en-US" dirty="0" smtClean="0"/>
+              <a:rPr lang="en-US" dirty="0"/>
               <a:t>Administrator – Configure/Update Settings</a:t>
             </a:r>
-            <a:endParaRPr lang="en-US" dirty="0"/>
           </a:p>
         </p:txBody>
       </p:sp>
@@ -15534,7 +15273,7 @@
           <a:graphicData uri="http://schemas.openxmlformats.org/presentationml/2006/ole">
             <mc:AlternateContent xmlns:mc="http://schemas.openxmlformats.org/markup-compatibility/2006">
               <mc:Choice xmlns:v="urn:schemas-microsoft-com:vml" Requires="v">
-                <p:oleObj spid="_x0000_s19461" name="Visio" r:id="rId3" imgW="6164757" imgH="5554980" progId="Visio.Drawing.15">
+                <p:oleObj spid="_x0000_s19464" name="Visio" r:id="rId3" imgW="6164757" imgH="5554980" progId="Visio.Drawing.15">
                   <p:embed/>
                 </p:oleObj>
               </mc:Choice>

</xml_diff>

<commit_message>
Update presentation and add DLH-07
</commit_message>
<xml_diff>
--- a/Test Framework Final Presentation.pptx
+++ b/Test Framework Final Presentation.pptx
@@ -60,12 +60,15 @@
     <p:sldId id="319" r:id="rId54"/>
     <p:sldId id="320" r:id="rId55"/>
     <p:sldId id="321" r:id="rId56"/>
-    <p:sldId id="273" r:id="rId57"/>
-    <p:sldId id="274" r:id="rId58"/>
-    <p:sldId id="276" r:id="rId59"/>
-    <p:sldId id="277" r:id="rId60"/>
-    <p:sldId id="314" r:id="rId61"/>
-    <p:sldId id="316" r:id="rId62"/>
+    <p:sldId id="322" r:id="rId57"/>
+    <p:sldId id="323" r:id="rId58"/>
+    <p:sldId id="324" r:id="rId59"/>
+    <p:sldId id="273" r:id="rId60"/>
+    <p:sldId id="274" r:id="rId61"/>
+    <p:sldId id="276" r:id="rId62"/>
+    <p:sldId id="277" r:id="rId63"/>
+    <p:sldId id="314" r:id="rId64"/>
+    <p:sldId id="316" r:id="rId65"/>
   </p:sldIdLst>
   <p:sldSz cx="12192000" cy="6858000"/>
   <p:notesSz cx="6858000" cy="9144000"/>
@@ -918,7 +921,7 @@
             <a:fld id="{B61BEF0D-F0BB-DE4B-95CE-6DB70DBA9567}" type="datetimeFigureOut">
               <a:rPr lang="en-US" dirty="0"/>
               <a:pPr/>
-              <a:t>9/8/2020</a:t>
+              <a:t>9/9/2020</a:t>
             </a:fld>
             <a:endParaRPr lang="en-US" dirty="0"/>
           </a:p>
@@ -1166,7 +1169,7 @@
             <a:fld id="{B61BEF0D-F0BB-DE4B-95CE-6DB70DBA9567}" type="datetimeFigureOut">
               <a:rPr lang="en-US" dirty="0"/>
               <a:pPr/>
-              <a:t>9/8/2020</a:t>
+              <a:t>9/9/2020</a:t>
             </a:fld>
             <a:endParaRPr lang="en-US" dirty="0"/>
           </a:p>
@@ -1477,7 +1480,7 @@
             <a:fld id="{B61BEF0D-F0BB-DE4B-95CE-6DB70DBA9567}" type="datetimeFigureOut">
               <a:rPr lang="en-US" dirty="0"/>
               <a:pPr/>
-              <a:t>9/8/2020</a:t>
+              <a:t>9/9/2020</a:t>
             </a:fld>
             <a:endParaRPr lang="en-US" dirty="0"/>
           </a:p>
@@ -1807,7 +1810,7 @@
             <a:fld id="{B61BEF0D-F0BB-DE4B-95CE-6DB70DBA9567}" type="datetimeFigureOut">
               <a:rPr lang="en-US" dirty="0"/>
               <a:pPr/>
-              <a:t>9/8/2020</a:t>
+              <a:t>9/9/2020</a:t>
             </a:fld>
             <a:endParaRPr lang="en-US" dirty="0"/>
           </a:p>
@@ -2118,7 +2121,7 @@
             <a:fld id="{B61BEF0D-F0BB-DE4B-95CE-6DB70DBA9567}" type="datetimeFigureOut">
               <a:rPr lang="en-US" dirty="0"/>
               <a:pPr/>
-              <a:t>9/8/2020</a:t>
+              <a:t>9/9/2020</a:t>
             </a:fld>
             <a:endParaRPr lang="en-US" dirty="0"/>
           </a:p>
@@ -2508,7 +2511,7 @@
             <a:fld id="{B61BEF0D-F0BB-DE4B-95CE-6DB70DBA9567}" type="datetimeFigureOut">
               <a:rPr lang="en-US" dirty="0"/>
               <a:pPr/>
-              <a:t>9/8/2020</a:t>
+              <a:t>9/9/2020</a:t>
             </a:fld>
             <a:endParaRPr lang="en-US" dirty="0"/>
           </a:p>
@@ -2674,7 +2677,7 @@
           <a:p>
             <a:fld id="{55C6B4A9-1611-4792-9094-5F34BCA07E0B}" type="datetimeFigureOut">
               <a:rPr lang="en-US" dirty="0"/>
-              <a:t>9/8/2020</a:t>
+              <a:t>9/9/2020</a:t>
             </a:fld>
             <a:endParaRPr lang="en-US" dirty="0"/>
           </a:p>
@@ -2850,7 +2853,7 @@
             <a:fld id="{B61BEF0D-F0BB-DE4B-95CE-6DB70DBA9567}" type="datetimeFigureOut">
               <a:rPr lang="en-US" dirty="0"/>
               <a:pPr/>
-              <a:t>9/8/2020</a:t>
+              <a:t>9/9/2020</a:t>
             </a:fld>
             <a:endParaRPr lang="en-US" dirty="0"/>
           </a:p>
@@ -3016,7 +3019,7 @@
           <a:p>
             <a:fld id="{42A54C80-263E-416B-A8E0-580EDEADCBDC}" type="datetimeFigureOut">
               <a:rPr lang="en-US" dirty="0"/>
-              <a:t>9/8/2020</a:t>
+              <a:t>9/9/2020</a:t>
             </a:fld>
             <a:endParaRPr lang="en-US" dirty="0"/>
           </a:p>
@@ -3259,7 +3262,7 @@
             <a:fld id="{B61BEF0D-F0BB-DE4B-95CE-6DB70DBA9567}" type="datetimeFigureOut">
               <a:rPr lang="en-US" dirty="0"/>
               <a:pPr/>
-              <a:t>9/8/2020</a:t>
+              <a:t>9/9/2020</a:t>
             </a:fld>
             <a:endParaRPr lang="en-US" dirty="0"/>
           </a:p>
@@ -3487,7 +3490,7 @@
           <a:p>
             <a:fld id="{42A54C80-263E-416B-A8E0-580EDEADCBDC}" type="datetimeFigureOut">
               <a:rPr lang="en-US" dirty="0"/>
-              <a:t>9/8/2020</a:t>
+              <a:t>9/9/2020</a:t>
             </a:fld>
             <a:endParaRPr lang="en-US" dirty="0"/>
           </a:p>
@@ -3857,7 +3860,7 @@
             <a:fld id="{B61BEF0D-F0BB-DE4B-95CE-6DB70DBA9567}" type="datetimeFigureOut">
               <a:rPr lang="en-US" dirty="0"/>
               <a:pPr/>
-              <a:t>9/8/2020</a:t>
+              <a:t>9/9/2020</a:t>
             </a:fld>
             <a:endParaRPr lang="en-US" dirty="0"/>
           </a:p>
@@ -3977,7 +3980,7 @@
             <a:fld id="{B61BEF0D-F0BB-DE4B-95CE-6DB70DBA9567}" type="datetimeFigureOut">
               <a:rPr lang="en-US" dirty="0"/>
               <a:pPr/>
-              <a:t>9/8/2020</a:t>
+              <a:t>9/9/2020</a:t>
             </a:fld>
             <a:endParaRPr lang="en-US" dirty="0"/>
           </a:p>
@@ -4069,7 +4072,7 @@
             <a:fld id="{B61BEF0D-F0BB-DE4B-95CE-6DB70DBA9567}" type="datetimeFigureOut">
               <a:rPr lang="en-US" dirty="0"/>
               <a:pPr/>
-              <a:t>9/8/2020</a:t>
+              <a:t>9/9/2020</a:t>
             </a:fld>
             <a:endParaRPr lang="en-US" dirty="0"/>
           </a:p>
@@ -4320,7 +4323,7 @@
           <a:p>
             <a:fld id="{42A54C80-263E-416B-A8E0-580EDEADCBDC}" type="datetimeFigureOut">
               <a:rPr lang="en-US" dirty="0"/>
-              <a:t>9/8/2020</a:t>
+              <a:t>9/9/2020</a:t>
             </a:fld>
             <a:endParaRPr lang="en-US" dirty="0"/>
           </a:p>
@@ -4622,7 +4625,7 @@
             <a:fld id="{B61BEF0D-F0BB-DE4B-95CE-6DB70DBA9567}" type="datetimeFigureOut">
               <a:rPr lang="en-US" dirty="0"/>
               <a:pPr/>
-              <a:t>9/8/2020</a:t>
+              <a:t>9/9/2020</a:t>
             </a:fld>
             <a:endParaRPr lang="en-US" dirty="0"/>
           </a:p>
@@ -5320,7 +5323,7 @@
             <a:fld id="{B61BEF0D-F0BB-DE4B-95CE-6DB70DBA9567}" type="datetimeFigureOut">
               <a:rPr lang="en-US" dirty="0"/>
               <a:pPr/>
-              <a:t>9/8/2020</a:t>
+              <a:t>9/9/2020</a:t>
             </a:fld>
             <a:endParaRPr lang="en-US" dirty="0"/>
           </a:p>
@@ -6147,7 +6150,7 @@
           <p:cNvPr id="2" name="Title 1">
             <a:extLst>
               <a:ext uri="{FF2B5EF4-FFF2-40B4-BE49-F238E27FC236}">
-                <a16:creationId xmlns:a16="http://schemas.microsoft.com/office/drawing/2014/main" id="{3016A5BA-F72A-4CD9-AF4C-68ADAC202004}"/>
+                <a16:creationId xmlns:a16="http://schemas.microsoft.com/office/drawing/2014/main" xmlns="" id="{3016A5BA-F72A-4CD9-AF4C-68ADAC202004}"/>
               </a:ext>
             </a:extLst>
           </p:cNvPr>
@@ -6175,7 +6178,7 @@
           <p:cNvPr id="3" name="Content Placeholder 2">
             <a:extLst>
               <a:ext uri="{FF2B5EF4-FFF2-40B4-BE49-F238E27FC236}">
-                <a16:creationId xmlns:a16="http://schemas.microsoft.com/office/drawing/2014/main" id="{BAC61804-0702-4E9C-9632-1F546949E17F}"/>
+                <a16:creationId xmlns:a16="http://schemas.microsoft.com/office/drawing/2014/main" xmlns="" id="{BAC61804-0702-4E9C-9632-1F546949E17F}"/>
               </a:ext>
             </a:extLst>
           </p:cNvPr>
@@ -7754,7 +7757,7 @@
           <a:graphicData uri="http://schemas.openxmlformats.org/presentationml/2006/ole">
             <mc:AlternateContent xmlns:mc="http://schemas.openxmlformats.org/markup-compatibility/2006">
               <mc:Choice xmlns:v="urn:schemas-microsoft-com:vml" Requires="v">
-                <p:oleObj spid="_x0000_s1038" name="Visio" r:id="rId3" imgW="7657994" imgH="4595001" progId="Visio.Drawing.15">
+                <p:oleObj spid="_x0000_s1040" name="Visio" r:id="rId3" imgW="7657994" imgH="4595001" progId="Visio.Drawing.15">
                   <p:embed/>
                 </p:oleObj>
               </mc:Choice>
@@ -8122,7 +8125,7 @@
           <a:graphicData uri="http://schemas.openxmlformats.org/presentationml/2006/ole">
             <mc:AlternateContent xmlns:mc="http://schemas.openxmlformats.org/markup-compatibility/2006">
               <mc:Choice xmlns:v="urn:schemas-microsoft-com:vml" Requires="v">
-                <p:oleObj spid="_x0000_s2064" name="Visio" r:id="rId3" imgW="9349846" imgH="6446661" progId="Visio.Drawing.15">
+                <p:oleObj spid="_x0000_s2066" name="Visio" r:id="rId3" imgW="9349846" imgH="6446661" progId="Visio.Drawing.15">
                   <p:embed/>
                 </p:oleObj>
               </mc:Choice>
@@ -8598,7 +8601,7 @@
           <p:cNvPr id="6" name="Picture 5">
             <a:extLst>
               <a:ext uri="{FF2B5EF4-FFF2-40B4-BE49-F238E27FC236}">
-                <a16:creationId xmlns:a16="http://schemas.microsoft.com/office/drawing/2014/main" id="{2CE94564-7E21-42B5-B0C3-7B175B692FB4}"/>
+                <a16:creationId xmlns:a16="http://schemas.microsoft.com/office/drawing/2014/main" xmlns="" id="{2CE94564-7E21-42B5-B0C3-7B175B692FB4}"/>
               </a:ext>
             </a:extLst>
           </p:cNvPr>
@@ -8628,7 +8631,7 @@
           <p:cNvPr id="8" name="Picture 7">
             <a:extLst>
               <a:ext uri="{FF2B5EF4-FFF2-40B4-BE49-F238E27FC236}">
-                <a16:creationId xmlns:a16="http://schemas.microsoft.com/office/drawing/2014/main" id="{9A5C1814-5B60-480F-9900-D25FA371C13D}"/>
+                <a16:creationId xmlns:a16="http://schemas.microsoft.com/office/drawing/2014/main" xmlns="" id="{9A5C1814-5B60-480F-9900-D25FA371C13D}"/>
               </a:ext>
             </a:extLst>
           </p:cNvPr>
@@ -8738,7 +8741,7 @@
           <a:graphicData uri="http://schemas.openxmlformats.org/presentationml/2006/ole">
             <mc:AlternateContent xmlns:mc="http://schemas.openxmlformats.org/markup-compatibility/2006">
               <mc:Choice xmlns:v="urn:schemas-microsoft-com:vml" Requires="v">
-                <p:oleObj spid="_x0000_s3086" name="Visio" r:id="rId5" imgW="4667213" imgH="5038832" progId="Visio.Drawing.15">
+                <p:oleObj spid="_x0000_s3088" name="Visio" r:id="rId5" imgW="4667213" imgH="5038832" progId="Visio.Drawing.15">
                   <p:embed/>
                 </p:oleObj>
               </mc:Choice>
@@ -8922,7 +8925,7 @@
           <a:graphicData uri="http://schemas.openxmlformats.org/presentationml/2006/ole">
             <mc:AlternateContent xmlns:mc="http://schemas.openxmlformats.org/markup-compatibility/2006">
               <mc:Choice xmlns:v="urn:schemas-microsoft-com:vml" Requires="v">
-                <p:oleObj spid="_x0000_s4109" name="Visio" r:id="rId3" imgW="6749898" imgH="5289535" progId="Visio.Drawing.15">
+                <p:oleObj spid="_x0000_s4111" name="Visio" r:id="rId3" imgW="6749898" imgH="5289535" progId="Visio.Drawing.15">
                   <p:embed/>
                 </p:oleObj>
               </mc:Choice>
@@ -9226,7 +9229,7 @@
           <a:graphicData uri="http://schemas.openxmlformats.org/presentationml/2006/ole">
             <mc:AlternateContent xmlns:mc="http://schemas.openxmlformats.org/markup-compatibility/2006">
               <mc:Choice xmlns:v="urn:schemas-microsoft-com:vml" Requires="v">
-                <p:oleObj spid="_x0000_s5131" name="Visio" r:id="rId3" imgW="13167360" imgH="8610537" progId="Visio.Drawing.15">
+                <p:oleObj spid="_x0000_s5133" name="Visio" r:id="rId3" imgW="13167360" imgH="8610537" progId="Visio.Drawing.15">
                   <p:embed/>
                 </p:oleObj>
               </mc:Choice>
@@ -9748,7 +9751,7 @@
           <a:graphicData uri="http://schemas.openxmlformats.org/presentationml/2006/ole">
             <mc:AlternateContent xmlns:mc="http://schemas.openxmlformats.org/markup-compatibility/2006">
               <mc:Choice xmlns:v="urn:schemas-microsoft-com:vml" Requires="v">
-                <p:oleObj spid="_x0000_s6159" name="Visio" r:id="rId3" imgW="5210104" imgH="3724541" progId="Visio.Drawing.15">
+                <p:oleObj spid="_x0000_s6161" name="Visio" r:id="rId3" imgW="5210104" imgH="3724541" progId="Visio.Drawing.15">
                   <p:embed/>
                 </p:oleObj>
               </mc:Choice>
@@ -10099,8 +10102,12 @@
           <a:lstStyle/>
           <a:p>
             <a:r>
-              <a:rPr lang="en-US" dirty="0"/>
-              <a:t>Export Test Results</a:t>
+              <a:rPr lang="en-US" dirty="0" smtClean="0"/>
+              <a:t>Local User - Export </a:t>
+            </a:r>
+            <a:r>
+              <a:rPr lang="en-US" dirty="0"/>
+              <a:t>Test Results</a:t>
             </a:r>
           </a:p>
         </p:txBody>
@@ -10285,7 +10292,7 @@
           <p:cNvPr id="6" name="Picture 5">
             <a:extLst>
               <a:ext uri="{FF2B5EF4-FFF2-40B4-BE49-F238E27FC236}">
-                <a16:creationId xmlns:a16="http://schemas.microsoft.com/office/drawing/2014/main" id="{42F62902-0B99-45F6-8313-405C7CFCB586}"/>
+                <a16:creationId xmlns:a16="http://schemas.microsoft.com/office/drawing/2014/main" xmlns="" id="{42F62902-0B99-45F6-8313-405C7CFCB586}"/>
               </a:ext>
             </a:extLst>
           </p:cNvPr>
@@ -10447,7 +10454,7 @@
           <a:graphicData uri="http://schemas.openxmlformats.org/presentationml/2006/ole">
             <mc:AlternateContent xmlns:mc="http://schemas.openxmlformats.org/markup-compatibility/2006">
               <mc:Choice xmlns:v="urn:schemas-microsoft-com:vml" Requires="v">
-                <p:oleObj spid="_x0000_s7177" name="Visio" r:id="rId3" imgW="5549798" imgH="3727121" progId="Visio.Drawing.15">
+                <p:oleObj spid="_x0000_s7179" name="Visio" r:id="rId3" imgW="5549798" imgH="3727121" progId="Visio.Drawing.15">
                   <p:embed/>
                 </p:oleObj>
               </mc:Choice>
@@ -10539,7 +10546,7 @@
         </p:nvGraphicFramePr>
         <p:xfrm>
           <a:off x="501291" y="270367"/>
-          <a:ext cx="9419949" cy="6076801"/>
+          <a:ext cx="9419949" cy="6084992"/>
         </p:xfrm>
         <a:graphic>
           <a:graphicData uri="http://schemas.openxmlformats.org/drawingml/2006/table">
@@ -10551,14 +10558,14 @@
                 <a:gridCol w="1534570">
                   <a:extLst>
                     <a:ext uri="{9D8B030D-6E8A-4147-A177-3AD203B41FA5}">
-                      <a16:colId xmlns:a16="http://schemas.microsoft.com/office/drawing/2014/main" val="20000"/>
+                      <a16:colId xmlns:a16="http://schemas.microsoft.com/office/drawing/2014/main" xmlns="" val="20000"/>
                     </a:ext>
                   </a:extLst>
                 </a:gridCol>
                 <a:gridCol w="7885379">
                   <a:extLst>
                     <a:ext uri="{9D8B030D-6E8A-4147-A177-3AD203B41FA5}">
-                      <a16:colId xmlns:a16="http://schemas.microsoft.com/office/drawing/2014/main" val="20001"/>
+                      <a16:colId xmlns:a16="http://schemas.microsoft.com/office/drawing/2014/main" xmlns="" val="20001"/>
                     </a:ext>
                   </a:extLst>
                 </a:gridCol>
@@ -10630,7 +10637,7 @@
                 </a:tc>
                 <a:extLst>
                   <a:ext uri="{0D108BD9-81ED-4DB2-BD59-A6C34878D82A}">
-                    <a16:rowId xmlns:a16="http://schemas.microsoft.com/office/drawing/2014/main" val="10000"/>
+                    <a16:rowId xmlns:a16="http://schemas.microsoft.com/office/drawing/2014/main" xmlns="" val="10000"/>
                   </a:ext>
                 </a:extLst>
               </a:tr>
@@ -10695,7 +10702,7 @@
                 </a:tc>
                 <a:extLst>
                   <a:ext uri="{0D108BD9-81ED-4DB2-BD59-A6C34878D82A}">
-                    <a16:rowId xmlns:a16="http://schemas.microsoft.com/office/drawing/2014/main" val="10001"/>
+                    <a16:rowId xmlns:a16="http://schemas.microsoft.com/office/drawing/2014/main" xmlns="" val="10001"/>
                   </a:ext>
                 </a:extLst>
               </a:tr>
@@ -10766,7 +10773,7 @@
                 </a:tc>
                 <a:extLst>
                   <a:ext uri="{0D108BD9-81ED-4DB2-BD59-A6C34878D82A}">
-                    <a16:rowId xmlns:a16="http://schemas.microsoft.com/office/drawing/2014/main" val="10002"/>
+                    <a16:rowId xmlns:a16="http://schemas.microsoft.com/office/drawing/2014/main" xmlns="" val="10002"/>
                   </a:ext>
                 </a:extLst>
               </a:tr>
@@ -10837,7 +10844,7 @@
                 </a:tc>
                 <a:extLst>
                   <a:ext uri="{0D108BD9-81ED-4DB2-BD59-A6C34878D82A}">
-                    <a16:rowId xmlns:a16="http://schemas.microsoft.com/office/drawing/2014/main" val="10003"/>
+                    <a16:rowId xmlns:a16="http://schemas.microsoft.com/office/drawing/2014/main" xmlns="" val="10003"/>
                   </a:ext>
                 </a:extLst>
               </a:tr>
@@ -10908,7 +10915,7 @@
                 </a:tc>
                 <a:extLst>
                   <a:ext uri="{0D108BD9-81ED-4DB2-BD59-A6C34878D82A}">
-                    <a16:rowId xmlns:a16="http://schemas.microsoft.com/office/drawing/2014/main" val="10004"/>
+                    <a16:rowId xmlns:a16="http://schemas.microsoft.com/office/drawing/2014/main" xmlns="" val="10004"/>
                   </a:ext>
                 </a:extLst>
               </a:tr>
@@ -11126,7 +11133,7 @@
                 </a:tc>
                 <a:extLst>
                   <a:ext uri="{0D108BD9-81ED-4DB2-BD59-A6C34878D82A}">
-                    <a16:rowId xmlns:a16="http://schemas.microsoft.com/office/drawing/2014/main" val="10005"/>
+                    <a16:rowId xmlns:a16="http://schemas.microsoft.com/office/drawing/2014/main" xmlns="" val="10005"/>
                   </a:ext>
                 </a:extLst>
               </a:tr>
@@ -11332,7 +11339,7 @@
                 </a:tc>
                 <a:extLst>
                   <a:ext uri="{0D108BD9-81ED-4DB2-BD59-A6C34878D82A}">
-                    <a16:rowId xmlns:a16="http://schemas.microsoft.com/office/drawing/2014/main" val="10006"/>
+                    <a16:rowId xmlns:a16="http://schemas.microsoft.com/office/drawing/2014/main" xmlns="" val="10006"/>
                   </a:ext>
                 </a:extLst>
               </a:tr>
@@ -11505,7 +11512,7 @@
                 </a:tc>
                 <a:extLst>
                   <a:ext uri="{0D108BD9-81ED-4DB2-BD59-A6C34878D82A}">
-                    <a16:rowId xmlns:a16="http://schemas.microsoft.com/office/drawing/2014/main" val="10007"/>
+                    <a16:rowId xmlns:a16="http://schemas.microsoft.com/office/drawing/2014/main" xmlns="" val="10007"/>
                   </a:ext>
                 </a:extLst>
               </a:tr>
@@ -11576,7 +11583,7 @@
                 </a:tc>
                 <a:extLst>
                   <a:ext uri="{0D108BD9-81ED-4DB2-BD59-A6C34878D82A}">
-                    <a16:rowId xmlns:a16="http://schemas.microsoft.com/office/drawing/2014/main" val="10008"/>
+                    <a16:rowId xmlns:a16="http://schemas.microsoft.com/office/drawing/2014/main" xmlns="" val="10008"/>
                   </a:ext>
                 </a:extLst>
               </a:tr>
@@ -11721,7 +11728,7 @@
           <a:graphicData uri="http://schemas.openxmlformats.org/presentationml/2006/ole">
             <mc:AlternateContent xmlns:mc="http://schemas.openxmlformats.org/markup-compatibility/2006">
               <mc:Choice xmlns:v="urn:schemas-microsoft-com:vml" Requires="v">
-                <p:oleObj spid="_x0000_s9225" name="Visio" r:id="rId3" imgW="6749898" imgH="5289535" progId="Visio.Drawing.15">
+                <p:oleObj spid="_x0000_s9227" name="Visio" r:id="rId3" imgW="6749898" imgH="5289535" progId="Visio.Drawing.15">
                   <p:embed/>
                 </p:oleObj>
               </mc:Choice>
@@ -11812,8 +11819,12 @@
           <a:lstStyle/>
           <a:p>
             <a:r>
-              <a:rPr lang="en-US" dirty="0"/>
-              <a:t>View and Configure Tests</a:t>
+              <a:rPr lang="en-US" dirty="0" smtClean="0"/>
+              <a:t>Remote User - View </a:t>
+            </a:r>
+            <a:r>
+              <a:rPr lang="en-US" dirty="0"/>
+              <a:t>and Configure Tests</a:t>
             </a:r>
           </a:p>
         </p:txBody>
@@ -11903,7 +11914,7 @@
           <a:graphicData uri="http://schemas.openxmlformats.org/presentationml/2006/ole">
             <mc:AlternateContent xmlns:mc="http://schemas.openxmlformats.org/markup-compatibility/2006">
               <mc:Choice xmlns:v="urn:schemas-microsoft-com:vml" Requires="v">
-                <p:oleObj spid="_x0000_s10250" name="Visio" r:id="rId3" imgW="6699098" imgH="5816391" progId="Visio.Drawing.15">
+                <p:oleObj spid="_x0000_s10252" name="Visio" r:id="rId3" imgW="6699098" imgH="5816391" progId="Visio.Drawing.15">
                   <p:embed/>
                 </p:oleObj>
               </mc:Choice>
@@ -11994,8 +12005,12 @@
           <a:lstStyle/>
           <a:p>
             <a:r>
-              <a:rPr lang="en-US" dirty="0"/>
-              <a:t>View Archived Results</a:t>
+              <a:rPr lang="en-US" dirty="0" smtClean="0"/>
+              <a:t>Remote User - View </a:t>
+            </a:r>
+            <a:r>
+              <a:rPr lang="en-US" dirty="0"/>
+              <a:t>Archived Results</a:t>
             </a:r>
           </a:p>
         </p:txBody>
@@ -12085,7 +12100,7 @@
           <a:graphicData uri="http://schemas.openxmlformats.org/presentationml/2006/ole">
             <mc:AlternateContent xmlns:mc="http://schemas.openxmlformats.org/markup-compatibility/2006">
               <mc:Choice xmlns:v="urn:schemas-microsoft-com:vml" Requires="v">
-                <p:oleObj spid="_x0000_s11275" name="Visio" r:id="rId3" imgW="5975299" imgH="4419376" progId="Visio.Drawing.15">
+                <p:oleObj spid="_x0000_s11277" name="Visio" r:id="rId3" imgW="5975299" imgH="4419376" progId="Visio.Drawing.15">
                   <p:embed/>
                 </p:oleObj>
               </mc:Choice>
@@ -12267,7 +12282,7 @@
           <a:graphicData uri="http://schemas.openxmlformats.org/presentationml/2006/ole">
             <mc:AlternateContent xmlns:mc="http://schemas.openxmlformats.org/markup-compatibility/2006">
               <mc:Choice xmlns:v="urn:schemas-microsoft-com:vml" Requires="v">
-                <p:oleObj spid="_x0000_s12297" name="Visio" r:id="rId3" imgW="5975299" imgH="5860766" progId="Visio.Drawing.15">
+                <p:oleObj spid="_x0000_s12299" name="Visio" r:id="rId3" imgW="5975299" imgH="5860766" progId="Visio.Drawing.15">
                   <p:embed/>
                 </p:oleObj>
               </mc:Choice>
@@ -12458,7 +12473,7 @@
           <a:graphicData uri="http://schemas.openxmlformats.org/presentationml/2006/ole">
             <mc:AlternateContent xmlns:mc="http://schemas.openxmlformats.org/markup-compatibility/2006">
               <mc:Choice xmlns:v="urn:schemas-microsoft-com:vml" Requires="v">
-                <p:oleObj spid="_x0000_s13323" name="Visio" r:id="rId3" imgW="6718198" imgH="5562645" progId="Visio.Drawing.15">
+                <p:oleObj spid="_x0000_s13325" name="Visio" r:id="rId3" imgW="6718198" imgH="5562645" progId="Visio.Drawing.15">
                   <p:embed/>
                 </p:oleObj>
               </mc:Choice>
@@ -12640,7 +12655,7 @@
           <a:graphicData uri="http://schemas.openxmlformats.org/presentationml/2006/ole">
             <mc:AlternateContent xmlns:mc="http://schemas.openxmlformats.org/markup-compatibility/2006">
               <mc:Choice xmlns:v="urn:schemas-microsoft-com:vml" Requires="v">
-                <p:oleObj spid="_x0000_s14347" name="Visio" r:id="rId3" imgW="8984086" imgH="5235129" progId="Visio.Drawing.15">
+                <p:oleObj spid="_x0000_s14349" name="Visio" r:id="rId3" imgW="8984086" imgH="5235129" progId="Visio.Drawing.15">
                   <p:embed/>
                 </p:oleObj>
               </mc:Choice>
@@ -12827,7 +12842,7 @@
           <a:graphicData uri="http://schemas.openxmlformats.org/presentationml/2006/ole">
             <mc:AlternateContent xmlns:mc="http://schemas.openxmlformats.org/markup-compatibility/2006">
               <mc:Choice xmlns:v="urn:schemas-microsoft-com:vml" Requires="v">
-                <p:oleObj spid="_x0000_s15368" name="Visio" r:id="rId3" imgW="4667213" imgH="5038832" progId="Visio.Drawing.15">
+                <p:oleObj spid="_x0000_s15370" name="Visio" r:id="rId3" imgW="4667213" imgH="5038832" progId="Visio.Drawing.15">
                   <p:embed/>
                 </p:oleObj>
               </mc:Choice>
@@ -12996,38 +13011,101 @@
           </a:p>
         </p:txBody>
       </p:sp>
+      <p:sp>
+        <p:nvSpPr>
+          <p:cNvPr id="3" name="Rectangle 11"/>
+          <p:cNvSpPr>
+            <a:spLocks noChangeArrowheads="1"/>
+          </p:cNvSpPr>
+          <p:nvPr/>
+        </p:nvSpPr>
+        <p:spPr bwMode="auto">
+          <a:xfrm>
+            <a:off x="1763487" y="1248699"/>
+            <a:ext cx="12749164" cy="45719"/>
+          </a:xfrm>
+          <a:prstGeom prst="rect">
+            <a:avLst/>
+          </a:prstGeom>
+          <a:noFill/>
+          <a:ln>
+            <a:noFill/>
+          </a:ln>
+          <a:effectLst/>
+          <a:extLst>
+            <a:ext uri="{909E8E84-426E-40DD-AFC4-6F175D3DCCD1}">
+              <a14:hiddenFill xmlns:a14="http://schemas.microsoft.com/office/drawing/2010/main">
+                <a:solidFill>
+                  <a:schemeClr val="accent1"/>
+                </a:solidFill>
+              </a14:hiddenFill>
+            </a:ext>
+            <a:ext uri="{91240B29-F687-4F45-9708-019B960494DF}">
+              <a14:hiddenLine xmlns:a14="http://schemas.microsoft.com/office/drawing/2010/main" w="9525">
+                <a:solidFill>
+                  <a:schemeClr val="tx1"/>
+                </a:solidFill>
+                <a:miter lim="800000"/>
+                <a:headEnd/>
+                <a:tailEnd/>
+              </a14:hiddenLine>
+            </a:ext>
+            <a:ext uri="{AF507438-7753-43E0-B8FC-AC1667EBCBE1}">
+              <a14:hiddenEffects xmlns:a14="http://schemas.microsoft.com/office/drawing/2010/main">
+                <a:effectLst>
+                  <a:outerShdw dist="35921" dir="2700000" algn="ctr" rotWithShape="0">
+                    <a:schemeClr val="bg2"/>
+                  </a:outerShdw>
+                </a:effectLst>
+              </a14:hiddenEffects>
+            </a:ext>
+          </a:extLst>
+        </p:spPr>
+        <p:txBody>
+          <a:bodyPr vert="horz" wrap="square" lIns="91440" tIns="45720" rIns="91440" bIns="45720" numCol="1" anchor="ctr" anchorCtr="0" compatLnSpc="1">
+            <a:prstTxWarp prst="textNoShape">
+              <a:avLst/>
+            </a:prstTxWarp>
+            <a:spAutoFit/>
+          </a:bodyPr>
+          <a:lstStyle/>
+          <a:p>
+            <a:endParaRPr lang="en-US"/>
+          </a:p>
+        </p:txBody>
+      </p:sp>
       <p:graphicFrame>
         <p:nvGraphicFramePr>
-          <p:cNvPr id="5" name="Object 4"/>
+          <p:cNvPr id="6" name="Object 5"/>
           <p:cNvGraphicFramePr>
             <a:graphicFrameLocks noChangeAspect="1"/>
           </p:cNvGraphicFramePr>
           <p:nvPr>
             <p:extLst>
               <p:ext uri="{D42A27DB-BD31-4B8C-83A1-F6EECF244321}">
-                <p14:modId xmlns:p14="http://schemas.microsoft.com/office/powerpoint/2010/main" val="400054858"/>
+                <p14:modId xmlns:p14="http://schemas.microsoft.com/office/powerpoint/2010/main" val="2826387855"/>
               </p:ext>
             </p:extLst>
           </p:nvPr>
         </p:nvGraphicFramePr>
         <p:xfrm>
-          <a:off x="1656272" y="1388853"/>
-          <a:ext cx="5943600" cy="5356225"/>
+          <a:off x="1763487" y="1248700"/>
+          <a:ext cx="6223518" cy="5609300"/>
         </p:xfrm>
         <a:graphic>
           <a:graphicData uri="http://schemas.openxmlformats.org/presentationml/2006/ole">
             <mc:AlternateContent xmlns:mc="http://schemas.openxmlformats.org/markup-compatibility/2006">
               <mc:Choice xmlns:v="urn:schemas-microsoft-com:vml" Requires="v">
-                <p:oleObj spid="_x0000_s16392" name="Visio" r:id="rId3" imgW="6164757" imgH="5554980" progId="Visio.Drawing.15">
+                <p:oleObj spid="_x0000_s16396" name="Visio" r:id="rId3" imgW="6172290" imgH="5562533" progId="Visio.Drawing.15">
                   <p:embed/>
                 </p:oleObj>
               </mc:Choice>
               <mc:Fallback>
-                <p:oleObj name="Visio" r:id="rId3" imgW="6164757" imgH="5554980" progId="Visio.Drawing.15">
+                <p:oleObj name="Visio" r:id="rId3" imgW="6172290" imgH="5562533" progId="Visio.Drawing.15">
                   <p:embed/>
                   <p:pic>
                     <p:nvPicPr>
-                      <p:cNvPr id="0" name="Object 1"/>
+                      <p:cNvPr id="0" name="Object 10"/>
                       <p:cNvPicPr>
                         <a:picLocks noChangeAspect="1" noChangeArrowheads="1"/>
                       </p:cNvPicPr>
@@ -13048,22 +13126,13 @@
                     </p:blipFill>
                     <p:spPr bwMode="auto">
                       <a:xfrm>
-                        <a:off x="1656272" y="1388853"/>
-                        <a:ext cx="5943600" cy="5356225"/>
+                        <a:off x="1763487" y="1248700"/>
+                        <a:ext cx="6223518" cy="5609300"/>
                       </a:xfrm>
                       <a:prstGeom prst="rect">
                         <a:avLst/>
                       </a:prstGeom>
                       <a:noFill/>
-                      <a:extLst>
-                        <a:ext uri="{909E8E84-426E-40DD-AFC4-6F175D3DCCD1}">
-                          <a14:hiddenFill xmlns:a14="http://schemas.microsoft.com/office/drawing/2010/main">
-                            <a:solidFill>
-                              <a:srgbClr val="FFFFFF"/>
-                            </a:solidFill>
-                          </a14:hiddenFill>
-                        </a:ext>
-                      </a:extLst>
                     </p:spPr>
                   </p:pic>
                 </p:oleObj>
@@ -13303,8 +13372,12 @@
           <a:lstStyle/>
           <a:p>
             <a:r>
-              <a:rPr lang="en-US" dirty="0"/>
-              <a:t>Deregister a Test Engine</a:t>
+              <a:rPr lang="en-US" dirty="0" smtClean="0"/>
+              <a:t>Administrator - Deregister </a:t>
+            </a:r>
+            <a:r>
+              <a:rPr lang="en-US" dirty="0"/>
+              <a:t>a Test Engine</a:t>
             </a:r>
           </a:p>
         </p:txBody>
@@ -13372,38 +13445,101 @@
           </a:p>
         </p:txBody>
       </p:sp>
+      <p:sp>
+        <p:nvSpPr>
+          <p:cNvPr id="3" name="Rectangle 10"/>
+          <p:cNvSpPr>
+            <a:spLocks noChangeArrowheads="1"/>
+          </p:cNvSpPr>
+          <p:nvPr/>
+        </p:nvSpPr>
+        <p:spPr bwMode="auto">
+          <a:xfrm>
+            <a:off x="1698170" y="1181420"/>
+            <a:ext cx="12902079" cy="45719"/>
+          </a:xfrm>
+          <a:prstGeom prst="rect">
+            <a:avLst/>
+          </a:prstGeom>
+          <a:noFill/>
+          <a:ln>
+            <a:noFill/>
+          </a:ln>
+          <a:effectLst/>
+          <a:extLst>
+            <a:ext uri="{909E8E84-426E-40DD-AFC4-6F175D3DCCD1}">
+              <a14:hiddenFill xmlns:a14="http://schemas.microsoft.com/office/drawing/2010/main">
+                <a:solidFill>
+                  <a:schemeClr val="accent1"/>
+                </a:solidFill>
+              </a14:hiddenFill>
+            </a:ext>
+            <a:ext uri="{91240B29-F687-4F45-9708-019B960494DF}">
+              <a14:hiddenLine xmlns:a14="http://schemas.microsoft.com/office/drawing/2010/main" w="9525">
+                <a:solidFill>
+                  <a:schemeClr val="tx1"/>
+                </a:solidFill>
+                <a:miter lim="800000"/>
+                <a:headEnd/>
+                <a:tailEnd/>
+              </a14:hiddenLine>
+            </a:ext>
+            <a:ext uri="{AF507438-7753-43E0-B8FC-AC1667EBCBE1}">
+              <a14:hiddenEffects xmlns:a14="http://schemas.microsoft.com/office/drawing/2010/main">
+                <a:effectLst>
+                  <a:outerShdw dist="35921" dir="2700000" algn="ctr" rotWithShape="0">
+                    <a:schemeClr val="bg2"/>
+                  </a:outerShdw>
+                </a:effectLst>
+              </a14:hiddenEffects>
+            </a:ext>
+          </a:extLst>
+        </p:spPr>
+        <p:txBody>
+          <a:bodyPr vert="horz" wrap="square" lIns="91440" tIns="45720" rIns="91440" bIns="45720" numCol="1" anchor="ctr" anchorCtr="0" compatLnSpc="1">
+            <a:prstTxWarp prst="textNoShape">
+              <a:avLst/>
+            </a:prstTxWarp>
+            <a:spAutoFit/>
+          </a:bodyPr>
+          <a:lstStyle/>
+          <a:p>
+            <a:endParaRPr lang="en-US"/>
+          </a:p>
+        </p:txBody>
+      </p:sp>
       <p:graphicFrame>
         <p:nvGraphicFramePr>
-          <p:cNvPr id="5" name="Object 4"/>
+          <p:cNvPr id="6" name="Object 5"/>
           <p:cNvGraphicFramePr>
             <a:graphicFrameLocks noChangeAspect="1"/>
           </p:cNvGraphicFramePr>
           <p:nvPr>
             <p:extLst>
               <p:ext uri="{D42A27DB-BD31-4B8C-83A1-F6EECF244321}">
-                <p14:modId xmlns:p14="http://schemas.microsoft.com/office/powerpoint/2010/main" val="132997759"/>
+                <p14:modId xmlns:p14="http://schemas.microsoft.com/office/powerpoint/2010/main" val="2163739983"/>
               </p:ext>
             </p:extLst>
           </p:nvPr>
         </p:nvGraphicFramePr>
         <p:xfrm>
-          <a:off x="1768415" y="1388853"/>
-          <a:ext cx="5943600" cy="5356225"/>
+          <a:off x="1698171" y="1181421"/>
+          <a:ext cx="6298164" cy="5676579"/>
         </p:xfrm>
         <a:graphic>
           <a:graphicData uri="http://schemas.openxmlformats.org/presentationml/2006/ole">
             <mc:AlternateContent xmlns:mc="http://schemas.openxmlformats.org/markup-compatibility/2006">
               <mc:Choice xmlns:v="urn:schemas-microsoft-com:vml" Requires="v">
-                <p:oleObj spid="_x0000_s18440" name="Visio" r:id="rId3" imgW="6164757" imgH="5554980" progId="Visio.Drawing.15">
+                <p:oleObj spid="_x0000_s18444" name="Visio" r:id="rId3" imgW="6172290" imgH="5562533" progId="Visio.Drawing.15">
                   <p:embed/>
                 </p:oleObj>
               </mc:Choice>
               <mc:Fallback>
-                <p:oleObj name="Visio" r:id="rId3" imgW="6164757" imgH="5554980" progId="Visio.Drawing.15">
+                <p:oleObj name="Visio" r:id="rId3" imgW="6172290" imgH="5562533" progId="Visio.Drawing.15">
                   <p:embed/>
                   <p:pic>
                     <p:nvPicPr>
-                      <p:cNvPr id="0" name="Object 1"/>
+                      <p:cNvPr id="0" name="Object 9"/>
                       <p:cNvPicPr>
                         <a:picLocks noChangeAspect="1" noChangeArrowheads="1"/>
                       </p:cNvPicPr>
@@ -13424,22 +13560,13 @@
                     </p:blipFill>
                     <p:spPr bwMode="auto">
                       <a:xfrm>
-                        <a:off x="1768415" y="1388853"/>
-                        <a:ext cx="5943600" cy="5356225"/>
+                        <a:off x="1698171" y="1181421"/>
+                        <a:ext cx="6298164" cy="5676579"/>
                       </a:xfrm>
                       <a:prstGeom prst="rect">
                         <a:avLst/>
                       </a:prstGeom>
                       <a:noFill/>
-                      <a:extLst>
-                        <a:ext uri="{909E8E84-426E-40DD-AFC4-6F175D3DCCD1}">
-                          <a14:hiddenFill xmlns:a14="http://schemas.microsoft.com/office/drawing/2010/main">
-                            <a:solidFill>
-                              <a:srgbClr val="FFFFFF"/>
-                            </a:solidFill>
-                          </a14:hiddenFill>
-                        </a:ext>
-                      </a:extLst>
                     </p:spPr>
                   </p:pic>
                 </p:oleObj>
@@ -13572,20 +13699,20 @@
           <p:nvPr>
             <p:extLst>
               <p:ext uri="{D42A27DB-BD31-4B8C-83A1-F6EECF244321}">
-                <p14:modId xmlns:p14="http://schemas.microsoft.com/office/powerpoint/2010/main" val="922201400"/>
+                <p14:modId xmlns:p14="http://schemas.microsoft.com/office/powerpoint/2010/main" val="3188236132"/>
               </p:ext>
             </p:extLst>
           </p:nvPr>
         </p:nvGraphicFramePr>
         <p:xfrm>
-          <a:off x="1820174" y="1725283"/>
-          <a:ext cx="5943600" cy="4656138"/>
+          <a:off x="1190036" y="1231641"/>
+          <a:ext cx="6765224" cy="5299788"/>
         </p:xfrm>
         <a:graphic>
           <a:graphicData uri="http://schemas.openxmlformats.org/presentationml/2006/ole">
             <mc:AlternateContent xmlns:mc="http://schemas.openxmlformats.org/markup-compatibility/2006">
               <mc:Choice xmlns:v="urn:schemas-microsoft-com:vml" Requires="v">
-                <p:oleObj spid="_x0000_s20488" name="Visio" r:id="rId3" imgW="6735938" imgH="5280519" progId="Visio.Drawing.15">
+                <p:oleObj spid="_x0000_s20490" name="Visio" r:id="rId3" imgW="6735938" imgH="5280519" progId="Visio.Drawing.15">
                   <p:embed/>
                 </p:oleObj>
               </mc:Choice>
@@ -13615,22 +13742,14 @@
                     </p:blipFill>
                     <p:spPr bwMode="auto">
                       <a:xfrm>
-                        <a:off x="1820174" y="1725283"/>
-                        <a:ext cx="5943600" cy="4656138"/>
+                        <a:off x="1190036" y="1231641"/>
+                        <a:ext cx="6765224" cy="5299788"/>
                       </a:xfrm>
                       <a:prstGeom prst="rect">
                         <a:avLst/>
                       </a:prstGeom>
                       <a:noFill/>
-                      <a:extLst>
-                        <a:ext uri="{909E8E84-426E-40DD-AFC4-6F175D3DCCD1}">
-                          <a14:hiddenFill xmlns:a14="http://schemas.microsoft.com/office/drawing/2010/main">
-                            <a:solidFill>
-                              <a:srgbClr val="FFFFFF"/>
-                            </a:solidFill>
-                          </a14:hiddenFill>
-                        </a:ext>
-                      </a:extLst>
+                      <a:extLst/>
                     </p:spPr>
                   </p:pic>
                 </p:oleObj>
@@ -13754,38 +13873,101 @@
           </a:p>
         </p:txBody>
       </p:sp>
+      <p:sp>
+        <p:nvSpPr>
+          <p:cNvPr id="7" name="Rectangle 12"/>
+          <p:cNvSpPr>
+            <a:spLocks noChangeArrowheads="1"/>
+          </p:cNvSpPr>
+          <p:nvPr/>
+        </p:nvSpPr>
+        <p:spPr bwMode="auto">
+          <a:xfrm>
+            <a:off x="1265162" y="1586203"/>
+            <a:ext cx="14132909" cy="45719"/>
+          </a:xfrm>
+          <a:prstGeom prst="rect">
+            <a:avLst/>
+          </a:prstGeom>
+          <a:noFill/>
+          <a:ln>
+            <a:noFill/>
+          </a:ln>
+          <a:effectLst/>
+          <a:extLst>
+            <a:ext uri="{909E8E84-426E-40DD-AFC4-6F175D3DCCD1}">
+              <a14:hiddenFill xmlns:a14="http://schemas.microsoft.com/office/drawing/2010/main">
+                <a:solidFill>
+                  <a:schemeClr val="accent1"/>
+                </a:solidFill>
+              </a14:hiddenFill>
+            </a:ext>
+            <a:ext uri="{91240B29-F687-4F45-9708-019B960494DF}">
+              <a14:hiddenLine xmlns:a14="http://schemas.microsoft.com/office/drawing/2010/main" w="9525">
+                <a:solidFill>
+                  <a:schemeClr val="tx1"/>
+                </a:solidFill>
+                <a:miter lim="800000"/>
+                <a:headEnd/>
+                <a:tailEnd/>
+              </a14:hiddenLine>
+            </a:ext>
+            <a:ext uri="{AF507438-7753-43E0-B8FC-AC1667EBCBE1}">
+              <a14:hiddenEffects xmlns:a14="http://schemas.microsoft.com/office/drawing/2010/main">
+                <a:effectLst>
+                  <a:outerShdw dist="35921" dir="2700000" algn="ctr" rotWithShape="0">
+                    <a:schemeClr val="bg2"/>
+                  </a:outerShdw>
+                </a:effectLst>
+              </a14:hiddenEffects>
+            </a:ext>
+          </a:extLst>
+        </p:spPr>
+        <p:txBody>
+          <a:bodyPr vert="horz" wrap="square" lIns="91440" tIns="45720" rIns="91440" bIns="45720" numCol="1" anchor="ctr" anchorCtr="0" compatLnSpc="1">
+            <a:prstTxWarp prst="textNoShape">
+              <a:avLst/>
+            </a:prstTxWarp>
+            <a:spAutoFit/>
+          </a:bodyPr>
+          <a:lstStyle/>
+          <a:p>
+            <a:endParaRPr lang="en-US"/>
+          </a:p>
+        </p:txBody>
+      </p:sp>
       <p:graphicFrame>
         <p:nvGraphicFramePr>
-          <p:cNvPr id="5" name="Object 4"/>
+          <p:cNvPr id="8" name="Object 7"/>
           <p:cNvGraphicFramePr>
             <a:graphicFrameLocks noChangeAspect="1"/>
           </p:cNvGraphicFramePr>
           <p:nvPr>
             <p:extLst>
               <p:ext uri="{D42A27DB-BD31-4B8C-83A1-F6EECF244321}">
-                <p14:modId xmlns:p14="http://schemas.microsoft.com/office/powerpoint/2010/main" val="2097049266"/>
+                <p14:modId xmlns:p14="http://schemas.microsoft.com/office/powerpoint/2010/main" val="1865324362"/>
               </p:ext>
             </p:extLst>
           </p:nvPr>
         </p:nvGraphicFramePr>
         <p:xfrm>
-          <a:off x="1987061" y="1930400"/>
-          <a:ext cx="5943600" cy="4313238"/>
+          <a:off x="1265163" y="1586204"/>
+          <a:ext cx="7251140" cy="5271796"/>
         </p:xfrm>
         <a:graphic>
           <a:graphicData uri="http://schemas.openxmlformats.org/presentationml/2006/ole">
             <mc:AlternateContent xmlns:mc="http://schemas.openxmlformats.org/markup-compatibility/2006">
               <mc:Choice xmlns:v="urn:schemas-microsoft-com:vml" Requires="v">
-                <p:oleObj spid="_x0000_s21512" name="Visio" r:id="rId3" imgW="6080973" imgH="4412169" progId="Visio.Drawing.15">
+                <p:oleObj spid="_x0000_s21518" name="Visio" r:id="rId3" imgW="6086419" imgH="4419813" progId="Visio.Drawing.15">
                   <p:embed/>
                 </p:oleObj>
               </mc:Choice>
               <mc:Fallback>
-                <p:oleObj name="Visio" r:id="rId3" imgW="6080973" imgH="4412169" progId="Visio.Drawing.15">
+                <p:oleObj name="Visio" r:id="rId3" imgW="6086419" imgH="4419813" progId="Visio.Drawing.15">
                   <p:embed/>
                   <p:pic>
                     <p:nvPicPr>
-                      <p:cNvPr id="0" name="Object 1"/>
+                      <p:cNvPr id="0" name="Object 11"/>
                       <p:cNvPicPr>
                         <a:picLocks noChangeAspect="1" noChangeArrowheads="1"/>
                       </p:cNvPicPr>
@@ -13806,22 +13988,13 @@
                     </p:blipFill>
                     <p:spPr bwMode="auto">
                       <a:xfrm>
-                        <a:off x="1987061" y="1930400"/>
-                        <a:ext cx="5943600" cy="4313238"/>
+                        <a:off x="1265163" y="1586204"/>
+                        <a:ext cx="7251140" cy="5271796"/>
                       </a:xfrm>
                       <a:prstGeom prst="rect">
                         <a:avLst/>
                       </a:prstGeom>
                       <a:noFill/>
-                      <a:extLst>
-                        <a:ext uri="{909E8E84-426E-40DD-AFC4-6F175D3DCCD1}">
-                          <a14:hiddenFill xmlns:a14="http://schemas.microsoft.com/office/drawing/2010/main">
-                            <a:solidFill>
-                              <a:srgbClr val="FFFFFF"/>
-                            </a:solidFill>
-                          </a14:hiddenFill>
-                        </a:ext>
-                      </a:extLst>
                     </p:spPr>
                   </p:pic>
                 </p:oleObj>
@@ -13945,38 +14118,101 @@
           </a:p>
         </p:txBody>
       </p:sp>
+      <p:sp>
+        <p:nvSpPr>
+          <p:cNvPr id="7" name="Rectangle 12"/>
+          <p:cNvSpPr>
+            <a:spLocks noChangeArrowheads="1"/>
+          </p:cNvSpPr>
+          <p:nvPr/>
+        </p:nvSpPr>
+        <p:spPr bwMode="auto">
+          <a:xfrm>
+            <a:off x="1511560" y="1371599"/>
+            <a:ext cx="13129844" cy="45719"/>
+          </a:xfrm>
+          <a:prstGeom prst="rect">
+            <a:avLst/>
+          </a:prstGeom>
+          <a:noFill/>
+          <a:ln>
+            <a:noFill/>
+          </a:ln>
+          <a:effectLst/>
+          <a:extLst>
+            <a:ext uri="{909E8E84-426E-40DD-AFC4-6F175D3DCCD1}">
+              <a14:hiddenFill xmlns:a14="http://schemas.microsoft.com/office/drawing/2010/main">
+                <a:solidFill>
+                  <a:schemeClr val="accent1"/>
+                </a:solidFill>
+              </a14:hiddenFill>
+            </a:ext>
+            <a:ext uri="{91240B29-F687-4F45-9708-019B960494DF}">
+              <a14:hiddenLine xmlns:a14="http://schemas.microsoft.com/office/drawing/2010/main" w="9525">
+                <a:solidFill>
+                  <a:schemeClr val="tx1"/>
+                </a:solidFill>
+                <a:miter lim="800000"/>
+                <a:headEnd/>
+                <a:tailEnd/>
+              </a14:hiddenLine>
+            </a:ext>
+            <a:ext uri="{AF507438-7753-43E0-B8FC-AC1667EBCBE1}">
+              <a14:hiddenEffects xmlns:a14="http://schemas.microsoft.com/office/drawing/2010/main">
+                <a:effectLst>
+                  <a:outerShdw dist="35921" dir="2700000" algn="ctr" rotWithShape="0">
+                    <a:schemeClr val="bg2"/>
+                  </a:outerShdw>
+                </a:effectLst>
+              </a14:hiddenEffects>
+            </a:ext>
+          </a:extLst>
+        </p:spPr>
+        <p:txBody>
+          <a:bodyPr vert="horz" wrap="square" lIns="91440" tIns="45720" rIns="91440" bIns="45720" numCol="1" anchor="ctr" anchorCtr="0" compatLnSpc="1">
+            <a:prstTxWarp prst="textNoShape">
+              <a:avLst/>
+            </a:prstTxWarp>
+            <a:spAutoFit/>
+          </a:bodyPr>
+          <a:lstStyle/>
+          <a:p>
+            <a:endParaRPr lang="en-US"/>
+          </a:p>
+        </p:txBody>
+      </p:sp>
       <p:graphicFrame>
         <p:nvGraphicFramePr>
-          <p:cNvPr id="5" name="Object 4"/>
+          <p:cNvPr id="8" name="Object 7"/>
           <p:cNvGraphicFramePr>
             <a:graphicFrameLocks noChangeAspect="1"/>
           </p:cNvGraphicFramePr>
           <p:nvPr>
             <p:extLst>
               <p:ext uri="{D42A27DB-BD31-4B8C-83A1-F6EECF244321}">
-                <p14:modId xmlns:p14="http://schemas.microsoft.com/office/powerpoint/2010/main" val="1351717495"/>
+                <p14:modId xmlns:p14="http://schemas.microsoft.com/office/powerpoint/2010/main" val="3839018449"/>
               </p:ext>
             </p:extLst>
           </p:nvPr>
         </p:nvGraphicFramePr>
         <p:xfrm>
-          <a:off x="1768415" y="1742535"/>
-          <a:ext cx="5943600" cy="4914900"/>
+          <a:off x="1511559" y="1371599"/>
+          <a:ext cx="6400799" cy="5301517"/>
         </p:xfrm>
         <a:graphic>
           <a:graphicData uri="http://schemas.openxmlformats.org/presentationml/2006/ole">
             <mc:AlternateContent xmlns:mc="http://schemas.openxmlformats.org/markup-compatibility/2006">
               <mc:Choice xmlns:v="urn:schemas-microsoft-com:vml" Requires="v">
-                <p:oleObj spid="_x0000_s22536" name="Visio" r:id="rId3" imgW="6713397" imgH="5554980" progId="Visio.Drawing.15">
+                <p:oleObj spid="_x0000_s22542" name="Visio" r:id="rId3" imgW="6715181" imgH="5562533" progId="Visio.Drawing.15">
                   <p:embed/>
                 </p:oleObj>
               </mc:Choice>
               <mc:Fallback>
-                <p:oleObj name="Visio" r:id="rId3" imgW="6713397" imgH="5554980" progId="Visio.Drawing.15">
+                <p:oleObj name="Visio" r:id="rId3" imgW="6715181" imgH="5562533" progId="Visio.Drawing.15">
                   <p:embed/>
                   <p:pic>
                     <p:nvPicPr>
-                      <p:cNvPr id="0" name="Object 1"/>
+                      <p:cNvPr id="0" name="Object 11"/>
                       <p:cNvPicPr>
                         <a:picLocks noChangeAspect="1" noChangeArrowheads="1"/>
                       </p:cNvPicPr>
@@ -13997,22 +14233,13 @@
                     </p:blipFill>
                     <p:spPr bwMode="auto">
                       <a:xfrm>
-                        <a:off x="1768415" y="1742535"/>
-                        <a:ext cx="5943600" cy="4914900"/>
+                        <a:off x="1511559" y="1371599"/>
+                        <a:ext cx="6400799" cy="5301517"/>
                       </a:xfrm>
                       <a:prstGeom prst="rect">
                         <a:avLst/>
                       </a:prstGeom>
                       <a:noFill/>
-                      <a:extLst>
-                        <a:ext uri="{909E8E84-426E-40DD-AFC4-6F175D3DCCD1}">
-                          <a14:hiddenFill xmlns:a14="http://schemas.microsoft.com/office/drawing/2010/main">
-                            <a:solidFill>
-                              <a:srgbClr val="FFFFFF"/>
-                            </a:solidFill>
-                          </a14:hiddenFill>
-                        </a:ext>
-                      </a:extLst>
                     </p:spPr>
                   </p:pic>
                 </p:oleObj>
@@ -14136,38 +14363,101 @@
           </a:p>
         </p:txBody>
       </p:sp>
+      <p:sp>
+        <p:nvSpPr>
+          <p:cNvPr id="3" name="Rectangle 10"/>
+          <p:cNvSpPr>
+            <a:spLocks noChangeArrowheads="1"/>
+          </p:cNvSpPr>
+          <p:nvPr/>
+        </p:nvSpPr>
+        <p:spPr bwMode="auto">
+          <a:xfrm>
+            <a:off x="1595533" y="1423241"/>
+            <a:ext cx="12842751" cy="45719"/>
+          </a:xfrm>
+          <a:prstGeom prst="rect">
+            <a:avLst/>
+          </a:prstGeom>
+          <a:noFill/>
+          <a:ln>
+            <a:noFill/>
+          </a:ln>
+          <a:effectLst/>
+          <a:extLst>
+            <a:ext uri="{909E8E84-426E-40DD-AFC4-6F175D3DCCD1}">
+              <a14:hiddenFill xmlns:a14="http://schemas.microsoft.com/office/drawing/2010/main">
+                <a:solidFill>
+                  <a:schemeClr val="accent1"/>
+                </a:solidFill>
+              </a14:hiddenFill>
+            </a:ext>
+            <a:ext uri="{91240B29-F687-4F45-9708-019B960494DF}">
+              <a14:hiddenLine xmlns:a14="http://schemas.microsoft.com/office/drawing/2010/main" w="9525">
+                <a:solidFill>
+                  <a:schemeClr val="tx1"/>
+                </a:solidFill>
+                <a:miter lim="800000"/>
+                <a:headEnd/>
+                <a:tailEnd/>
+              </a14:hiddenLine>
+            </a:ext>
+            <a:ext uri="{AF507438-7753-43E0-B8FC-AC1667EBCBE1}">
+              <a14:hiddenEffects xmlns:a14="http://schemas.microsoft.com/office/drawing/2010/main">
+                <a:effectLst>
+                  <a:outerShdw dist="35921" dir="2700000" algn="ctr" rotWithShape="0">
+                    <a:schemeClr val="bg2"/>
+                  </a:outerShdw>
+                </a:effectLst>
+              </a14:hiddenEffects>
+            </a:ext>
+          </a:extLst>
+        </p:spPr>
+        <p:txBody>
+          <a:bodyPr vert="horz" wrap="square" lIns="91440" tIns="45720" rIns="91440" bIns="45720" numCol="1" anchor="ctr" anchorCtr="0" compatLnSpc="1">
+            <a:prstTxWarp prst="textNoShape">
+              <a:avLst/>
+            </a:prstTxWarp>
+            <a:spAutoFit/>
+          </a:bodyPr>
+          <a:lstStyle/>
+          <a:p>
+            <a:endParaRPr lang="en-US"/>
+          </a:p>
+        </p:txBody>
+      </p:sp>
       <p:graphicFrame>
         <p:nvGraphicFramePr>
-          <p:cNvPr id="5" name="Object 4"/>
+          <p:cNvPr id="6" name="Object 5"/>
           <p:cNvGraphicFramePr>
             <a:graphicFrameLocks noChangeAspect="1"/>
           </p:cNvGraphicFramePr>
           <p:nvPr>
             <p:extLst>
               <p:ext uri="{D42A27DB-BD31-4B8C-83A1-F6EECF244321}">
-                <p14:modId xmlns:p14="http://schemas.microsoft.com/office/powerpoint/2010/main" val="3606490024"/>
+                <p14:modId xmlns:p14="http://schemas.microsoft.com/office/powerpoint/2010/main" val="2268099960"/>
               </p:ext>
             </p:extLst>
           </p:nvPr>
         </p:nvGraphicFramePr>
         <p:xfrm>
-          <a:off x="1916723" y="1362807"/>
-          <a:ext cx="5943600" cy="5159375"/>
+          <a:off x="1595533" y="1423242"/>
+          <a:ext cx="6260841" cy="5434758"/>
         </p:xfrm>
         <a:graphic>
           <a:graphicData uri="http://schemas.openxmlformats.org/presentationml/2006/ole">
             <mc:AlternateContent xmlns:mc="http://schemas.openxmlformats.org/markup-compatibility/2006">
               <mc:Choice xmlns:v="urn:schemas-microsoft-com:vml" Requires="v">
-                <p:oleObj spid="_x0000_s23560" name="Visio" r:id="rId3" imgW="6690431" imgH="5806534" progId="Visio.Drawing.15">
+                <p:oleObj spid="_x0000_s23564" name="Visio" r:id="rId3" imgW="6696139" imgH="5819708" progId="Visio.Drawing.15">
                   <p:embed/>
                 </p:oleObj>
               </mc:Choice>
               <mc:Fallback>
-                <p:oleObj name="Visio" r:id="rId3" imgW="6690431" imgH="5806534" progId="Visio.Drawing.15">
+                <p:oleObj name="Visio" r:id="rId3" imgW="6696139" imgH="5819708" progId="Visio.Drawing.15">
                   <p:embed/>
                   <p:pic>
                     <p:nvPicPr>
-                      <p:cNvPr id="0" name="Object 1"/>
+                      <p:cNvPr id="0" name="Object 9"/>
                       <p:cNvPicPr>
                         <a:picLocks noChangeAspect="1" noChangeArrowheads="1"/>
                       </p:cNvPicPr>
@@ -14188,22 +14478,13 @@
                     </p:blipFill>
                     <p:spPr bwMode="auto">
                       <a:xfrm>
-                        <a:off x="1916723" y="1362807"/>
-                        <a:ext cx="5943600" cy="5159375"/>
+                        <a:off x="1595533" y="1423242"/>
+                        <a:ext cx="6260841" cy="5434758"/>
                       </a:xfrm>
                       <a:prstGeom prst="rect">
                         <a:avLst/>
                       </a:prstGeom>
                       <a:noFill/>
-                      <a:extLst>
-                        <a:ext uri="{909E8E84-426E-40DD-AFC4-6F175D3DCCD1}">
-                          <a14:hiddenFill xmlns:a14="http://schemas.microsoft.com/office/drawing/2010/main">
-                            <a:solidFill>
-                              <a:srgbClr val="FFFFFF"/>
-                            </a:solidFill>
-                          </a14:hiddenFill>
-                        </a:ext>
-                      </a:extLst>
                     </p:spPr>
                   </p:pic>
                 </p:oleObj>
@@ -14336,20 +14617,20 @@
           <p:nvPr>
             <p:extLst>
               <p:ext uri="{D42A27DB-BD31-4B8C-83A1-F6EECF244321}">
-                <p14:modId xmlns:p14="http://schemas.microsoft.com/office/powerpoint/2010/main" val="1990821029"/>
+                <p14:modId xmlns:p14="http://schemas.microsoft.com/office/powerpoint/2010/main" val="3866566502"/>
               </p:ext>
             </p:extLst>
           </p:nvPr>
         </p:nvGraphicFramePr>
         <p:xfrm>
-          <a:off x="2087592" y="1846053"/>
-          <a:ext cx="5935663" cy="3932238"/>
+          <a:off x="755780" y="1446245"/>
+          <a:ext cx="7870980" cy="5214340"/>
         </p:xfrm>
         <a:graphic>
           <a:graphicData uri="http://schemas.openxmlformats.org/presentationml/2006/ole">
             <mc:AlternateContent xmlns:mc="http://schemas.openxmlformats.org/markup-compatibility/2006">
               <mc:Choice xmlns:v="urn:schemas-microsoft-com:vml" Requires="v">
-                <p:oleObj spid="_x0000_s24584" name="Visio" r:id="rId3" imgW="8984086" imgH="5943553" progId="Visio.Drawing.15">
+                <p:oleObj spid="_x0000_s24586" name="Visio" r:id="rId3" imgW="8984086" imgH="5943553" progId="Visio.Drawing.15">
                   <p:embed/>
                 </p:oleObj>
               </mc:Choice>
@@ -14379,22 +14660,14 @@
                     </p:blipFill>
                     <p:spPr bwMode="auto">
                       <a:xfrm>
-                        <a:off x="2087592" y="1846053"/>
-                        <a:ext cx="5935663" cy="3932238"/>
+                        <a:off x="755780" y="1446245"/>
+                        <a:ext cx="7870980" cy="5214340"/>
                       </a:xfrm>
                       <a:prstGeom prst="rect">
                         <a:avLst/>
                       </a:prstGeom>
                       <a:noFill/>
-                      <a:extLst>
-                        <a:ext uri="{909E8E84-426E-40DD-AFC4-6F175D3DCCD1}">
-                          <a14:hiddenFill xmlns:a14="http://schemas.microsoft.com/office/drawing/2010/main">
-                            <a:solidFill>
-                              <a:srgbClr val="FFFFFF"/>
-                            </a:solidFill>
-                          </a14:hiddenFill>
-                        </a:ext>
-                      </a:extLst>
+                      <a:extLst/>
                     </p:spPr>
                   </p:pic>
                 </p:oleObj>
@@ -14449,9 +14722,10 @@
           <a:lstStyle/>
           <a:p>
             <a:r>
-              <a:rPr lang="en-US" dirty="0"/>
-              <a:t>Thank You</a:t>
-            </a:r>
+              <a:rPr lang="en-US" dirty="0" smtClean="0"/>
+              <a:t>Database Specification</a:t>
+            </a:r>
+            <a:endParaRPr lang="en-US" dirty="0"/>
           </a:p>
         </p:txBody>
       </p:sp>
@@ -14472,13 +14746,11 @@
           <a:p>
             <a:r>
               <a:rPr lang="en-US" dirty="0"/>
-              <a:t>Demo</a:t>
-            </a:r>
-          </a:p>
-          <a:p>
-            <a:r>
-              <a:rPr lang="en-US" dirty="0"/>
-              <a:t>Questions?</a:t>
+              <a:t>The Test Framework will rely on a relational database system (RDBMS) for a number of purposes and functions as summarized in the following table</a:t>
+            </a:r>
+            <a:r>
+              <a:rPr lang="en-US" dirty="0" smtClean="0"/>
+              <a:t>:</a:t>
             </a:r>
           </a:p>
           <a:p>
@@ -14487,12 +14759,660 @@
             </a:pPr>
             <a:endParaRPr lang="en-US" dirty="0"/>
           </a:p>
-        </p:txBody>
-      </p:sp>
+          <a:p>
+            <a:endParaRPr lang="en-US" dirty="0"/>
+          </a:p>
+        </p:txBody>
+      </p:sp>
+      <p:graphicFrame>
+        <p:nvGraphicFramePr>
+          <p:cNvPr id="7" name="Table 6"/>
+          <p:cNvGraphicFramePr>
+            <a:graphicFrameLocks noGrp="1"/>
+          </p:cNvGraphicFramePr>
+          <p:nvPr/>
+        </p:nvGraphicFramePr>
+        <p:xfrm>
+          <a:off x="677863" y="3329146"/>
+          <a:ext cx="8596311" cy="1544320"/>
+        </p:xfrm>
+        <a:graphic>
+          <a:graphicData uri="http://schemas.openxmlformats.org/drawingml/2006/table">
+            <a:tbl>
+              <a:tblPr firstRow="1" firstCol="1" bandRow="1"/>
+              <a:tblGrid>
+                <a:gridCol w="2865437"/>
+                <a:gridCol w="2865437"/>
+                <a:gridCol w="2865437"/>
+              </a:tblGrid>
+              <a:tr h="0">
+                <a:tc>
+                  <a:txBody>
+                    <a:bodyPr/>
+                    <a:lstStyle/>
+                    <a:p>
+                      <a:pPr marL="0" marR="0" algn="ctr">
+                        <a:spcBef>
+                          <a:spcPts val="0"/>
+                        </a:spcBef>
+                        <a:spcAft>
+                          <a:spcPts val="0"/>
+                        </a:spcAft>
+                      </a:pPr>
+                      <a:r>
+                        <a:rPr lang="en-US" sz="1100" b="1" dirty="0">
+                          <a:solidFill>
+                            <a:srgbClr val="000000"/>
+                          </a:solidFill>
+                          <a:effectLst/>
+                          <a:latin typeface="Calibri" panose="020F0502020204030204" pitchFamily="34" charset="0"/>
+                          <a:ea typeface="Times New Roman" panose="02020603050405020304" pitchFamily="18" charset="0"/>
+                          <a:cs typeface="Times New Roman" panose="02020603050405020304" pitchFamily="18" charset="0"/>
+                        </a:rPr>
+                        <a:t>Function</a:t>
+                      </a:r>
+                      <a:endParaRPr lang="en-US" sz="1200" dirty="0">
+                        <a:effectLst/>
+                        <a:latin typeface="Times New Roman" panose="02020603050405020304" pitchFamily="18" charset="0"/>
+                        <a:ea typeface="Times New Roman" panose="02020603050405020304" pitchFamily="18" charset="0"/>
+                        <a:cs typeface="Times New Roman" panose="02020603050405020304" pitchFamily="18" charset="0"/>
+                      </a:endParaRPr>
+                    </a:p>
+                  </a:txBody>
+                  <a:tcPr marL="25400" marR="25400" marT="25400" marB="25400">
+                    <a:lnL>
+                      <a:noFill/>
+                    </a:lnL>
+                    <a:lnR>
+                      <a:noFill/>
+                    </a:lnR>
+                    <a:lnT>
+                      <a:noFill/>
+                    </a:lnT>
+                    <a:lnB>
+                      <a:noFill/>
+                    </a:lnB>
+                    <a:solidFill>
+                      <a:srgbClr val="66B036"/>
+                    </a:solidFill>
+                  </a:tcPr>
+                </a:tc>
+                <a:tc>
+                  <a:txBody>
+                    <a:bodyPr/>
+                    <a:lstStyle/>
+                    <a:p>
+                      <a:pPr marL="0" marR="0" algn="ctr">
+                        <a:spcBef>
+                          <a:spcPts val="0"/>
+                        </a:spcBef>
+                        <a:spcAft>
+                          <a:spcPts val="0"/>
+                        </a:spcAft>
+                      </a:pPr>
+                      <a:r>
+                        <a:rPr lang="en-US" sz="1100" b="1" dirty="0">
+                          <a:solidFill>
+                            <a:srgbClr val="000000"/>
+                          </a:solidFill>
+                          <a:effectLst/>
+                          <a:latin typeface="Calibri" panose="020F0502020204030204" pitchFamily="34" charset="0"/>
+                          <a:ea typeface="Times New Roman" panose="02020603050405020304" pitchFamily="18" charset="0"/>
+                          <a:cs typeface="Times New Roman" panose="02020603050405020304" pitchFamily="18" charset="0"/>
+                        </a:rPr>
+                        <a:t>Description</a:t>
+                      </a:r>
+                      <a:endParaRPr lang="en-US" sz="1200" dirty="0">
+                        <a:effectLst/>
+                        <a:latin typeface="Times New Roman" panose="02020603050405020304" pitchFamily="18" charset="0"/>
+                        <a:ea typeface="Times New Roman" panose="02020603050405020304" pitchFamily="18" charset="0"/>
+                        <a:cs typeface="Times New Roman" panose="02020603050405020304" pitchFamily="18" charset="0"/>
+                      </a:endParaRPr>
+                    </a:p>
+                  </a:txBody>
+                  <a:tcPr marL="25400" marR="25400" marT="25400" marB="25400">
+                    <a:lnL>
+                      <a:noFill/>
+                    </a:lnL>
+                    <a:lnR>
+                      <a:noFill/>
+                    </a:lnR>
+                    <a:lnT>
+                      <a:noFill/>
+                    </a:lnT>
+                    <a:lnB>
+                      <a:noFill/>
+                    </a:lnB>
+                    <a:solidFill>
+                      <a:srgbClr val="66B036"/>
+                    </a:solidFill>
+                  </a:tcPr>
+                </a:tc>
+                <a:tc>
+                  <a:txBody>
+                    <a:bodyPr/>
+                    <a:lstStyle/>
+                    <a:p>
+                      <a:pPr marL="0" marR="0" algn="ctr">
+                        <a:spcBef>
+                          <a:spcPts val="0"/>
+                        </a:spcBef>
+                        <a:spcAft>
+                          <a:spcPts val="0"/>
+                        </a:spcAft>
+                      </a:pPr>
+                      <a:r>
+                        <a:rPr lang="en-US" sz="1100" b="1" dirty="0">
+                          <a:solidFill>
+                            <a:srgbClr val="000000"/>
+                          </a:solidFill>
+                          <a:effectLst/>
+                          <a:latin typeface="Calibri" panose="020F0502020204030204" pitchFamily="34" charset="0"/>
+                          <a:ea typeface="Times New Roman" panose="02020603050405020304" pitchFamily="18" charset="0"/>
+                          <a:cs typeface="Times New Roman" panose="02020603050405020304" pitchFamily="18" charset="0"/>
+                        </a:rPr>
+                        <a:t>Visibility</a:t>
+                      </a:r>
+                      <a:endParaRPr lang="en-US" sz="1200" dirty="0">
+                        <a:effectLst/>
+                        <a:latin typeface="Times New Roman" panose="02020603050405020304" pitchFamily="18" charset="0"/>
+                        <a:ea typeface="Times New Roman" panose="02020603050405020304" pitchFamily="18" charset="0"/>
+                        <a:cs typeface="Times New Roman" panose="02020603050405020304" pitchFamily="18" charset="0"/>
+                      </a:endParaRPr>
+                    </a:p>
+                  </a:txBody>
+                  <a:tcPr marL="25400" marR="25400" marT="25400" marB="25400">
+                    <a:lnL>
+                      <a:noFill/>
+                    </a:lnL>
+                    <a:lnR>
+                      <a:noFill/>
+                    </a:lnR>
+                    <a:lnT>
+                      <a:noFill/>
+                    </a:lnT>
+                    <a:lnB>
+                      <a:noFill/>
+                    </a:lnB>
+                    <a:solidFill>
+                      <a:srgbClr val="66B036"/>
+                    </a:solidFill>
+                  </a:tcPr>
+                </a:tc>
+              </a:tr>
+              <a:tr h="0">
+                <a:tc>
+                  <a:txBody>
+                    <a:bodyPr/>
+                    <a:lstStyle/>
+                    <a:p>
+                      <a:pPr marL="0" marR="0">
+                        <a:spcBef>
+                          <a:spcPts val="0"/>
+                        </a:spcBef>
+                        <a:spcAft>
+                          <a:spcPts val="0"/>
+                        </a:spcAft>
+                      </a:pPr>
+                      <a:r>
+                        <a:rPr lang="en-US" sz="1100" b="1">
+                          <a:solidFill>
+                            <a:srgbClr val="000000"/>
+                          </a:solidFill>
+                          <a:effectLst/>
+                          <a:latin typeface="Calibri" panose="020F0502020204030204" pitchFamily="34" charset="0"/>
+                          <a:ea typeface="Times New Roman" panose="02020603050405020304" pitchFamily="18" charset="0"/>
+                          <a:cs typeface="Times New Roman" panose="02020603050405020304" pitchFamily="18" charset="0"/>
+                        </a:rPr>
+                        <a:t>System</a:t>
+                      </a:r>
+                      <a:endParaRPr lang="en-US" sz="1200">
+                        <a:effectLst/>
+                        <a:latin typeface="Times New Roman" panose="02020603050405020304" pitchFamily="18" charset="0"/>
+                        <a:ea typeface="Times New Roman" panose="02020603050405020304" pitchFamily="18" charset="0"/>
+                        <a:cs typeface="Times New Roman" panose="02020603050405020304" pitchFamily="18" charset="0"/>
+                      </a:endParaRPr>
+                    </a:p>
+                  </a:txBody>
+                  <a:tcPr marL="25400" marR="25400" marT="25400" marB="25400">
+                    <a:lnL>
+                      <a:noFill/>
+                    </a:lnL>
+                    <a:lnR>
+                      <a:noFill/>
+                    </a:lnR>
+                    <a:lnT>
+                      <a:noFill/>
+                    </a:lnT>
+                    <a:lnB>
+                      <a:noFill/>
+                    </a:lnB>
+                    <a:solidFill>
+                      <a:srgbClr val="F0F0F0"/>
+                    </a:solidFill>
+                  </a:tcPr>
+                </a:tc>
+                <a:tc>
+                  <a:txBody>
+                    <a:bodyPr/>
+                    <a:lstStyle/>
+                    <a:p>
+                      <a:pPr marL="0" marR="0">
+                        <a:spcBef>
+                          <a:spcPts val="0"/>
+                        </a:spcBef>
+                        <a:spcAft>
+                          <a:spcPts val="0"/>
+                        </a:spcAft>
+                      </a:pPr>
+                      <a:r>
+                        <a:rPr lang="en-US" sz="1100">
+                          <a:solidFill>
+                            <a:srgbClr val="000000"/>
+                          </a:solidFill>
+                          <a:effectLst/>
+                          <a:latin typeface="Calibri" panose="020F0502020204030204" pitchFamily="34" charset="0"/>
+                          <a:ea typeface="Times New Roman" panose="02020603050405020304" pitchFamily="18" charset="0"/>
+                          <a:cs typeface="Times New Roman" panose="02020603050405020304" pitchFamily="18" charset="0"/>
+                        </a:rPr>
+                        <a:t>Persistent system data, logs and meta information, e.g. tracking users registering machines, storing user permissions, storing historical test metadata </a:t>
+                      </a:r>
+                      <a:endParaRPr lang="en-US" sz="1200">
+                        <a:effectLst/>
+                        <a:latin typeface="Times New Roman" panose="02020603050405020304" pitchFamily="18" charset="0"/>
+                        <a:ea typeface="Times New Roman" panose="02020603050405020304" pitchFamily="18" charset="0"/>
+                        <a:cs typeface="Times New Roman" panose="02020603050405020304" pitchFamily="18" charset="0"/>
+                      </a:endParaRPr>
+                    </a:p>
+                  </a:txBody>
+                  <a:tcPr marL="25400" marR="25400" marT="25400" marB="25400">
+                    <a:lnL>
+                      <a:noFill/>
+                    </a:lnL>
+                    <a:lnR>
+                      <a:noFill/>
+                    </a:lnR>
+                    <a:lnT>
+                      <a:noFill/>
+                    </a:lnT>
+                    <a:lnB>
+                      <a:noFill/>
+                    </a:lnB>
+                    <a:solidFill>
+                      <a:srgbClr val="F0F0F0"/>
+                    </a:solidFill>
+                  </a:tcPr>
+                </a:tc>
+                <a:tc>
+                  <a:txBody>
+                    <a:bodyPr/>
+                    <a:lstStyle/>
+                    <a:p>
+                      <a:pPr marL="0" marR="0">
+                        <a:spcBef>
+                          <a:spcPts val="0"/>
+                        </a:spcBef>
+                        <a:spcAft>
+                          <a:spcPts val="0"/>
+                        </a:spcAft>
+                      </a:pPr>
+                      <a:r>
+                        <a:rPr lang="en-US" sz="1100">
+                          <a:solidFill>
+                            <a:srgbClr val="000000"/>
+                          </a:solidFill>
+                          <a:effectLst/>
+                          <a:latin typeface="Calibri" panose="020F0502020204030204" pitchFamily="34" charset="0"/>
+                          <a:ea typeface="Times New Roman" panose="02020603050405020304" pitchFamily="18" charset="0"/>
+                          <a:cs typeface="Times New Roman" panose="02020603050405020304" pitchFamily="18" charset="0"/>
+                        </a:rPr>
+                        <a:t>Not user visible</a:t>
+                      </a:r>
+                      <a:endParaRPr lang="en-US" sz="1200">
+                        <a:effectLst/>
+                        <a:latin typeface="Times New Roman" panose="02020603050405020304" pitchFamily="18" charset="0"/>
+                        <a:ea typeface="Times New Roman" panose="02020603050405020304" pitchFamily="18" charset="0"/>
+                        <a:cs typeface="Times New Roman" panose="02020603050405020304" pitchFamily="18" charset="0"/>
+                      </a:endParaRPr>
+                    </a:p>
+                  </a:txBody>
+                  <a:tcPr marL="25400" marR="25400" marT="25400" marB="25400">
+                    <a:lnL>
+                      <a:noFill/>
+                    </a:lnL>
+                    <a:lnR>
+                      <a:noFill/>
+                    </a:lnR>
+                    <a:lnT>
+                      <a:noFill/>
+                    </a:lnT>
+                    <a:lnB>
+                      <a:noFill/>
+                    </a:lnB>
+                    <a:solidFill>
+                      <a:srgbClr val="F0F0F0"/>
+                    </a:solidFill>
+                  </a:tcPr>
+                </a:tc>
+              </a:tr>
+              <a:tr h="0">
+                <a:tc>
+                  <a:txBody>
+                    <a:bodyPr/>
+                    <a:lstStyle/>
+                    <a:p>
+                      <a:pPr marL="0" marR="0">
+                        <a:spcBef>
+                          <a:spcPts val="0"/>
+                        </a:spcBef>
+                        <a:spcAft>
+                          <a:spcPts val="0"/>
+                        </a:spcAft>
+                      </a:pPr>
+                      <a:r>
+                        <a:rPr lang="en-US" sz="1100" b="1">
+                          <a:solidFill>
+                            <a:srgbClr val="000000"/>
+                          </a:solidFill>
+                          <a:effectLst/>
+                          <a:latin typeface="Calibri" panose="020F0502020204030204" pitchFamily="34" charset="0"/>
+                          <a:ea typeface="Times New Roman" panose="02020603050405020304" pitchFamily="18" charset="0"/>
+                          <a:cs typeface="Times New Roman" panose="02020603050405020304" pitchFamily="18" charset="0"/>
+                        </a:rPr>
+                        <a:t>Content</a:t>
+                      </a:r>
+                      <a:endParaRPr lang="en-US" sz="1200">
+                        <a:effectLst/>
+                        <a:latin typeface="Times New Roman" panose="02020603050405020304" pitchFamily="18" charset="0"/>
+                        <a:ea typeface="Times New Roman" panose="02020603050405020304" pitchFamily="18" charset="0"/>
+                        <a:cs typeface="Times New Roman" panose="02020603050405020304" pitchFamily="18" charset="0"/>
+                      </a:endParaRPr>
+                    </a:p>
+                  </a:txBody>
+                  <a:tcPr marL="25400" marR="25400" marT="25400" marB="25400">
+                    <a:lnL>
+                      <a:noFill/>
+                    </a:lnL>
+                    <a:lnR>
+                      <a:noFill/>
+                    </a:lnR>
+                    <a:lnT>
+                      <a:noFill/>
+                    </a:lnT>
+                    <a:lnB>
+                      <a:noFill/>
+                    </a:lnB>
+                    <a:solidFill>
+                      <a:srgbClr val="E4E4E4"/>
+                    </a:solidFill>
+                  </a:tcPr>
+                </a:tc>
+                <a:tc>
+                  <a:txBody>
+                    <a:bodyPr/>
+                    <a:lstStyle/>
+                    <a:p>
+                      <a:pPr marL="0" marR="0">
+                        <a:spcBef>
+                          <a:spcPts val="0"/>
+                        </a:spcBef>
+                        <a:spcAft>
+                          <a:spcPts val="0"/>
+                        </a:spcAft>
+                      </a:pPr>
+                      <a:r>
+                        <a:rPr lang="en-US" sz="1100">
+                          <a:solidFill>
+                            <a:srgbClr val="000000"/>
+                          </a:solidFill>
+                          <a:effectLst/>
+                          <a:latin typeface="Calibri" panose="020F0502020204030204" pitchFamily="34" charset="0"/>
+                          <a:ea typeface="Times New Roman" panose="02020603050405020304" pitchFamily="18" charset="0"/>
+                          <a:cs typeface="Times New Roman" panose="02020603050405020304" pitchFamily="18" charset="0"/>
+                        </a:rPr>
+                        <a:t>Test run content and results </a:t>
+                      </a:r>
+                      <a:endParaRPr lang="en-US" sz="1200">
+                        <a:effectLst/>
+                        <a:latin typeface="Times New Roman" panose="02020603050405020304" pitchFamily="18" charset="0"/>
+                        <a:ea typeface="Times New Roman" panose="02020603050405020304" pitchFamily="18" charset="0"/>
+                        <a:cs typeface="Times New Roman" panose="02020603050405020304" pitchFamily="18" charset="0"/>
+                      </a:endParaRPr>
+                    </a:p>
+                  </a:txBody>
+                  <a:tcPr marL="25400" marR="25400" marT="25400" marB="25400">
+                    <a:lnL>
+                      <a:noFill/>
+                    </a:lnL>
+                    <a:lnR>
+                      <a:noFill/>
+                    </a:lnR>
+                    <a:lnT>
+                      <a:noFill/>
+                    </a:lnT>
+                    <a:lnB>
+                      <a:noFill/>
+                    </a:lnB>
+                    <a:solidFill>
+                      <a:srgbClr val="E4E4E4"/>
+                    </a:solidFill>
+                  </a:tcPr>
+                </a:tc>
+                <a:tc>
+                  <a:txBody>
+                    <a:bodyPr/>
+                    <a:lstStyle/>
+                    <a:p>
+                      <a:pPr marL="0" marR="0">
+                        <a:spcBef>
+                          <a:spcPts val="0"/>
+                        </a:spcBef>
+                        <a:spcAft>
+                          <a:spcPts val="0"/>
+                        </a:spcAft>
+                      </a:pPr>
+                      <a:r>
+                        <a:rPr lang="en-US" sz="1100">
+                          <a:solidFill>
+                            <a:srgbClr val="000000"/>
+                          </a:solidFill>
+                          <a:effectLst/>
+                          <a:latin typeface="Calibri" panose="020F0502020204030204" pitchFamily="34" charset="0"/>
+                          <a:ea typeface="Times New Roman" panose="02020603050405020304" pitchFamily="18" charset="0"/>
+                          <a:cs typeface="Times New Roman" panose="02020603050405020304" pitchFamily="18" charset="0"/>
+                        </a:rPr>
+                        <a:t>User visible</a:t>
+                      </a:r>
+                      <a:endParaRPr lang="en-US" sz="1200">
+                        <a:effectLst/>
+                        <a:latin typeface="Times New Roman" panose="02020603050405020304" pitchFamily="18" charset="0"/>
+                        <a:ea typeface="Times New Roman" panose="02020603050405020304" pitchFamily="18" charset="0"/>
+                        <a:cs typeface="Times New Roman" panose="02020603050405020304" pitchFamily="18" charset="0"/>
+                      </a:endParaRPr>
+                    </a:p>
+                  </a:txBody>
+                  <a:tcPr marL="25400" marR="25400" marT="25400" marB="25400">
+                    <a:lnL>
+                      <a:noFill/>
+                    </a:lnL>
+                    <a:lnR>
+                      <a:noFill/>
+                    </a:lnR>
+                    <a:lnT>
+                      <a:noFill/>
+                    </a:lnT>
+                    <a:lnB>
+                      <a:noFill/>
+                    </a:lnB>
+                    <a:solidFill>
+                      <a:srgbClr val="E4E4E4"/>
+                    </a:solidFill>
+                  </a:tcPr>
+                </a:tc>
+              </a:tr>
+              <a:tr h="0">
+                <a:tc>
+                  <a:txBody>
+                    <a:bodyPr/>
+                    <a:lstStyle/>
+                    <a:p>
+                      <a:pPr marL="0" marR="0">
+                        <a:spcBef>
+                          <a:spcPts val="0"/>
+                        </a:spcBef>
+                        <a:spcAft>
+                          <a:spcPts val="0"/>
+                        </a:spcAft>
+                      </a:pPr>
+                      <a:r>
+                        <a:rPr lang="en-US" sz="1100" b="1">
+                          <a:solidFill>
+                            <a:srgbClr val="000000"/>
+                          </a:solidFill>
+                          <a:effectLst/>
+                          <a:latin typeface="Calibri" panose="020F0502020204030204" pitchFamily="34" charset="0"/>
+                          <a:ea typeface="Times New Roman" panose="02020603050405020304" pitchFamily="18" charset="0"/>
+                          <a:cs typeface="Times New Roman" panose="02020603050405020304" pitchFamily="18" charset="0"/>
+                        </a:rPr>
+                        <a:t>Privileged Identify Management (PIM)</a:t>
+                      </a:r>
+                      <a:endParaRPr lang="en-US" sz="1200">
+                        <a:effectLst/>
+                        <a:latin typeface="Times New Roman" panose="02020603050405020304" pitchFamily="18" charset="0"/>
+                        <a:ea typeface="Times New Roman" panose="02020603050405020304" pitchFamily="18" charset="0"/>
+                        <a:cs typeface="Times New Roman" panose="02020603050405020304" pitchFamily="18" charset="0"/>
+                      </a:endParaRPr>
+                    </a:p>
+                  </a:txBody>
+                  <a:tcPr marL="25400" marR="25400" marT="25400" marB="25400">
+                    <a:lnL>
+                      <a:noFill/>
+                    </a:lnL>
+                    <a:lnR>
+                      <a:noFill/>
+                    </a:lnR>
+                    <a:lnT>
+                      <a:noFill/>
+                    </a:lnT>
+                    <a:lnB>
+                      <a:noFill/>
+                    </a:lnB>
+                    <a:solidFill>
+                      <a:srgbClr val="F0F0F0"/>
+                    </a:solidFill>
+                  </a:tcPr>
+                </a:tc>
+                <a:tc>
+                  <a:txBody>
+                    <a:bodyPr/>
+                    <a:lstStyle/>
+                    <a:p>
+                      <a:pPr marL="0" marR="0">
+                        <a:spcBef>
+                          <a:spcPts val="0"/>
+                        </a:spcBef>
+                        <a:spcAft>
+                          <a:spcPts val="0"/>
+                        </a:spcAft>
+                      </a:pPr>
+                      <a:r>
+                        <a:rPr lang="en-US" sz="1100">
+                          <a:solidFill>
+                            <a:srgbClr val="000000"/>
+                          </a:solidFill>
+                          <a:effectLst/>
+                          <a:latin typeface="Calibri" panose="020F0502020204030204" pitchFamily="34" charset="0"/>
+                          <a:ea typeface="Times New Roman" panose="02020603050405020304" pitchFamily="18" charset="0"/>
+                          <a:cs typeface="Times New Roman" panose="02020603050405020304" pitchFamily="18" charset="0"/>
+                        </a:rPr>
+                        <a:t>User profile information, permission levels and location data  </a:t>
+                      </a:r>
+                      <a:endParaRPr lang="en-US" sz="1200">
+                        <a:effectLst/>
+                        <a:latin typeface="Times New Roman" panose="02020603050405020304" pitchFamily="18" charset="0"/>
+                        <a:ea typeface="Times New Roman" panose="02020603050405020304" pitchFamily="18" charset="0"/>
+                        <a:cs typeface="Times New Roman" panose="02020603050405020304" pitchFamily="18" charset="0"/>
+                      </a:endParaRPr>
+                    </a:p>
+                  </a:txBody>
+                  <a:tcPr marL="25400" marR="25400" marT="25400" marB="25400">
+                    <a:lnL>
+                      <a:noFill/>
+                    </a:lnL>
+                    <a:lnR>
+                      <a:noFill/>
+                    </a:lnR>
+                    <a:lnT>
+                      <a:noFill/>
+                    </a:lnT>
+                    <a:lnB>
+                      <a:noFill/>
+                    </a:lnB>
+                    <a:solidFill>
+                      <a:srgbClr val="F0F0F0"/>
+                    </a:solidFill>
+                  </a:tcPr>
+                </a:tc>
+                <a:tc>
+                  <a:txBody>
+                    <a:bodyPr/>
+                    <a:lstStyle/>
+                    <a:p>
+                      <a:pPr marL="0" marR="0">
+                        <a:spcBef>
+                          <a:spcPts val="0"/>
+                        </a:spcBef>
+                        <a:spcAft>
+                          <a:spcPts val="0"/>
+                        </a:spcAft>
+                      </a:pPr>
+                      <a:r>
+                        <a:rPr lang="en-US" sz="1100" dirty="0">
+                          <a:solidFill>
+                            <a:srgbClr val="000000"/>
+                          </a:solidFill>
+                          <a:effectLst/>
+                          <a:latin typeface="Calibri" panose="020F0502020204030204" pitchFamily="34" charset="0"/>
+                          <a:ea typeface="Times New Roman" panose="02020603050405020304" pitchFamily="18" charset="0"/>
+                          <a:cs typeface="Times New Roman" panose="02020603050405020304" pitchFamily="18" charset="0"/>
+                        </a:rPr>
+                        <a:t>User visible</a:t>
+                      </a:r>
+                      <a:endParaRPr lang="en-US" sz="1200" dirty="0">
+                        <a:effectLst/>
+                        <a:latin typeface="Times New Roman" panose="02020603050405020304" pitchFamily="18" charset="0"/>
+                        <a:ea typeface="Times New Roman" panose="02020603050405020304" pitchFamily="18" charset="0"/>
+                        <a:cs typeface="Times New Roman" panose="02020603050405020304" pitchFamily="18" charset="0"/>
+                      </a:endParaRPr>
+                    </a:p>
+                  </a:txBody>
+                  <a:tcPr marL="25400" marR="25400" marT="25400" marB="25400">
+                    <a:lnL>
+                      <a:noFill/>
+                    </a:lnL>
+                    <a:lnR>
+                      <a:noFill/>
+                    </a:lnR>
+                    <a:lnT>
+                      <a:noFill/>
+                    </a:lnT>
+                    <a:lnB>
+                      <a:noFill/>
+                    </a:lnB>
+                    <a:solidFill>
+                      <a:srgbClr val="F0F0F0"/>
+                    </a:solidFill>
+                  </a:tcPr>
+                </a:tc>
+              </a:tr>
+            </a:tbl>
+          </a:graphicData>
+        </a:graphic>
+      </p:graphicFrame>
     </p:spTree>
     <p:extLst>
       <p:ext uri="{BB962C8B-B14F-4D97-AF65-F5344CB8AC3E}">
-        <p14:creationId xmlns:p14="http://schemas.microsoft.com/office/powerpoint/2010/main" val="3990466175"/>
+        <p14:creationId xmlns:p14="http://schemas.microsoft.com/office/powerpoint/2010/main" val="2708448622"/>
       </p:ext>
     </p:extLst>
   </p:cSld>
@@ -14535,35 +15455,39 @@
           <a:lstStyle/>
           <a:p>
             <a:r>
-              <a:rPr lang="en-US" dirty="0"/>
-              <a:t>Backup</a:t>
-            </a:r>
-          </a:p>
-        </p:txBody>
-      </p:sp>
-      <p:sp>
-        <p:nvSpPr>
-          <p:cNvPr id="3" name="Content Placeholder 2"/>
-          <p:cNvSpPr>
-            <a:spLocks noGrp="1"/>
-          </p:cNvSpPr>
-          <p:nvPr>
-            <p:ph idx="1"/>
-          </p:nvPr>
-        </p:nvSpPr>
-        <p:spPr/>
-        <p:txBody>
-          <a:bodyPr/>
-          <a:lstStyle/>
-          <a:p>
-            <a:endParaRPr lang="en-US"/>
-          </a:p>
-        </p:txBody>
-      </p:sp>
+              <a:rPr lang="en-US" dirty="0" smtClean="0"/>
+              <a:t>Database Schema</a:t>
+            </a:r>
+            <a:endParaRPr lang="en-US" dirty="0"/>
+          </a:p>
+        </p:txBody>
+      </p:sp>
+      <p:pic>
+        <p:nvPicPr>
+          <p:cNvPr id="4" name="Picture 3" descr="A screenshot of a cell phone&#10;&#10;Description automatically generated"/>
+          <p:cNvPicPr/>
+          <p:nvPr/>
+        </p:nvPicPr>
+        <p:blipFill>
+          <a:blip r:embed="rId2"/>
+          <a:stretch>
+            <a:fillRect/>
+          </a:stretch>
+        </p:blipFill>
+        <p:spPr>
+          <a:xfrm>
+            <a:off x="1164772" y="1429748"/>
+            <a:ext cx="6999514" cy="5362938"/>
+          </a:xfrm>
+          <a:prstGeom prst="rect">
+            <a:avLst/>
+          </a:prstGeom>
+        </p:spPr>
+      </p:pic>
     </p:spTree>
     <p:extLst>
       <p:ext uri="{BB962C8B-B14F-4D97-AF65-F5344CB8AC3E}">
-        <p14:creationId xmlns:p14="http://schemas.microsoft.com/office/powerpoint/2010/main" val="2771322857"/>
+        <p14:creationId xmlns:p14="http://schemas.microsoft.com/office/powerpoint/2010/main" val="2765776994"/>
       </p:ext>
     </p:extLst>
   </p:cSld>
@@ -14606,90 +15530,1103 @@
           <a:lstStyle/>
           <a:p>
             <a:r>
-              <a:rPr lang="en-US" dirty="0"/>
-              <a:t>Availability and Business Continuity</a:t>
-            </a:r>
-          </a:p>
-        </p:txBody>
-      </p:sp>
-      <p:sp>
-        <p:nvSpPr>
-          <p:cNvPr id="3" name="Content Placeholder 2"/>
-          <p:cNvSpPr>
-            <a:spLocks noGrp="1"/>
-          </p:cNvSpPr>
+              <a:rPr lang="en-US" dirty="0" smtClean="0"/>
+              <a:t>Database Schema</a:t>
+            </a:r>
+            <a:endParaRPr lang="en-US" dirty="0"/>
+          </a:p>
+        </p:txBody>
+      </p:sp>
+      <p:graphicFrame>
+        <p:nvGraphicFramePr>
+          <p:cNvPr id="4" name="Content Placeholder 3"/>
+          <p:cNvGraphicFramePr>
+            <a:graphicFrameLocks noGrp="1"/>
+          </p:cNvGraphicFramePr>
           <p:nvPr>
             <p:ph idx="1"/>
-          </p:nvPr>
+            <p:extLst>
+              <p:ext uri="{D42A27DB-BD31-4B8C-83A1-F6EECF244321}">
+                <p14:modId xmlns:p14="http://schemas.microsoft.com/office/powerpoint/2010/main" val="564350103"/>
+              </p:ext>
+            </p:extLst>
+          </p:nvPr>
+        </p:nvGraphicFramePr>
+        <p:xfrm>
+          <a:off x="677334" y="1472354"/>
+          <a:ext cx="8596312" cy="3373120"/>
+        </p:xfrm>
+        <a:graphic>
+          <a:graphicData uri="http://schemas.openxmlformats.org/drawingml/2006/table">
+            <a:tbl>
+              <a:tblPr firstRow="1" firstCol="1" bandRow="1"/>
+              <a:tblGrid>
+                <a:gridCol w="4298156"/>
+                <a:gridCol w="4298156"/>
+              </a:tblGrid>
+              <a:tr h="0">
+                <a:tc>
+                  <a:txBody>
+                    <a:bodyPr/>
+                    <a:lstStyle/>
+                    <a:p>
+                      <a:pPr marL="0" marR="0" algn="ctr">
+                        <a:spcBef>
+                          <a:spcPts val="0"/>
+                        </a:spcBef>
+                        <a:spcAft>
+                          <a:spcPts val="0"/>
+                        </a:spcAft>
+                      </a:pPr>
+                      <a:r>
+                        <a:rPr lang="en-US" sz="1100" b="1" dirty="0">
+                          <a:solidFill>
+                            <a:srgbClr val="000000"/>
+                          </a:solidFill>
+                          <a:effectLst/>
+                          <a:latin typeface="Calibri" panose="020F0502020204030204" pitchFamily="34" charset="0"/>
+                          <a:ea typeface="Times New Roman" panose="02020603050405020304" pitchFamily="18" charset="0"/>
+                          <a:cs typeface="Times New Roman" panose="02020603050405020304" pitchFamily="18" charset="0"/>
+                        </a:rPr>
+                        <a:t>Table</a:t>
+                      </a:r>
+                      <a:endParaRPr lang="en-US" sz="1200" dirty="0">
+                        <a:effectLst/>
+                        <a:latin typeface="Times New Roman" panose="02020603050405020304" pitchFamily="18" charset="0"/>
+                        <a:ea typeface="Times New Roman" panose="02020603050405020304" pitchFamily="18" charset="0"/>
+                        <a:cs typeface="Times New Roman" panose="02020603050405020304" pitchFamily="18" charset="0"/>
+                      </a:endParaRPr>
+                    </a:p>
+                  </a:txBody>
+                  <a:tcPr marL="25400" marR="25400" marT="25400" marB="25400">
+                    <a:lnL>
+                      <a:noFill/>
+                    </a:lnL>
+                    <a:lnR>
+                      <a:noFill/>
+                    </a:lnR>
+                    <a:lnT>
+                      <a:noFill/>
+                    </a:lnT>
+                    <a:lnB>
+                      <a:noFill/>
+                    </a:lnB>
+                    <a:solidFill>
+                      <a:srgbClr val="66B036"/>
+                    </a:solidFill>
+                  </a:tcPr>
+                </a:tc>
+                <a:tc>
+                  <a:txBody>
+                    <a:bodyPr/>
+                    <a:lstStyle/>
+                    <a:p>
+                      <a:pPr marL="0" marR="0" algn="ctr">
+                        <a:spcBef>
+                          <a:spcPts val="0"/>
+                        </a:spcBef>
+                        <a:spcAft>
+                          <a:spcPts val="0"/>
+                        </a:spcAft>
+                      </a:pPr>
+                      <a:r>
+                        <a:rPr lang="en-US" sz="1100" b="1">
+                          <a:solidFill>
+                            <a:srgbClr val="000000"/>
+                          </a:solidFill>
+                          <a:effectLst/>
+                          <a:latin typeface="Calibri" panose="020F0502020204030204" pitchFamily="34" charset="0"/>
+                          <a:ea typeface="Times New Roman" panose="02020603050405020304" pitchFamily="18" charset="0"/>
+                          <a:cs typeface="Times New Roman" panose="02020603050405020304" pitchFamily="18" charset="0"/>
+                        </a:rPr>
+                        <a:t>Description</a:t>
+                      </a:r>
+                      <a:endParaRPr lang="en-US" sz="1200">
+                        <a:effectLst/>
+                        <a:latin typeface="Times New Roman" panose="02020603050405020304" pitchFamily="18" charset="0"/>
+                        <a:ea typeface="Times New Roman" panose="02020603050405020304" pitchFamily="18" charset="0"/>
+                        <a:cs typeface="Times New Roman" panose="02020603050405020304" pitchFamily="18" charset="0"/>
+                      </a:endParaRPr>
+                    </a:p>
+                  </a:txBody>
+                  <a:tcPr marL="25400" marR="25400" marT="25400" marB="25400">
+                    <a:lnL>
+                      <a:noFill/>
+                    </a:lnL>
+                    <a:lnR>
+                      <a:noFill/>
+                    </a:lnR>
+                    <a:lnT>
+                      <a:noFill/>
+                    </a:lnT>
+                    <a:lnB>
+                      <a:noFill/>
+                    </a:lnB>
+                    <a:solidFill>
+                      <a:srgbClr val="66B036"/>
+                    </a:solidFill>
+                  </a:tcPr>
+                </a:tc>
+              </a:tr>
+              <a:tr h="0">
+                <a:tc>
+                  <a:txBody>
+                    <a:bodyPr/>
+                    <a:lstStyle/>
+                    <a:p>
+                      <a:pPr marL="0" marR="0">
+                        <a:spcBef>
+                          <a:spcPts val="0"/>
+                        </a:spcBef>
+                        <a:spcAft>
+                          <a:spcPts val="0"/>
+                        </a:spcAft>
+                      </a:pPr>
+                      <a:r>
+                        <a:rPr lang="en-US" sz="1100" b="1">
+                          <a:solidFill>
+                            <a:srgbClr val="000000"/>
+                          </a:solidFill>
+                          <a:effectLst/>
+                          <a:latin typeface="Calibri" panose="020F0502020204030204" pitchFamily="34" charset="0"/>
+                          <a:ea typeface="Times New Roman" panose="02020603050405020304" pitchFamily="18" charset="0"/>
+                          <a:cs typeface="Times New Roman" panose="02020603050405020304" pitchFamily="18" charset="0"/>
+                        </a:rPr>
+                        <a:t>Content Functions</a:t>
+                      </a:r>
+                      <a:endParaRPr lang="en-US" sz="1200">
+                        <a:effectLst/>
+                        <a:latin typeface="Times New Roman" panose="02020603050405020304" pitchFamily="18" charset="0"/>
+                        <a:ea typeface="Times New Roman" panose="02020603050405020304" pitchFamily="18" charset="0"/>
+                        <a:cs typeface="Times New Roman" panose="02020603050405020304" pitchFamily="18" charset="0"/>
+                      </a:endParaRPr>
+                    </a:p>
+                  </a:txBody>
+                  <a:tcPr marL="25400" marR="25400" marT="25400" marB="25400">
+                    <a:lnL>
+                      <a:noFill/>
+                    </a:lnL>
+                    <a:lnR>
+                      <a:noFill/>
+                    </a:lnR>
+                    <a:lnT>
+                      <a:noFill/>
+                    </a:lnT>
+                    <a:lnB>
+                      <a:noFill/>
+                    </a:lnB>
+                    <a:solidFill>
+                      <a:srgbClr val="F0F0F0"/>
+                    </a:solidFill>
+                  </a:tcPr>
+                </a:tc>
+                <a:tc>
+                  <a:txBody>
+                    <a:bodyPr/>
+                    <a:lstStyle/>
+                    <a:p>
+                      <a:endParaRPr lang="en-US" sz="1200">
+                        <a:effectLst/>
+                        <a:latin typeface="Calibri" panose="020F0502020204030204" pitchFamily="34" charset="0"/>
+                        <a:cs typeface="Times New Roman" panose="02020603050405020304" pitchFamily="18" charset="0"/>
+                      </a:endParaRPr>
+                    </a:p>
+                  </a:txBody>
+                  <a:tcPr marL="25400" marR="25400" marT="25400" marB="25400" anchor="ctr">
+                    <a:lnL>
+                      <a:noFill/>
+                    </a:lnL>
+                    <a:lnR>
+                      <a:noFill/>
+                    </a:lnR>
+                    <a:lnT>
+                      <a:noFill/>
+                    </a:lnT>
+                    <a:lnB>
+                      <a:noFill/>
+                    </a:lnB>
+                    <a:solidFill>
+                      <a:srgbClr val="F0F0F0"/>
+                    </a:solidFill>
+                  </a:tcPr>
+                </a:tc>
+              </a:tr>
+              <a:tr h="0">
+                <a:tc>
+                  <a:txBody>
+                    <a:bodyPr/>
+                    <a:lstStyle/>
+                    <a:p>
+                      <a:pPr marL="0" marR="0">
+                        <a:spcBef>
+                          <a:spcPts val="0"/>
+                        </a:spcBef>
+                        <a:spcAft>
+                          <a:spcPts val="0"/>
+                        </a:spcAft>
+                      </a:pPr>
+                      <a:r>
+                        <a:rPr lang="en-US" sz="1100">
+                          <a:solidFill>
+                            <a:srgbClr val="000000"/>
+                          </a:solidFill>
+                          <a:effectLst/>
+                          <a:latin typeface="Calibri" panose="020F0502020204030204" pitchFamily="34" charset="0"/>
+                          <a:ea typeface="Times New Roman" panose="02020603050405020304" pitchFamily="18" charset="0"/>
+                          <a:cs typeface="Times New Roman" panose="02020603050405020304" pitchFamily="18" charset="0"/>
+                        </a:rPr>
+                        <a:t>TestRun</a:t>
+                      </a:r>
+                      <a:endParaRPr lang="en-US" sz="1200">
+                        <a:effectLst/>
+                        <a:latin typeface="Times New Roman" panose="02020603050405020304" pitchFamily="18" charset="0"/>
+                        <a:ea typeface="Times New Roman" panose="02020603050405020304" pitchFamily="18" charset="0"/>
+                        <a:cs typeface="Times New Roman" panose="02020603050405020304" pitchFamily="18" charset="0"/>
+                      </a:endParaRPr>
+                    </a:p>
+                  </a:txBody>
+                  <a:tcPr marL="25400" marR="25400" marT="25400" marB="25400">
+                    <a:lnL>
+                      <a:noFill/>
+                    </a:lnL>
+                    <a:lnR>
+                      <a:noFill/>
+                    </a:lnR>
+                    <a:lnT>
+                      <a:noFill/>
+                    </a:lnT>
+                    <a:lnB>
+                      <a:noFill/>
+                    </a:lnB>
+                    <a:solidFill>
+                      <a:srgbClr val="E4E4E4"/>
+                    </a:solidFill>
+                  </a:tcPr>
+                </a:tc>
+                <a:tc>
+                  <a:txBody>
+                    <a:bodyPr/>
+                    <a:lstStyle/>
+                    <a:p>
+                      <a:pPr marL="0" marR="0">
+                        <a:spcBef>
+                          <a:spcPts val="0"/>
+                        </a:spcBef>
+                        <a:spcAft>
+                          <a:spcPts val="0"/>
+                        </a:spcAft>
+                      </a:pPr>
+                      <a:r>
+                        <a:rPr lang="en-US" sz="1100">
+                          <a:solidFill>
+                            <a:srgbClr val="000000"/>
+                          </a:solidFill>
+                          <a:effectLst/>
+                          <a:latin typeface="Calibri" panose="020F0502020204030204" pitchFamily="34" charset="0"/>
+                          <a:ea typeface="Times New Roman" panose="02020603050405020304" pitchFamily="18" charset="0"/>
+                          <a:cs typeface="Times New Roman" panose="02020603050405020304" pitchFamily="18" charset="0"/>
+                        </a:rPr>
+                        <a:t>Primary fact table that contains transactional data associated with each test run available to the system. It contains foreign keys to allow for lookups to the dimensional tables.</a:t>
+                      </a:r>
+                      <a:endParaRPr lang="en-US" sz="1200">
+                        <a:effectLst/>
+                        <a:latin typeface="Times New Roman" panose="02020603050405020304" pitchFamily="18" charset="0"/>
+                        <a:ea typeface="Times New Roman" panose="02020603050405020304" pitchFamily="18" charset="0"/>
+                        <a:cs typeface="Times New Roman" panose="02020603050405020304" pitchFamily="18" charset="0"/>
+                      </a:endParaRPr>
+                    </a:p>
+                  </a:txBody>
+                  <a:tcPr marL="25400" marR="25400" marT="25400" marB="25400">
+                    <a:lnL>
+                      <a:noFill/>
+                    </a:lnL>
+                    <a:lnR>
+                      <a:noFill/>
+                    </a:lnR>
+                    <a:lnT>
+                      <a:noFill/>
+                    </a:lnT>
+                    <a:lnB>
+                      <a:noFill/>
+                    </a:lnB>
+                    <a:solidFill>
+                      <a:srgbClr val="E4E4E4"/>
+                    </a:solidFill>
+                  </a:tcPr>
+                </a:tc>
+              </a:tr>
+              <a:tr h="0">
+                <a:tc>
+                  <a:txBody>
+                    <a:bodyPr/>
+                    <a:lstStyle/>
+                    <a:p>
+                      <a:pPr marL="0" marR="0">
+                        <a:spcBef>
+                          <a:spcPts val="0"/>
+                        </a:spcBef>
+                        <a:spcAft>
+                          <a:spcPts val="0"/>
+                        </a:spcAft>
+                      </a:pPr>
+                      <a:r>
+                        <a:rPr lang="en-US" sz="1100">
+                          <a:solidFill>
+                            <a:srgbClr val="000000"/>
+                          </a:solidFill>
+                          <a:effectLst/>
+                          <a:latin typeface="Calibri" panose="020F0502020204030204" pitchFamily="34" charset="0"/>
+                          <a:ea typeface="Times New Roman" panose="02020603050405020304" pitchFamily="18" charset="0"/>
+                          <a:cs typeface="Times New Roman" panose="02020603050405020304" pitchFamily="18" charset="0"/>
+                        </a:rPr>
+                        <a:t>TestEngine</a:t>
+                      </a:r>
+                      <a:endParaRPr lang="en-US" sz="1200">
+                        <a:effectLst/>
+                        <a:latin typeface="Times New Roman" panose="02020603050405020304" pitchFamily="18" charset="0"/>
+                        <a:ea typeface="Times New Roman" panose="02020603050405020304" pitchFamily="18" charset="0"/>
+                        <a:cs typeface="Times New Roman" panose="02020603050405020304" pitchFamily="18" charset="0"/>
+                      </a:endParaRPr>
+                    </a:p>
+                  </a:txBody>
+                  <a:tcPr marL="25400" marR="25400" marT="25400" marB="25400">
+                    <a:lnL>
+                      <a:noFill/>
+                    </a:lnL>
+                    <a:lnR>
+                      <a:noFill/>
+                    </a:lnR>
+                    <a:lnT>
+                      <a:noFill/>
+                    </a:lnT>
+                    <a:lnB>
+                      <a:noFill/>
+                    </a:lnB>
+                    <a:solidFill>
+                      <a:srgbClr val="F0F0F0"/>
+                    </a:solidFill>
+                  </a:tcPr>
+                </a:tc>
+                <a:tc>
+                  <a:txBody>
+                    <a:bodyPr/>
+                    <a:lstStyle/>
+                    <a:p>
+                      <a:pPr marL="0" marR="0">
+                        <a:spcBef>
+                          <a:spcPts val="0"/>
+                        </a:spcBef>
+                        <a:spcAft>
+                          <a:spcPts val="0"/>
+                        </a:spcAft>
+                      </a:pPr>
+                      <a:r>
+                        <a:rPr lang="en-US" sz="1100">
+                          <a:solidFill>
+                            <a:srgbClr val="000000"/>
+                          </a:solidFill>
+                          <a:effectLst/>
+                          <a:latin typeface="Calibri" panose="020F0502020204030204" pitchFamily="34" charset="0"/>
+                          <a:ea typeface="Times New Roman" panose="02020603050405020304" pitchFamily="18" charset="0"/>
+                          <a:cs typeface="Times New Roman" panose="02020603050405020304" pitchFamily="18" charset="0"/>
+                        </a:rPr>
+                        <a:t>Contains data related to the test engine and whether is registered for remote use.</a:t>
+                      </a:r>
+                      <a:endParaRPr lang="en-US" sz="1200">
+                        <a:effectLst/>
+                        <a:latin typeface="Times New Roman" panose="02020603050405020304" pitchFamily="18" charset="0"/>
+                        <a:ea typeface="Times New Roman" panose="02020603050405020304" pitchFamily="18" charset="0"/>
+                        <a:cs typeface="Times New Roman" panose="02020603050405020304" pitchFamily="18" charset="0"/>
+                      </a:endParaRPr>
+                    </a:p>
+                  </a:txBody>
+                  <a:tcPr marL="25400" marR="25400" marT="25400" marB="25400">
+                    <a:lnL>
+                      <a:noFill/>
+                    </a:lnL>
+                    <a:lnR>
+                      <a:noFill/>
+                    </a:lnR>
+                    <a:lnT>
+                      <a:noFill/>
+                    </a:lnT>
+                    <a:lnB>
+                      <a:noFill/>
+                    </a:lnB>
+                    <a:solidFill>
+                      <a:srgbClr val="F0F0F0"/>
+                    </a:solidFill>
+                  </a:tcPr>
+                </a:tc>
+              </a:tr>
+              <a:tr h="0">
+                <a:tc>
+                  <a:txBody>
+                    <a:bodyPr/>
+                    <a:lstStyle/>
+                    <a:p>
+                      <a:pPr marL="0" marR="0">
+                        <a:spcBef>
+                          <a:spcPts val="0"/>
+                        </a:spcBef>
+                        <a:spcAft>
+                          <a:spcPts val="0"/>
+                        </a:spcAft>
+                      </a:pPr>
+                      <a:r>
+                        <a:rPr lang="en-US" sz="1100">
+                          <a:solidFill>
+                            <a:srgbClr val="000000"/>
+                          </a:solidFill>
+                          <a:effectLst/>
+                          <a:latin typeface="Calibri" panose="020F0502020204030204" pitchFamily="34" charset="0"/>
+                          <a:ea typeface="Times New Roman" panose="02020603050405020304" pitchFamily="18" charset="0"/>
+                          <a:cs typeface="Times New Roman" panose="02020603050405020304" pitchFamily="18" charset="0"/>
+                        </a:rPr>
+                        <a:t>TestEngineConfig</a:t>
+                      </a:r>
+                      <a:endParaRPr lang="en-US" sz="1200">
+                        <a:effectLst/>
+                        <a:latin typeface="Times New Roman" panose="02020603050405020304" pitchFamily="18" charset="0"/>
+                        <a:ea typeface="Times New Roman" panose="02020603050405020304" pitchFamily="18" charset="0"/>
+                        <a:cs typeface="Times New Roman" panose="02020603050405020304" pitchFamily="18" charset="0"/>
+                      </a:endParaRPr>
+                    </a:p>
+                  </a:txBody>
+                  <a:tcPr marL="25400" marR="25400" marT="25400" marB="25400">
+                    <a:lnL>
+                      <a:noFill/>
+                    </a:lnL>
+                    <a:lnR>
+                      <a:noFill/>
+                    </a:lnR>
+                    <a:lnT>
+                      <a:noFill/>
+                    </a:lnT>
+                    <a:lnB>
+                      <a:noFill/>
+                    </a:lnB>
+                    <a:solidFill>
+                      <a:srgbClr val="E4E4E4"/>
+                    </a:solidFill>
+                  </a:tcPr>
+                </a:tc>
+                <a:tc>
+                  <a:txBody>
+                    <a:bodyPr/>
+                    <a:lstStyle/>
+                    <a:p>
+                      <a:pPr marL="0" marR="0">
+                        <a:spcBef>
+                          <a:spcPts val="0"/>
+                        </a:spcBef>
+                        <a:spcAft>
+                          <a:spcPts val="0"/>
+                        </a:spcAft>
+                      </a:pPr>
+                      <a:r>
+                        <a:rPr lang="en-US" sz="1100">
+                          <a:solidFill>
+                            <a:srgbClr val="000000"/>
+                          </a:solidFill>
+                          <a:effectLst/>
+                          <a:latin typeface="Calibri" panose="020F0502020204030204" pitchFamily="34" charset="0"/>
+                          <a:ea typeface="Times New Roman" panose="02020603050405020304" pitchFamily="18" charset="0"/>
+                          <a:cs typeface="Times New Roman" panose="02020603050405020304" pitchFamily="18" charset="0"/>
+                        </a:rPr>
+                        <a:t>Stores configuration meta-data associated with registered test engines.</a:t>
+                      </a:r>
+                      <a:endParaRPr lang="en-US" sz="1200">
+                        <a:effectLst/>
+                        <a:latin typeface="Times New Roman" panose="02020603050405020304" pitchFamily="18" charset="0"/>
+                        <a:ea typeface="Times New Roman" panose="02020603050405020304" pitchFamily="18" charset="0"/>
+                        <a:cs typeface="Times New Roman" panose="02020603050405020304" pitchFamily="18" charset="0"/>
+                      </a:endParaRPr>
+                    </a:p>
+                  </a:txBody>
+                  <a:tcPr marL="25400" marR="25400" marT="25400" marB="25400">
+                    <a:lnL>
+                      <a:noFill/>
+                    </a:lnL>
+                    <a:lnR>
+                      <a:noFill/>
+                    </a:lnR>
+                    <a:lnT>
+                      <a:noFill/>
+                    </a:lnT>
+                    <a:lnB>
+                      <a:noFill/>
+                    </a:lnB>
+                    <a:solidFill>
+                      <a:srgbClr val="E4E4E4"/>
+                    </a:solidFill>
+                  </a:tcPr>
+                </a:tc>
+              </a:tr>
+              <a:tr h="0">
+                <a:tc>
+                  <a:txBody>
+                    <a:bodyPr/>
+                    <a:lstStyle/>
+                    <a:p>
+                      <a:pPr marL="0" marR="0">
+                        <a:spcBef>
+                          <a:spcPts val="0"/>
+                        </a:spcBef>
+                        <a:spcAft>
+                          <a:spcPts val="0"/>
+                        </a:spcAft>
+                      </a:pPr>
+                      <a:r>
+                        <a:rPr lang="en-US" sz="1100">
+                          <a:solidFill>
+                            <a:srgbClr val="000000"/>
+                          </a:solidFill>
+                          <a:effectLst/>
+                          <a:latin typeface="Calibri" panose="020F0502020204030204" pitchFamily="34" charset="0"/>
+                          <a:ea typeface="Times New Roman" panose="02020603050405020304" pitchFamily="18" charset="0"/>
+                          <a:cs typeface="Times New Roman" panose="02020603050405020304" pitchFamily="18" charset="0"/>
+                        </a:rPr>
+                        <a:t>TestCase</a:t>
+                      </a:r>
+                      <a:endParaRPr lang="en-US" sz="1200">
+                        <a:effectLst/>
+                        <a:latin typeface="Times New Roman" panose="02020603050405020304" pitchFamily="18" charset="0"/>
+                        <a:ea typeface="Times New Roman" panose="02020603050405020304" pitchFamily="18" charset="0"/>
+                        <a:cs typeface="Times New Roman" panose="02020603050405020304" pitchFamily="18" charset="0"/>
+                      </a:endParaRPr>
+                    </a:p>
+                  </a:txBody>
+                  <a:tcPr marL="25400" marR="25400" marT="25400" marB="25400">
+                    <a:lnL>
+                      <a:noFill/>
+                    </a:lnL>
+                    <a:lnR>
+                      <a:noFill/>
+                    </a:lnR>
+                    <a:lnT>
+                      <a:noFill/>
+                    </a:lnT>
+                    <a:lnB>
+                      <a:noFill/>
+                    </a:lnB>
+                    <a:solidFill>
+                      <a:srgbClr val="E4E4E4"/>
+                    </a:solidFill>
+                  </a:tcPr>
+                </a:tc>
+                <a:tc>
+                  <a:txBody>
+                    <a:bodyPr/>
+                    <a:lstStyle/>
+                    <a:p>
+                      <a:pPr marL="0" marR="0">
+                        <a:spcBef>
+                          <a:spcPts val="0"/>
+                        </a:spcBef>
+                        <a:spcAft>
+                          <a:spcPts val="0"/>
+                        </a:spcAft>
+                      </a:pPr>
+                      <a:r>
+                        <a:rPr lang="en-US" sz="1100">
+                          <a:solidFill>
+                            <a:srgbClr val="000000"/>
+                          </a:solidFill>
+                          <a:effectLst/>
+                          <a:latin typeface="Calibri" panose="020F0502020204030204" pitchFamily="34" charset="0"/>
+                          <a:ea typeface="Times New Roman" panose="02020603050405020304" pitchFamily="18" charset="0"/>
+                          <a:cs typeface="Times New Roman" panose="02020603050405020304" pitchFamily="18" charset="0"/>
+                        </a:rPr>
+                        <a:t>Paths for file-based test case content associated to a particular user and test engine.</a:t>
+                      </a:r>
+                      <a:endParaRPr lang="en-US" sz="1200">
+                        <a:effectLst/>
+                        <a:latin typeface="Times New Roman" panose="02020603050405020304" pitchFamily="18" charset="0"/>
+                        <a:ea typeface="Times New Roman" panose="02020603050405020304" pitchFamily="18" charset="0"/>
+                        <a:cs typeface="Times New Roman" panose="02020603050405020304" pitchFamily="18" charset="0"/>
+                      </a:endParaRPr>
+                    </a:p>
+                  </a:txBody>
+                  <a:tcPr marL="25400" marR="25400" marT="25400" marB="25400">
+                    <a:lnL>
+                      <a:noFill/>
+                    </a:lnL>
+                    <a:lnR>
+                      <a:noFill/>
+                    </a:lnR>
+                    <a:lnT>
+                      <a:noFill/>
+                    </a:lnT>
+                    <a:lnB>
+                      <a:noFill/>
+                    </a:lnB>
+                    <a:solidFill>
+                      <a:srgbClr val="E4E4E4"/>
+                    </a:solidFill>
+                  </a:tcPr>
+                </a:tc>
+              </a:tr>
+              <a:tr h="0">
+                <a:tc>
+                  <a:txBody>
+                    <a:bodyPr/>
+                    <a:lstStyle/>
+                    <a:p>
+                      <a:pPr marL="0" marR="0">
+                        <a:spcBef>
+                          <a:spcPts val="0"/>
+                        </a:spcBef>
+                        <a:spcAft>
+                          <a:spcPts val="0"/>
+                        </a:spcAft>
+                      </a:pPr>
+                      <a:r>
+                        <a:rPr lang="en-US" sz="1100">
+                          <a:solidFill>
+                            <a:srgbClr val="000000"/>
+                          </a:solidFill>
+                          <a:effectLst/>
+                          <a:latin typeface="Calibri" panose="020F0502020204030204" pitchFamily="34" charset="0"/>
+                          <a:ea typeface="Times New Roman" panose="02020603050405020304" pitchFamily="18" charset="0"/>
+                          <a:cs typeface="Times New Roman" panose="02020603050405020304" pitchFamily="18" charset="0"/>
+                        </a:rPr>
+                        <a:t>TestResult</a:t>
+                      </a:r>
+                      <a:endParaRPr lang="en-US" sz="1200">
+                        <a:effectLst/>
+                        <a:latin typeface="Times New Roman" panose="02020603050405020304" pitchFamily="18" charset="0"/>
+                        <a:ea typeface="Times New Roman" panose="02020603050405020304" pitchFamily="18" charset="0"/>
+                        <a:cs typeface="Times New Roman" panose="02020603050405020304" pitchFamily="18" charset="0"/>
+                      </a:endParaRPr>
+                    </a:p>
+                  </a:txBody>
+                  <a:tcPr marL="25400" marR="25400" marT="25400" marB="25400">
+                    <a:lnL>
+                      <a:noFill/>
+                    </a:lnL>
+                    <a:lnR>
+                      <a:noFill/>
+                    </a:lnR>
+                    <a:lnT>
+                      <a:noFill/>
+                    </a:lnT>
+                    <a:lnB>
+                      <a:noFill/>
+                    </a:lnB>
+                    <a:solidFill>
+                      <a:srgbClr val="E4E4E4"/>
+                    </a:solidFill>
+                  </a:tcPr>
+                </a:tc>
+                <a:tc>
+                  <a:txBody>
+                    <a:bodyPr/>
+                    <a:lstStyle/>
+                    <a:p>
+                      <a:pPr marL="0" marR="0">
+                        <a:spcBef>
+                          <a:spcPts val="0"/>
+                        </a:spcBef>
+                        <a:spcAft>
+                          <a:spcPts val="0"/>
+                        </a:spcAft>
+                      </a:pPr>
+                      <a:r>
+                        <a:rPr lang="en-US" sz="1100">
+                          <a:solidFill>
+                            <a:srgbClr val="000000"/>
+                          </a:solidFill>
+                          <a:effectLst/>
+                          <a:latin typeface="Calibri" panose="020F0502020204030204" pitchFamily="34" charset="0"/>
+                          <a:ea typeface="Times New Roman" panose="02020603050405020304" pitchFamily="18" charset="0"/>
+                          <a:cs typeface="Times New Roman" panose="02020603050405020304" pitchFamily="18" charset="0"/>
+                        </a:rPr>
+                        <a:t>Paths for file-based test case content associated to a particular user and test engine.</a:t>
+                      </a:r>
+                      <a:endParaRPr lang="en-US" sz="1200">
+                        <a:effectLst/>
+                        <a:latin typeface="Times New Roman" panose="02020603050405020304" pitchFamily="18" charset="0"/>
+                        <a:ea typeface="Times New Roman" panose="02020603050405020304" pitchFamily="18" charset="0"/>
+                        <a:cs typeface="Times New Roman" panose="02020603050405020304" pitchFamily="18" charset="0"/>
+                      </a:endParaRPr>
+                    </a:p>
+                  </a:txBody>
+                  <a:tcPr marL="25400" marR="25400" marT="25400" marB="25400">
+                    <a:lnL>
+                      <a:noFill/>
+                    </a:lnL>
+                    <a:lnR>
+                      <a:noFill/>
+                    </a:lnR>
+                    <a:lnT>
+                      <a:noFill/>
+                    </a:lnT>
+                    <a:lnB>
+                      <a:noFill/>
+                    </a:lnB>
+                    <a:solidFill>
+                      <a:srgbClr val="E4E4E4"/>
+                    </a:solidFill>
+                  </a:tcPr>
+                </a:tc>
+              </a:tr>
+              <a:tr h="0">
+                <a:tc>
+                  <a:txBody>
+                    <a:bodyPr/>
+                    <a:lstStyle/>
+                    <a:p>
+                      <a:pPr marL="0" marR="0">
+                        <a:spcBef>
+                          <a:spcPts val="0"/>
+                        </a:spcBef>
+                        <a:spcAft>
+                          <a:spcPts val="0"/>
+                        </a:spcAft>
+                      </a:pPr>
+                      <a:r>
+                        <a:rPr lang="en-US" sz="1100">
+                          <a:solidFill>
+                            <a:srgbClr val="000000"/>
+                          </a:solidFill>
+                          <a:effectLst/>
+                          <a:latin typeface="Calibri" panose="020F0502020204030204" pitchFamily="34" charset="0"/>
+                          <a:ea typeface="Times New Roman" panose="02020603050405020304" pitchFamily="18" charset="0"/>
+                          <a:cs typeface="Times New Roman" panose="02020603050405020304" pitchFamily="18" charset="0"/>
+                        </a:rPr>
+                        <a:t>UserConfig</a:t>
+                      </a:r>
+                      <a:endParaRPr lang="en-US" sz="1200">
+                        <a:effectLst/>
+                        <a:latin typeface="Times New Roman" panose="02020603050405020304" pitchFamily="18" charset="0"/>
+                        <a:ea typeface="Times New Roman" panose="02020603050405020304" pitchFamily="18" charset="0"/>
+                        <a:cs typeface="Times New Roman" panose="02020603050405020304" pitchFamily="18" charset="0"/>
+                      </a:endParaRPr>
+                    </a:p>
+                  </a:txBody>
+                  <a:tcPr marL="25400" marR="25400" marT="25400" marB="25400">
+                    <a:lnL>
+                      <a:noFill/>
+                    </a:lnL>
+                    <a:lnR>
+                      <a:noFill/>
+                    </a:lnR>
+                    <a:lnT>
+                      <a:noFill/>
+                    </a:lnT>
+                    <a:lnB>
+                      <a:noFill/>
+                    </a:lnB>
+                    <a:solidFill>
+                      <a:srgbClr val="F0F0F0"/>
+                    </a:solidFill>
+                  </a:tcPr>
+                </a:tc>
+                <a:tc>
+                  <a:txBody>
+                    <a:bodyPr/>
+                    <a:lstStyle/>
+                    <a:p>
+                      <a:pPr marL="0" marR="0">
+                        <a:spcBef>
+                          <a:spcPts val="0"/>
+                        </a:spcBef>
+                        <a:spcAft>
+                          <a:spcPts val="0"/>
+                        </a:spcAft>
+                      </a:pPr>
+                      <a:r>
+                        <a:rPr lang="en-US" sz="1100">
+                          <a:solidFill>
+                            <a:srgbClr val="000000"/>
+                          </a:solidFill>
+                          <a:effectLst/>
+                          <a:latin typeface="Calibri" panose="020F0502020204030204" pitchFamily="34" charset="0"/>
+                          <a:ea typeface="Times New Roman" panose="02020603050405020304" pitchFamily="18" charset="0"/>
+                          <a:cs typeface="Times New Roman" panose="02020603050405020304" pitchFamily="18" charset="0"/>
+                        </a:rPr>
+                        <a:t>Stores role information for users registered with the test server </a:t>
+                      </a:r>
+                      <a:endParaRPr lang="en-US" sz="1200">
+                        <a:effectLst/>
+                        <a:latin typeface="Times New Roman" panose="02020603050405020304" pitchFamily="18" charset="0"/>
+                        <a:ea typeface="Times New Roman" panose="02020603050405020304" pitchFamily="18" charset="0"/>
+                        <a:cs typeface="Times New Roman" panose="02020603050405020304" pitchFamily="18" charset="0"/>
+                      </a:endParaRPr>
+                    </a:p>
+                  </a:txBody>
+                  <a:tcPr marL="25400" marR="25400" marT="25400" marB="25400">
+                    <a:lnL>
+                      <a:noFill/>
+                    </a:lnL>
+                    <a:lnR>
+                      <a:noFill/>
+                    </a:lnR>
+                    <a:lnT>
+                      <a:noFill/>
+                    </a:lnT>
+                    <a:lnB>
+                      <a:noFill/>
+                    </a:lnB>
+                    <a:solidFill>
+                      <a:srgbClr val="F0F0F0"/>
+                    </a:solidFill>
+                  </a:tcPr>
+                </a:tc>
+              </a:tr>
+              <a:tr h="0">
+                <a:tc>
+                  <a:txBody>
+                    <a:bodyPr/>
+                    <a:lstStyle/>
+                    <a:p>
+                      <a:pPr marL="0" marR="0">
+                        <a:spcBef>
+                          <a:spcPts val="0"/>
+                        </a:spcBef>
+                        <a:spcAft>
+                          <a:spcPts val="0"/>
+                        </a:spcAft>
+                      </a:pPr>
+                      <a:r>
+                        <a:rPr lang="en-US" sz="1100">
+                          <a:solidFill>
+                            <a:srgbClr val="000000"/>
+                          </a:solidFill>
+                          <a:effectLst/>
+                          <a:latin typeface="Calibri" panose="020F0502020204030204" pitchFamily="34" charset="0"/>
+                          <a:ea typeface="Times New Roman" panose="02020603050405020304" pitchFamily="18" charset="0"/>
+                          <a:cs typeface="Times New Roman" panose="02020603050405020304" pitchFamily="18" charset="0"/>
+                        </a:rPr>
+                        <a:t>DesktopUI</a:t>
+                      </a:r>
+                      <a:endParaRPr lang="en-US" sz="1200">
+                        <a:effectLst/>
+                        <a:latin typeface="Times New Roman" panose="02020603050405020304" pitchFamily="18" charset="0"/>
+                        <a:ea typeface="Times New Roman" panose="02020603050405020304" pitchFamily="18" charset="0"/>
+                        <a:cs typeface="Times New Roman" panose="02020603050405020304" pitchFamily="18" charset="0"/>
+                      </a:endParaRPr>
+                    </a:p>
+                  </a:txBody>
+                  <a:tcPr marL="25400" marR="25400" marT="25400" marB="25400">
+                    <a:lnL>
+                      <a:noFill/>
+                    </a:lnL>
+                    <a:lnR>
+                      <a:noFill/>
+                    </a:lnR>
+                    <a:lnT>
+                      <a:noFill/>
+                    </a:lnT>
+                    <a:lnB>
+                      <a:noFill/>
+                    </a:lnB>
+                    <a:solidFill>
+                      <a:srgbClr val="F0F0F0"/>
+                    </a:solidFill>
+                  </a:tcPr>
+                </a:tc>
+                <a:tc>
+                  <a:txBody>
+                    <a:bodyPr/>
+                    <a:lstStyle/>
+                    <a:p>
+                      <a:pPr marL="0" marR="0">
+                        <a:spcBef>
+                          <a:spcPts val="0"/>
+                        </a:spcBef>
+                        <a:spcAft>
+                          <a:spcPts val="0"/>
+                        </a:spcAft>
+                      </a:pPr>
+                      <a:r>
+                        <a:rPr lang="en-US" sz="1100">
+                          <a:solidFill>
+                            <a:srgbClr val="000000"/>
+                          </a:solidFill>
+                          <a:effectLst/>
+                          <a:latin typeface="Calibri" panose="020F0502020204030204" pitchFamily="34" charset="0"/>
+                          <a:ea typeface="Times New Roman" panose="02020603050405020304" pitchFamily="18" charset="0"/>
+                          <a:cs typeface="Times New Roman" panose="02020603050405020304" pitchFamily="18" charset="0"/>
+                        </a:rPr>
+                        <a:t>Stores information about local users’ test engines which have been registered for remote use.</a:t>
+                      </a:r>
+                      <a:endParaRPr lang="en-US" sz="1200">
+                        <a:effectLst/>
+                        <a:latin typeface="Times New Roman" panose="02020603050405020304" pitchFamily="18" charset="0"/>
+                        <a:ea typeface="Times New Roman" panose="02020603050405020304" pitchFamily="18" charset="0"/>
+                        <a:cs typeface="Times New Roman" panose="02020603050405020304" pitchFamily="18" charset="0"/>
+                      </a:endParaRPr>
+                    </a:p>
+                  </a:txBody>
+                  <a:tcPr marL="25400" marR="25400" marT="25400" marB="25400">
+                    <a:lnL>
+                      <a:noFill/>
+                    </a:lnL>
+                    <a:lnR>
+                      <a:noFill/>
+                    </a:lnR>
+                    <a:lnT>
+                      <a:noFill/>
+                    </a:lnT>
+                    <a:lnB>
+                      <a:noFill/>
+                    </a:lnB>
+                    <a:solidFill>
+                      <a:srgbClr val="F0F0F0"/>
+                    </a:solidFill>
+                  </a:tcPr>
+                </a:tc>
+              </a:tr>
+              <a:tr h="0">
+                <a:tc>
+                  <a:txBody>
+                    <a:bodyPr/>
+                    <a:lstStyle/>
+                    <a:p>
+                      <a:pPr marL="0" marR="0">
+                        <a:spcBef>
+                          <a:spcPts val="0"/>
+                        </a:spcBef>
+                        <a:spcAft>
+                          <a:spcPts val="0"/>
+                        </a:spcAft>
+                      </a:pPr>
+                      <a:r>
+                        <a:rPr lang="en-US" sz="1100">
+                          <a:solidFill>
+                            <a:srgbClr val="000000"/>
+                          </a:solidFill>
+                          <a:effectLst/>
+                          <a:latin typeface="Calibri" panose="020F0502020204030204" pitchFamily="34" charset="0"/>
+                          <a:ea typeface="Times New Roman" panose="02020603050405020304" pitchFamily="18" charset="0"/>
+                          <a:cs typeface="Times New Roman" panose="02020603050405020304" pitchFamily="18" charset="0"/>
+                        </a:rPr>
+                        <a:t>WebUI</a:t>
+                      </a:r>
+                      <a:endParaRPr lang="en-US" sz="1200">
+                        <a:effectLst/>
+                        <a:latin typeface="Times New Roman" panose="02020603050405020304" pitchFamily="18" charset="0"/>
+                        <a:ea typeface="Times New Roman" panose="02020603050405020304" pitchFamily="18" charset="0"/>
+                        <a:cs typeface="Times New Roman" panose="02020603050405020304" pitchFamily="18" charset="0"/>
+                      </a:endParaRPr>
+                    </a:p>
+                  </a:txBody>
+                  <a:tcPr marL="25400" marR="25400" marT="25400" marB="25400">
+                    <a:lnL>
+                      <a:noFill/>
+                    </a:lnL>
+                    <a:lnR>
+                      <a:noFill/>
+                    </a:lnR>
+                    <a:lnT>
+                      <a:noFill/>
+                    </a:lnT>
+                    <a:lnB>
+                      <a:noFill/>
+                    </a:lnB>
+                    <a:solidFill>
+                      <a:srgbClr val="F0F0F0"/>
+                    </a:solidFill>
+                  </a:tcPr>
+                </a:tc>
+                <a:tc>
+                  <a:txBody>
+                    <a:bodyPr/>
+                    <a:lstStyle/>
+                    <a:p>
+                      <a:pPr marL="0" marR="0">
+                        <a:spcBef>
+                          <a:spcPts val="0"/>
+                        </a:spcBef>
+                        <a:spcAft>
+                          <a:spcPts val="0"/>
+                        </a:spcAft>
+                      </a:pPr>
+                      <a:r>
+                        <a:rPr lang="en-US" sz="1100" dirty="0">
+                          <a:solidFill>
+                            <a:srgbClr val="000000"/>
+                          </a:solidFill>
+                          <a:effectLst/>
+                          <a:latin typeface="Calibri" panose="020F0502020204030204" pitchFamily="34" charset="0"/>
+                          <a:ea typeface="Times New Roman" panose="02020603050405020304" pitchFamily="18" charset="0"/>
+                          <a:cs typeface="Times New Roman" panose="02020603050405020304" pitchFamily="18" charset="0"/>
+                        </a:rPr>
+                        <a:t>Stores information about remote users’ login status and test engines which have been selected for remote use.</a:t>
+                      </a:r>
+                      <a:endParaRPr lang="en-US" sz="1200" dirty="0">
+                        <a:effectLst/>
+                        <a:latin typeface="Times New Roman" panose="02020603050405020304" pitchFamily="18" charset="0"/>
+                        <a:ea typeface="Times New Roman" panose="02020603050405020304" pitchFamily="18" charset="0"/>
+                        <a:cs typeface="Times New Roman" panose="02020603050405020304" pitchFamily="18" charset="0"/>
+                      </a:endParaRPr>
+                    </a:p>
+                  </a:txBody>
+                  <a:tcPr marL="25400" marR="25400" marT="25400" marB="25400">
+                    <a:lnL>
+                      <a:noFill/>
+                    </a:lnL>
+                    <a:lnR>
+                      <a:noFill/>
+                    </a:lnR>
+                    <a:lnT>
+                      <a:noFill/>
+                    </a:lnT>
+                    <a:lnB>
+                      <a:noFill/>
+                    </a:lnB>
+                    <a:solidFill>
+                      <a:srgbClr val="F0F0F0"/>
+                    </a:solidFill>
+                  </a:tcPr>
+                </a:tc>
+              </a:tr>
+            </a:tbl>
+          </a:graphicData>
+        </a:graphic>
+      </p:graphicFrame>
+      <p:sp>
+        <p:nvSpPr>
+          <p:cNvPr id="5" name="Rectangle 4"/>
+          <p:cNvSpPr/>
+          <p:nvPr/>
         </p:nvSpPr>
         <p:spPr>
           <a:xfrm>
-            <a:off x="677334" y="1595886"/>
-            <a:ext cx="8596668" cy="4848045"/>
+            <a:off x="677334" y="5048061"/>
+            <a:ext cx="8252062" cy="430887"/>
           </a:xfrm>
+          <a:prstGeom prst="rect">
+            <a:avLst/>
+          </a:prstGeom>
         </p:spPr>
         <p:txBody>
-          <a:bodyPr>
-            <a:normAutofit fontScale="70000" lnSpcReduction="20000"/>
+          <a:bodyPr wrap="square">
+            <a:spAutoFit/>
           </a:bodyPr>
           <a:lstStyle/>
           <a:p>
             <a:r>
-              <a:rPr lang="en-US" b="1" dirty="0"/>
-              <a:t>3.1 	Availability Requirement 1: Continuous System Uptime</a:t>
-            </a:r>
-          </a:p>
-          <a:p>
-            <a:r>
-              <a:rPr lang="en-US" dirty="0"/>
-              <a:t>	The system shall support 24/7 availability. Routine downtime in a particular region necessary for 	maintenance or enhancement to the system shall take place after 21:00 EST on Saturday 	and shall end before 23:00 EST on Sunday. [1]</a:t>
-            </a:r>
-          </a:p>
-          <a:p>
-            <a:r>
-              <a:rPr lang="en-US" dirty="0"/>
-              <a:t>3.1.1     Any scheduled downtime which takes place outside of the designated hours shall be reported to 	users no less than 48 hours in advance. In the case of emergency system outage, the notice 	period shall be waived but users shall be informed as soon as possible of any unplanned system 	outages. [1]</a:t>
-            </a:r>
-          </a:p>
-          <a:p>
-            <a:r>
-              <a:rPr lang="en-US" b="1" dirty="0"/>
-              <a:t>3.2 	Availability Requirement 2: Recovery Time</a:t>
-            </a:r>
-          </a:p>
-          <a:p>
-            <a:r>
-              <a:rPr lang="en-US" dirty="0"/>
-              <a:t>	The system shall be able to quickly recover from outages due to unforeseen circumstances while 	minimizing downtime. The system shall support the ability to create and issue automated alerts 	when downtime is encountered for any of the reasons stated below. [1]</a:t>
-            </a:r>
-          </a:p>
-          <a:p>
-            <a:r>
-              <a:rPr lang="en-US" dirty="0"/>
-              <a:t>3.2.1     In the event of an unplanned outage due to the loss of a particular region or availability zone, 	the system shall immediately fail over to another region or availability zone as determined by 	the cloud provider. [1]</a:t>
-            </a:r>
-          </a:p>
-          <a:p>
-            <a:r>
-              <a:rPr lang="en-US" dirty="0"/>
-              <a:t>3.2.2      In the event of an unplanned outage due to the failure of an instance on which the system is          	hosted, the system shall immediately fail over to a backup instance. In the event a backup 	instance does not exist, the system shall have the ability to immediately spin up a new instance 	and fail over to it using automated deployment. [1]</a:t>
-            </a:r>
-          </a:p>
-          <a:p>
-            <a:r>
-              <a:rPr lang="en-US" dirty="0"/>
-              <a:t>3.2.3.    In the event of an unplanned outage in any or all regions due to a software error, the system 	shall support the ability to quickly identify and create a restore point from the last known 	working backup. This process shall take no more than 1 hour to complete from the time the 	software malfunction is identified. [1]</a:t>
-            </a:r>
-          </a:p>
-          <a:p>
-            <a:endParaRPr lang="en-US" dirty="0"/>
+              <a:rPr lang="en-US" sz="1100" dirty="0">
+                <a:latin typeface="Calibri" panose="020F0502020204030204" pitchFamily="34" charset="0"/>
+                <a:ea typeface="Times New Roman" panose="02020603050405020304" pitchFamily="18" charset="0"/>
+              </a:rPr>
+              <a:t>*This is not an exhaustive list of all possible tables in the system; additional temporary tables may be added as needed to process data and perform certain functions. </a:t>
+            </a:r>
+            <a:endParaRPr lang="en-US" sz="1100" dirty="0">
+              <a:effectLst/>
+              <a:latin typeface="Times New Roman" panose="02020603050405020304" pitchFamily="18" charset="0"/>
+              <a:ea typeface="Times New Roman" panose="02020603050405020304" pitchFamily="18" charset="0"/>
+            </a:endParaRPr>
           </a:p>
         </p:txBody>
       </p:sp>
     </p:spTree>
     <p:extLst>
       <p:ext uri="{BB962C8B-B14F-4D97-AF65-F5344CB8AC3E}">
-        <p14:creationId xmlns:p14="http://schemas.microsoft.com/office/powerpoint/2010/main" val="1676500678"/>
+        <p14:creationId xmlns:p14="http://schemas.microsoft.com/office/powerpoint/2010/main" val="2180823499"/>
       </p:ext>
     </p:extLst>
   </p:cSld>
@@ -14733,7 +16670,7 @@
           <a:p>
             <a:r>
               <a:rPr lang="en-US" dirty="0"/>
-              <a:t>Availability and Business Continuity</a:t>
+              <a:t>Thank You</a:t>
             </a:r>
           </a:p>
         </p:txBody>
@@ -14750,47 +16687,24 @@
         </p:nvSpPr>
         <p:spPr/>
         <p:txBody>
-          <a:bodyPr>
-            <a:normAutofit fontScale="92500" lnSpcReduction="10000"/>
-          </a:bodyPr>
-          <a:lstStyle/>
-          <a:p>
-            <a:r>
-              <a:rPr lang="en-US" b="1" dirty="0"/>
-              <a:t>3.3 	Availability Requirement 3: High Availability</a:t>
-            </a:r>
-          </a:p>
-          <a:p>
-            <a:r>
-              <a:rPr lang="en-US" dirty="0"/>
-              <a:t>	The system shall support high availability by being quickly accessible to users attempting to 	access it from any geographic region. [1]</a:t>
-            </a:r>
-          </a:p>
-          <a:p>
-            <a:r>
-              <a:rPr lang="en-US" dirty="0"/>
-              <a:t>3.3.1    The system homepage shall take no more than an average of five (5) seconds to load from the time the URL is input from a web browser in any geographic region. This average shall be taken 	from 10 consecutive attempts to access the homepage. [1]</a:t>
-            </a:r>
-          </a:p>
-          <a:p>
-            <a:r>
-              <a:rPr lang="en-US" dirty="0"/>
-              <a:t>3.3.2    Navigation actions (paging, links, etc.) should take no more than an average of three (3) seconds to load from the time the action is triggered. This average shall be taken from 10 consecutive attempts to perform the action. [1]</a:t>
-            </a:r>
-          </a:p>
-          <a:p>
-            <a:r>
-              <a:rPr lang="en-US" dirty="0"/>
-              <a:t>3.3.3	The system shall maintain all program code in scripts that can be deployed to the cloud platform. [1]</a:t>
-            </a:r>
-          </a:p>
-          <a:p>
-            <a:r>
-              <a:rPr lang="en-US" dirty="0"/>
-              <a:t>	3.3.3.1	Backup copies of all scripts shall be located in a separate region. [2]</a:t>
-            </a:r>
-          </a:p>
-          <a:p>
+          <a:bodyPr/>
+          <a:lstStyle/>
+          <a:p>
+            <a:r>
+              <a:rPr lang="en-US" dirty="0"/>
+              <a:t>Demo</a:t>
+            </a:r>
+          </a:p>
+          <a:p>
+            <a:r>
+              <a:rPr lang="en-US" dirty="0"/>
+              <a:t>Questions?</a:t>
+            </a:r>
+          </a:p>
+          <a:p>
+            <a:pPr marL="0" indent="0">
+              <a:buNone/>
+            </a:pPr>
             <a:endParaRPr lang="en-US" dirty="0"/>
           </a:p>
         </p:txBody>
@@ -14798,7 +16712,7 @@
     </p:spTree>
     <p:extLst>
       <p:ext uri="{BB962C8B-B14F-4D97-AF65-F5344CB8AC3E}">
-        <p14:creationId xmlns:p14="http://schemas.microsoft.com/office/powerpoint/2010/main" val="2344295902"/>
+        <p14:creationId xmlns:p14="http://schemas.microsoft.com/office/powerpoint/2010/main" val="3990466175"/>
       </p:ext>
     </p:extLst>
   </p:cSld>
@@ -14954,6 +16868,312 @@
 </file>
 
 <file path=ppt/slides/slide60.xml><?xml version="1.0" encoding="utf-8"?>
+<p:sld xmlns:a="http://schemas.openxmlformats.org/drawingml/2006/main" xmlns:r="http://schemas.openxmlformats.org/officeDocument/2006/relationships" xmlns:p="http://schemas.openxmlformats.org/presentationml/2006/main">
+  <p:cSld>
+    <p:spTree>
+      <p:nvGrpSpPr>
+        <p:cNvPr id="1" name=""/>
+        <p:cNvGrpSpPr/>
+        <p:nvPr/>
+      </p:nvGrpSpPr>
+      <p:grpSpPr>
+        <a:xfrm>
+          <a:off x="0" y="0"/>
+          <a:ext cx="0" cy="0"/>
+          <a:chOff x="0" y="0"/>
+          <a:chExt cx="0" cy="0"/>
+        </a:xfrm>
+      </p:grpSpPr>
+      <p:sp>
+        <p:nvSpPr>
+          <p:cNvPr id="2" name="Title 1"/>
+          <p:cNvSpPr>
+            <a:spLocks noGrp="1"/>
+          </p:cNvSpPr>
+          <p:nvPr>
+            <p:ph type="title"/>
+          </p:nvPr>
+        </p:nvSpPr>
+        <p:spPr/>
+        <p:txBody>
+          <a:bodyPr/>
+          <a:lstStyle/>
+          <a:p>
+            <a:r>
+              <a:rPr lang="en-US" dirty="0"/>
+              <a:t>Backup</a:t>
+            </a:r>
+          </a:p>
+        </p:txBody>
+      </p:sp>
+      <p:sp>
+        <p:nvSpPr>
+          <p:cNvPr id="3" name="Content Placeholder 2"/>
+          <p:cNvSpPr>
+            <a:spLocks noGrp="1"/>
+          </p:cNvSpPr>
+          <p:nvPr>
+            <p:ph idx="1"/>
+          </p:nvPr>
+        </p:nvSpPr>
+        <p:spPr/>
+        <p:txBody>
+          <a:bodyPr/>
+          <a:lstStyle/>
+          <a:p>
+            <a:endParaRPr lang="en-US"/>
+          </a:p>
+        </p:txBody>
+      </p:sp>
+    </p:spTree>
+    <p:extLst>
+      <p:ext uri="{BB962C8B-B14F-4D97-AF65-F5344CB8AC3E}">
+        <p14:creationId xmlns:p14="http://schemas.microsoft.com/office/powerpoint/2010/main" val="2771322857"/>
+      </p:ext>
+    </p:extLst>
+  </p:cSld>
+  <p:clrMapOvr>
+    <a:masterClrMapping/>
+  </p:clrMapOvr>
+</p:sld>
+</file>
+
+<file path=ppt/slides/slide61.xml><?xml version="1.0" encoding="utf-8"?>
+<p:sld xmlns:a="http://schemas.openxmlformats.org/drawingml/2006/main" xmlns:r="http://schemas.openxmlformats.org/officeDocument/2006/relationships" xmlns:p="http://schemas.openxmlformats.org/presentationml/2006/main">
+  <p:cSld>
+    <p:spTree>
+      <p:nvGrpSpPr>
+        <p:cNvPr id="1" name=""/>
+        <p:cNvGrpSpPr/>
+        <p:nvPr/>
+      </p:nvGrpSpPr>
+      <p:grpSpPr>
+        <a:xfrm>
+          <a:off x="0" y="0"/>
+          <a:ext cx="0" cy="0"/>
+          <a:chOff x="0" y="0"/>
+          <a:chExt cx="0" cy="0"/>
+        </a:xfrm>
+      </p:grpSpPr>
+      <p:sp>
+        <p:nvSpPr>
+          <p:cNvPr id="2" name="Title 1"/>
+          <p:cNvSpPr>
+            <a:spLocks noGrp="1"/>
+          </p:cNvSpPr>
+          <p:nvPr>
+            <p:ph type="title"/>
+          </p:nvPr>
+        </p:nvSpPr>
+        <p:spPr/>
+        <p:txBody>
+          <a:bodyPr/>
+          <a:lstStyle/>
+          <a:p>
+            <a:r>
+              <a:rPr lang="en-US" dirty="0"/>
+              <a:t>Availability and Business Continuity</a:t>
+            </a:r>
+          </a:p>
+        </p:txBody>
+      </p:sp>
+      <p:sp>
+        <p:nvSpPr>
+          <p:cNvPr id="3" name="Content Placeholder 2"/>
+          <p:cNvSpPr>
+            <a:spLocks noGrp="1"/>
+          </p:cNvSpPr>
+          <p:nvPr>
+            <p:ph idx="1"/>
+          </p:nvPr>
+        </p:nvSpPr>
+        <p:spPr>
+          <a:xfrm>
+            <a:off x="677334" y="1595886"/>
+            <a:ext cx="8596668" cy="4848045"/>
+          </a:xfrm>
+        </p:spPr>
+        <p:txBody>
+          <a:bodyPr>
+            <a:normAutofit fontScale="70000" lnSpcReduction="20000"/>
+          </a:bodyPr>
+          <a:lstStyle/>
+          <a:p>
+            <a:r>
+              <a:rPr lang="en-US" b="1" dirty="0"/>
+              <a:t>3.1 	Availability Requirement 1: Continuous System Uptime</a:t>
+            </a:r>
+          </a:p>
+          <a:p>
+            <a:r>
+              <a:rPr lang="en-US" dirty="0"/>
+              <a:t>	The system shall support 24/7 availability. Routine downtime in a particular region necessary for 	maintenance or enhancement to the system shall take place after 21:00 EST on Saturday 	and shall end before 23:00 EST on Sunday. [1]</a:t>
+            </a:r>
+          </a:p>
+          <a:p>
+            <a:r>
+              <a:rPr lang="en-US" dirty="0"/>
+              <a:t>3.1.1     Any scheduled downtime which takes place outside of the designated hours shall be reported to 	users no less than 48 hours in advance. In the case of emergency system outage, the notice 	period shall be waived but users shall be informed as soon as possible of any unplanned system 	outages. [1]</a:t>
+            </a:r>
+          </a:p>
+          <a:p>
+            <a:r>
+              <a:rPr lang="en-US" b="1" dirty="0"/>
+              <a:t>3.2 	Availability Requirement 2: Recovery Time</a:t>
+            </a:r>
+          </a:p>
+          <a:p>
+            <a:r>
+              <a:rPr lang="en-US" dirty="0"/>
+              <a:t>	The system shall be able to quickly recover from outages due to unforeseen circumstances while 	minimizing downtime. The system shall support the ability to create and issue automated alerts 	when downtime is encountered for any of the reasons stated below. [1]</a:t>
+            </a:r>
+          </a:p>
+          <a:p>
+            <a:r>
+              <a:rPr lang="en-US" dirty="0"/>
+              <a:t>3.2.1     In the event of an unplanned outage due to the loss of a particular region or availability zone, 	the system shall immediately fail over to another region or availability zone as determined by 	the cloud provider. [1]</a:t>
+            </a:r>
+          </a:p>
+          <a:p>
+            <a:r>
+              <a:rPr lang="en-US" dirty="0"/>
+              <a:t>3.2.2      In the event of an unplanned outage due to the failure of an instance on which the system is          	hosted, the system shall immediately fail over to a backup instance. In the event a backup 	instance does not exist, the system shall have the ability to immediately spin up a new instance 	and fail over to it using automated deployment. [1]</a:t>
+            </a:r>
+          </a:p>
+          <a:p>
+            <a:r>
+              <a:rPr lang="en-US" dirty="0"/>
+              <a:t>3.2.3.    In the event of an unplanned outage in any or all regions due to a software error, the system 	shall support the ability to quickly identify and create a restore point from the last known 	working backup. This process shall take no more than 1 hour to complete from the time the 	software malfunction is identified. [1]</a:t>
+            </a:r>
+          </a:p>
+          <a:p>
+            <a:endParaRPr lang="en-US" dirty="0"/>
+          </a:p>
+        </p:txBody>
+      </p:sp>
+    </p:spTree>
+    <p:extLst>
+      <p:ext uri="{BB962C8B-B14F-4D97-AF65-F5344CB8AC3E}">
+        <p14:creationId xmlns:p14="http://schemas.microsoft.com/office/powerpoint/2010/main" val="1676500678"/>
+      </p:ext>
+    </p:extLst>
+  </p:cSld>
+  <p:clrMapOvr>
+    <a:masterClrMapping/>
+  </p:clrMapOvr>
+</p:sld>
+</file>
+
+<file path=ppt/slides/slide62.xml><?xml version="1.0" encoding="utf-8"?>
+<p:sld xmlns:a="http://schemas.openxmlformats.org/drawingml/2006/main" xmlns:r="http://schemas.openxmlformats.org/officeDocument/2006/relationships" xmlns:p="http://schemas.openxmlformats.org/presentationml/2006/main">
+  <p:cSld>
+    <p:spTree>
+      <p:nvGrpSpPr>
+        <p:cNvPr id="1" name=""/>
+        <p:cNvGrpSpPr/>
+        <p:nvPr/>
+      </p:nvGrpSpPr>
+      <p:grpSpPr>
+        <a:xfrm>
+          <a:off x="0" y="0"/>
+          <a:ext cx="0" cy="0"/>
+          <a:chOff x="0" y="0"/>
+          <a:chExt cx="0" cy="0"/>
+        </a:xfrm>
+      </p:grpSpPr>
+      <p:sp>
+        <p:nvSpPr>
+          <p:cNvPr id="2" name="Title 1"/>
+          <p:cNvSpPr>
+            <a:spLocks noGrp="1"/>
+          </p:cNvSpPr>
+          <p:nvPr>
+            <p:ph type="title"/>
+          </p:nvPr>
+        </p:nvSpPr>
+        <p:spPr/>
+        <p:txBody>
+          <a:bodyPr/>
+          <a:lstStyle/>
+          <a:p>
+            <a:r>
+              <a:rPr lang="en-US" dirty="0"/>
+              <a:t>Availability and Business Continuity</a:t>
+            </a:r>
+          </a:p>
+        </p:txBody>
+      </p:sp>
+      <p:sp>
+        <p:nvSpPr>
+          <p:cNvPr id="3" name="Content Placeholder 2"/>
+          <p:cNvSpPr>
+            <a:spLocks noGrp="1"/>
+          </p:cNvSpPr>
+          <p:nvPr>
+            <p:ph idx="1"/>
+          </p:nvPr>
+        </p:nvSpPr>
+        <p:spPr/>
+        <p:txBody>
+          <a:bodyPr>
+            <a:normAutofit fontScale="92500" lnSpcReduction="10000"/>
+          </a:bodyPr>
+          <a:lstStyle/>
+          <a:p>
+            <a:r>
+              <a:rPr lang="en-US" b="1" dirty="0"/>
+              <a:t>3.3 	Availability Requirement 3: High Availability</a:t>
+            </a:r>
+          </a:p>
+          <a:p>
+            <a:r>
+              <a:rPr lang="en-US" dirty="0"/>
+              <a:t>	The system shall support high availability by being quickly accessible to users attempting to 	access it from any geographic region. [1]</a:t>
+            </a:r>
+          </a:p>
+          <a:p>
+            <a:r>
+              <a:rPr lang="en-US" dirty="0"/>
+              <a:t>3.3.1    The system homepage shall take no more than an average of five (5) seconds to load from the time the URL is input from a web browser in any geographic region. This average shall be taken 	from 10 consecutive attempts to access the homepage. [1]</a:t>
+            </a:r>
+          </a:p>
+          <a:p>
+            <a:r>
+              <a:rPr lang="en-US" dirty="0"/>
+              <a:t>3.3.2    Navigation actions (paging, links, etc.) should take no more than an average of three (3) seconds to load from the time the action is triggered. This average shall be taken from 10 consecutive attempts to perform the action. [1]</a:t>
+            </a:r>
+          </a:p>
+          <a:p>
+            <a:r>
+              <a:rPr lang="en-US" dirty="0"/>
+              <a:t>3.3.3	The system shall maintain all program code in scripts that can be deployed to the cloud platform. [1]</a:t>
+            </a:r>
+          </a:p>
+          <a:p>
+            <a:r>
+              <a:rPr lang="en-US" dirty="0"/>
+              <a:t>	3.3.3.1	Backup copies of all scripts shall be located in a separate region. [2]</a:t>
+            </a:r>
+          </a:p>
+          <a:p>
+            <a:endParaRPr lang="en-US" dirty="0"/>
+          </a:p>
+        </p:txBody>
+      </p:sp>
+    </p:spTree>
+    <p:extLst>
+      <p:ext uri="{BB962C8B-B14F-4D97-AF65-F5344CB8AC3E}">
+        <p14:creationId xmlns:p14="http://schemas.microsoft.com/office/powerpoint/2010/main" val="2344295902"/>
+      </p:ext>
+    </p:extLst>
+  </p:cSld>
+  <p:clrMapOvr>
+    <a:masterClrMapping/>
+  </p:clrMapOvr>
+</p:sld>
+</file>
+
+<file path=ppt/slides/slide63.xml><?xml version="1.0" encoding="utf-8"?>
 <p:sld xmlns:a="http://schemas.openxmlformats.org/drawingml/2006/main" xmlns:r="http://schemas.openxmlformats.org/officeDocument/2006/relationships" xmlns:p="http://schemas.openxmlformats.org/presentationml/2006/main">
   <p:cSld>
     <p:spTree>
@@ -15077,7 +17297,7 @@
           <a:graphicData uri="http://schemas.openxmlformats.org/presentationml/2006/ole">
             <mc:AlternateContent xmlns:mc="http://schemas.openxmlformats.org/markup-compatibility/2006">
               <mc:Choice xmlns:v="urn:schemas-microsoft-com:vml" Requires="v">
-                <p:oleObj spid="_x0000_s17416" name="Visio" r:id="rId3" imgW="6393145" imgH="5554980" progId="Visio.Drawing.15">
+                <p:oleObj spid="_x0000_s17418" name="Visio" r:id="rId3" imgW="6393145" imgH="5554980" progId="Visio.Drawing.15">
                   <p:embed/>
                 </p:oleObj>
               </mc:Choice>
@@ -15144,7 +17364,7 @@
 </p:sld>
 </file>
 
-<file path=ppt/slides/slide61.xml><?xml version="1.0" encoding="utf-8"?>
+<file path=ppt/slides/slide64.xml><?xml version="1.0" encoding="utf-8"?>
 <p:sld xmlns:a="http://schemas.openxmlformats.org/drawingml/2006/main" xmlns:r="http://schemas.openxmlformats.org/officeDocument/2006/relationships" xmlns:p="http://schemas.openxmlformats.org/presentationml/2006/main">
   <p:cSld>
     <p:spTree>
@@ -15273,7 +17493,7 @@
           <a:graphicData uri="http://schemas.openxmlformats.org/presentationml/2006/ole">
             <mc:AlternateContent xmlns:mc="http://schemas.openxmlformats.org/markup-compatibility/2006">
               <mc:Choice xmlns:v="urn:schemas-microsoft-com:vml" Requires="v">
-                <p:oleObj spid="_x0000_s19464" name="Visio" r:id="rId3" imgW="6164757" imgH="5554980" progId="Visio.Drawing.15">
+                <p:oleObj spid="_x0000_s19466" name="Visio" r:id="rId3" imgW="6164757" imgH="5554980" progId="Visio.Drawing.15">
                   <p:embed/>
                 </p:oleObj>
               </mc:Choice>

</xml_diff>

<commit_message>
Revisions for class submissions
</commit_message>
<xml_diff>
--- a/Test Framework Final Presentation.pptx
+++ b/Test Framework Final Presentation.pptx
@@ -924,7 +924,7 @@
             <a:fld id="{B61BEF0D-F0BB-DE4B-95CE-6DB70DBA9567}" type="datetimeFigureOut">
               <a:rPr lang="en-US" dirty="0"/>
               <a:pPr/>
-              <a:t>9/9/2020</a:t>
+              <a:t>9/11/2020</a:t>
             </a:fld>
             <a:endParaRPr lang="en-US" dirty="0"/>
           </a:p>
@@ -1172,7 +1172,7 @@
             <a:fld id="{B61BEF0D-F0BB-DE4B-95CE-6DB70DBA9567}" type="datetimeFigureOut">
               <a:rPr lang="en-US" dirty="0"/>
               <a:pPr/>
-              <a:t>9/9/2020</a:t>
+              <a:t>9/11/2020</a:t>
             </a:fld>
             <a:endParaRPr lang="en-US" dirty="0"/>
           </a:p>
@@ -1483,7 +1483,7 @@
             <a:fld id="{B61BEF0D-F0BB-DE4B-95CE-6DB70DBA9567}" type="datetimeFigureOut">
               <a:rPr lang="en-US" dirty="0"/>
               <a:pPr/>
-              <a:t>9/9/2020</a:t>
+              <a:t>9/11/2020</a:t>
             </a:fld>
             <a:endParaRPr lang="en-US" dirty="0"/>
           </a:p>
@@ -1813,7 +1813,7 @@
             <a:fld id="{B61BEF0D-F0BB-DE4B-95CE-6DB70DBA9567}" type="datetimeFigureOut">
               <a:rPr lang="en-US" dirty="0"/>
               <a:pPr/>
-              <a:t>9/9/2020</a:t>
+              <a:t>9/11/2020</a:t>
             </a:fld>
             <a:endParaRPr lang="en-US" dirty="0"/>
           </a:p>
@@ -2124,7 +2124,7 @@
             <a:fld id="{B61BEF0D-F0BB-DE4B-95CE-6DB70DBA9567}" type="datetimeFigureOut">
               <a:rPr lang="en-US" dirty="0"/>
               <a:pPr/>
-              <a:t>9/9/2020</a:t>
+              <a:t>9/11/2020</a:t>
             </a:fld>
             <a:endParaRPr lang="en-US" dirty="0"/>
           </a:p>
@@ -2514,7 +2514,7 @@
             <a:fld id="{B61BEF0D-F0BB-DE4B-95CE-6DB70DBA9567}" type="datetimeFigureOut">
               <a:rPr lang="en-US" dirty="0"/>
               <a:pPr/>
-              <a:t>9/9/2020</a:t>
+              <a:t>9/11/2020</a:t>
             </a:fld>
             <a:endParaRPr lang="en-US" dirty="0"/>
           </a:p>
@@ -2680,7 +2680,7 @@
           <a:p>
             <a:fld id="{55C6B4A9-1611-4792-9094-5F34BCA07E0B}" type="datetimeFigureOut">
               <a:rPr lang="en-US" dirty="0"/>
-              <a:t>9/9/2020</a:t>
+              <a:t>9/11/2020</a:t>
             </a:fld>
             <a:endParaRPr lang="en-US" dirty="0"/>
           </a:p>
@@ -2856,7 +2856,7 @@
             <a:fld id="{B61BEF0D-F0BB-DE4B-95CE-6DB70DBA9567}" type="datetimeFigureOut">
               <a:rPr lang="en-US" dirty="0"/>
               <a:pPr/>
-              <a:t>9/9/2020</a:t>
+              <a:t>9/11/2020</a:t>
             </a:fld>
             <a:endParaRPr lang="en-US" dirty="0"/>
           </a:p>
@@ -3022,7 +3022,7 @@
           <a:p>
             <a:fld id="{42A54C80-263E-416B-A8E0-580EDEADCBDC}" type="datetimeFigureOut">
               <a:rPr lang="en-US" dirty="0"/>
-              <a:t>9/9/2020</a:t>
+              <a:t>9/11/2020</a:t>
             </a:fld>
             <a:endParaRPr lang="en-US" dirty="0"/>
           </a:p>
@@ -3265,7 +3265,7 @@
             <a:fld id="{B61BEF0D-F0BB-DE4B-95CE-6DB70DBA9567}" type="datetimeFigureOut">
               <a:rPr lang="en-US" dirty="0"/>
               <a:pPr/>
-              <a:t>9/9/2020</a:t>
+              <a:t>9/11/2020</a:t>
             </a:fld>
             <a:endParaRPr lang="en-US" dirty="0"/>
           </a:p>
@@ -3493,7 +3493,7 @@
           <a:p>
             <a:fld id="{42A54C80-263E-416B-A8E0-580EDEADCBDC}" type="datetimeFigureOut">
               <a:rPr lang="en-US" dirty="0"/>
-              <a:t>9/9/2020</a:t>
+              <a:t>9/11/2020</a:t>
             </a:fld>
             <a:endParaRPr lang="en-US" dirty="0"/>
           </a:p>
@@ -3863,7 +3863,7 @@
             <a:fld id="{B61BEF0D-F0BB-DE4B-95CE-6DB70DBA9567}" type="datetimeFigureOut">
               <a:rPr lang="en-US" dirty="0"/>
               <a:pPr/>
-              <a:t>9/9/2020</a:t>
+              <a:t>9/11/2020</a:t>
             </a:fld>
             <a:endParaRPr lang="en-US" dirty="0"/>
           </a:p>
@@ -3983,7 +3983,7 @@
             <a:fld id="{B61BEF0D-F0BB-DE4B-95CE-6DB70DBA9567}" type="datetimeFigureOut">
               <a:rPr lang="en-US" dirty="0"/>
               <a:pPr/>
-              <a:t>9/9/2020</a:t>
+              <a:t>9/11/2020</a:t>
             </a:fld>
             <a:endParaRPr lang="en-US" dirty="0"/>
           </a:p>
@@ -4075,7 +4075,7 @@
             <a:fld id="{B61BEF0D-F0BB-DE4B-95CE-6DB70DBA9567}" type="datetimeFigureOut">
               <a:rPr lang="en-US" dirty="0"/>
               <a:pPr/>
-              <a:t>9/9/2020</a:t>
+              <a:t>9/11/2020</a:t>
             </a:fld>
             <a:endParaRPr lang="en-US" dirty="0"/>
           </a:p>
@@ -4326,7 +4326,7 @@
           <a:p>
             <a:fld id="{42A54C80-263E-416B-A8E0-580EDEADCBDC}" type="datetimeFigureOut">
               <a:rPr lang="en-US" dirty="0"/>
-              <a:t>9/9/2020</a:t>
+              <a:t>9/11/2020</a:t>
             </a:fld>
             <a:endParaRPr lang="en-US" dirty="0"/>
           </a:p>
@@ -4628,7 +4628,7 @@
             <a:fld id="{B61BEF0D-F0BB-DE4B-95CE-6DB70DBA9567}" type="datetimeFigureOut">
               <a:rPr lang="en-US" dirty="0"/>
               <a:pPr/>
-              <a:t>9/9/2020</a:t>
+              <a:t>9/11/2020</a:t>
             </a:fld>
             <a:endParaRPr lang="en-US" dirty="0"/>
           </a:p>
@@ -5326,7 +5326,7 @@
             <a:fld id="{B61BEF0D-F0BB-DE4B-95CE-6DB70DBA9567}" type="datetimeFigureOut">
               <a:rPr lang="en-US" dirty="0"/>
               <a:pPr/>
-              <a:t>9/9/2020</a:t>
+              <a:t>9/11/2020</a:t>
             </a:fld>
             <a:endParaRPr lang="en-US" dirty="0"/>
           </a:p>
@@ -6153,7 +6153,7 @@
           <p:cNvPr id="2" name="Title 1">
             <a:extLst>
               <a:ext uri="{FF2B5EF4-FFF2-40B4-BE49-F238E27FC236}">
-                <a16:creationId xmlns="" xmlns:a16="http://schemas.microsoft.com/office/drawing/2014/main" id="{3016A5BA-F72A-4CD9-AF4C-68ADAC202004}"/>
+                <a16:creationId xmlns:a16="http://schemas.microsoft.com/office/drawing/2014/main" xmlns="" id="{3016A5BA-F72A-4CD9-AF4C-68ADAC202004}"/>
               </a:ext>
             </a:extLst>
           </p:cNvPr>
@@ -6181,7 +6181,7 @@
           <p:cNvPr id="3" name="Content Placeholder 2">
             <a:extLst>
               <a:ext uri="{FF2B5EF4-FFF2-40B4-BE49-F238E27FC236}">
-                <a16:creationId xmlns="" xmlns:a16="http://schemas.microsoft.com/office/drawing/2014/main" id="{BAC61804-0702-4E9C-9632-1F546949E17F}"/>
+                <a16:creationId xmlns:a16="http://schemas.microsoft.com/office/drawing/2014/main" xmlns="" id="{BAC61804-0702-4E9C-9632-1F546949E17F}"/>
               </a:ext>
             </a:extLst>
           </p:cNvPr>
@@ -7738,82 +7738,30 @@
           </a:p>
         </p:txBody>
       </p:sp>
-      <p:graphicFrame>
-        <p:nvGraphicFramePr>
-          <p:cNvPr id="7" name="Object 6"/>
-          <p:cNvGraphicFramePr>
-            <a:graphicFrameLocks noChangeAspect="1"/>
-          </p:cNvGraphicFramePr>
-          <p:nvPr>
-            <p:extLst>
-              <p:ext uri="{D42A27DB-BD31-4B8C-83A1-F6EECF244321}">
-                <p14:modId xmlns:p14="http://schemas.microsoft.com/office/powerpoint/2010/main" val="3932741783"/>
-              </p:ext>
-            </p:extLst>
-          </p:nvPr>
-        </p:nvGraphicFramePr>
-        <p:xfrm>
-          <a:off x="2145323" y="2532184"/>
-          <a:ext cx="5943600" cy="3565525"/>
-        </p:xfrm>
-        <a:graphic>
-          <a:graphicData uri="http://schemas.openxmlformats.org/presentationml/2006/ole">
-            <mc:AlternateContent xmlns:mc="http://schemas.openxmlformats.org/markup-compatibility/2006">
-              <mc:Choice xmlns:v="urn:schemas-microsoft-com:vml" Requires="v">
-                <p:oleObj spid="_x0000_s1048" name="Visio" r:id="rId3" imgW="7657994" imgH="4595001" progId="Visio.Drawing.15">
-                  <p:embed/>
-                </p:oleObj>
-              </mc:Choice>
-              <mc:Fallback>
-                <p:oleObj name="Visio" r:id="rId3" imgW="7657994" imgH="4595001" progId="Visio.Drawing.15">
-                  <p:embed/>
-                  <p:pic>
-                    <p:nvPicPr>
-                      <p:cNvPr id="0" name="Object 3"/>
-                      <p:cNvPicPr>
-                        <a:picLocks noChangeAspect="1" noChangeArrowheads="1"/>
-                      </p:cNvPicPr>
-                      <p:nvPr/>
-                    </p:nvPicPr>
-                    <p:blipFill>
-                      <a:blip r:embed="rId4">
-                        <a:extLst>
-                          <a:ext uri="{28A0092B-C50C-407E-A947-70E740481C1C}">
-                            <a14:useLocalDpi xmlns:a14="http://schemas.microsoft.com/office/drawing/2010/main" val="0"/>
-                          </a:ext>
-                        </a:extLst>
-                      </a:blip>
-                      <a:srcRect/>
-                      <a:stretch>
-                        <a:fillRect/>
-                      </a:stretch>
-                    </p:blipFill>
-                    <p:spPr bwMode="auto">
-                      <a:xfrm>
-                        <a:off x="2145323" y="2532184"/>
-                        <a:ext cx="5943600" cy="3565525"/>
-                      </a:xfrm>
-                      <a:prstGeom prst="rect">
-                        <a:avLst/>
-                      </a:prstGeom>
-                      <a:noFill/>
-                      <a:extLst>
-                        <a:ext uri="{909E8E84-426E-40DD-AFC4-6F175D3DCCD1}">
-                          <a14:hiddenFill xmlns:a14="http://schemas.microsoft.com/office/drawing/2010/main">
-                            <a:solidFill>
-                              <a:srgbClr val="FFFFFF"/>
-                            </a:solidFill>
-                          </a14:hiddenFill>
-                        </a:ext>
-                      </a:extLst>
-                    </p:spPr>
-                  </p:pic>
-                </p:oleObj>
-              </mc:Fallback>
-            </mc:AlternateContent>
-          </a:graphicData>
-        </a:graphic>
-      </p:graphicFrame>
+      <p:pic>
+        <p:nvPicPr>
+          <p:cNvPr id="3" name="Picture 2"/>
+          <p:cNvPicPr>
+            <a:picLocks noChangeAspect="1"/>
+          </p:cNvPicPr>
+          <p:nvPr/>
+        </p:nvPicPr>
+        <p:blipFill>
+          <a:blip r:embed="rId2"/>
+          <a:stretch>
+            <a:fillRect/>
+          </a:stretch>
+        </p:blipFill>
+        <p:spPr>
+          <a:xfrm>
+            <a:off x="1188258" y="1463688"/>
+            <a:ext cx="7574820" cy="4937111"/>
+          </a:xfrm>
+          <a:prstGeom prst="rect">
+            <a:avLst/>
+          </a:prstGeom>
+        </p:spPr>
+      </p:pic>
     </p:spTree>
     <p:extLst>
       <p:ext uri="{BB962C8B-B14F-4D97-AF65-F5344CB8AC3E}">
@@ -8106,73 +8054,30 @@
           </a:p>
         </p:txBody>
       </p:sp>
-      <p:graphicFrame>
-        <p:nvGraphicFramePr>
-          <p:cNvPr id="9" name="Object 8"/>
-          <p:cNvGraphicFramePr>
-            <a:graphicFrameLocks noChangeAspect="1"/>
-          </p:cNvGraphicFramePr>
-          <p:nvPr>
-            <p:extLst>
-              <p:ext uri="{D42A27DB-BD31-4B8C-83A1-F6EECF244321}">
-                <p14:modId xmlns:p14="http://schemas.microsoft.com/office/powerpoint/2010/main" val="2556782306"/>
-              </p:ext>
-            </p:extLst>
-          </p:nvPr>
-        </p:nvGraphicFramePr>
-        <p:xfrm>
-          <a:off x="731437" y="1326451"/>
-          <a:ext cx="7577294" cy="5224462"/>
-        </p:xfrm>
-        <a:graphic>
-          <a:graphicData uri="http://schemas.openxmlformats.org/presentationml/2006/ole">
-            <mc:AlternateContent xmlns:mc="http://schemas.openxmlformats.org/markup-compatibility/2006">
-              <mc:Choice xmlns:v="urn:schemas-microsoft-com:vml" Requires="v">
-                <p:oleObj spid="_x0000_s2074" name="Visio" r:id="rId3" imgW="9349846" imgH="6446661" progId="Visio.Drawing.15">
-                  <p:embed/>
-                </p:oleObj>
-              </mc:Choice>
-              <mc:Fallback>
-                <p:oleObj name="Visio" r:id="rId3" imgW="9349846" imgH="6446661" progId="Visio.Drawing.15">
-                  <p:embed/>
-                  <p:pic>
-                    <p:nvPicPr>
-                      <p:cNvPr id="0" name="Object 3"/>
-                      <p:cNvPicPr>
-                        <a:picLocks noChangeAspect="1" noChangeArrowheads="1"/>
-                      </p:cNvPicPr>
-                      <p:nvPr/>
-                    </p:nvPicPr>
-                    <p:blipFill>
-                      <a:blip r:embed="rId4">
-                        <a:extLst>
-                          <a:ext uri="{28A0092B-C50C-407E-A947-70E740481C1C}">
-                            <a14:useLocalDpi xmlns:a14="http://schemas.microsoft.com/office/drawing/2010/main" val="0"/>
-                          </a:ext>
-                        </a:extLst>
-                      </a:blip>
-                      <a:srcRect/>
-                      <a:stretch>
-                        <a:fillRect/>
-                      </a:stretch>
-                    </p:blipFill>
-                    <p:spPr bwMode="auto">
-                      <a:xfrm>
-                        <a:off x="731437" y="1326451"/>
-                        <a:ext cx="7577294" cy="5224462"/>
-                      </a:xfrm>
-                      <a:prstGeom prst="rect">
-                        <a:avLst/>
-                      </a:prstGeom>
-                      <a:noFill/>
-                    </p:spPr>
-                  </p:pic>
-                </p:oleObj>
-              </mc:Fallback>
-            </mc:AlternateContent>
-          </a:graphicData>
-        </a:graphic>
-      </p:graphicFrame>
+      <p:pic>
+        <p:nvPicPr>
+          <p:cNvPr id="3" name="Picture 2"/>
+          <p:cNvPicPr>
+            <a:picLocks noChangeAspect="1"/>
+          </p:cNvPicPr>
+          <p:nvPr/>
+        </p:nvPicPr>
+        <p:blipFill>
+          <a:blip r:embed="rId2"/>
+          <a:stretch>
+            <a:fillRect/>
+          </a:stretch>
+        </p:blipFill>
+        <p:spPr>
+          <a:xfrm>
+            <a:off x="594596" y="1156896"/>
+            <a:ext cx="8204171" cy="5673363"/>
+          </a:xfrm>
+          <a:prstGeom prst="rect">
+            <a:avLst/>
+          </a:prstGeom>
+        </p:spPr>
+      </p:pic>
     </p:spTree>
     <p:extLst>
       <p:ext uri="{BB962C8B-B14F-4D97-AF65-F5344CB8AC3E}">
@@ -8604,7 +8509,7 @@
           <p:cNvPr id="6" name="Picture 5">
             <a:extLst>
               <a:ext uri="{FF2B5EF4-FFF2-40B4-BE49-F238E27FC236}">
-                <a16:creationId xmlns="" xmlns:a16="http://schemas.microsoft.com/office/drawing/2014/main" id="{2CE94564-7E21-42B5-B0C3-7B175B692FB4}"/>
+                <a16:creationId xmlns:a16="http://schemas.microsoft.com/office/drawing/2014/main" xmlns="" id="{2CE94564-7E21-42B5-B0C3-7B175B692FB4}"/>
               </a:ext>
             </a:extLst>
           </p:cNvPr>
@@ -8634,7 +8539,7 @@
           <p:cNvPr id="8" name="Picture 7">
             <a:extLst>
               <a:ext uri="{FF2B5EF4-FFF2-40B4-BE49-F238E27FC236}">
-                <a16:creationId xmlns="" xmlns:a16="http://schemas.microsoft.com/office/drawing/2014/main" id="{9A5C1814-5B60-480F-9900-D25FA371C13D}"/>
+                <a16:creationId xmlns:a16="http://schemas.microsoft.com/office/drawing/2014/main" xmlns="" id="{9A5C1814-5B60-480F-9900-D25FA371C13D}"/>
               </a:ext>
             </a:extLst>
           </p:cNvPr>
@@ -8744,7 +8649,7 @@
           <a:graphicData uri="http://schemas.openxmlformats.org/presentationml/2006/ole">
             <mc:AlternateContent xmlns:mc="http://schemas.openxmlformats.org/markup-compatibility/2006">
               <mc:Choice xmlns:v="urn:schemas-microsoft-com:vml" Requires="v">
-                <p:oleObj spid="_x0000_s3096" name="Visio" r:id="rId5" imgW="4667213" imgH="5038832" progId="Visio.Drawing.15">
+                <p:oleObj spid="_x0000_s3098" name="Visio" r:id="rId5" imgW="4667213" imgH="5038832" progId="Visio.Drawing.15">
                   <p:embed/>
                 </p:oleObj>
               </mc:Choice>
@@ -9124,7 +9029,7 @@
           <a:graphicData uri="http://schemas.openxmlformats.org/presentationml/2006/ole">
             <mc:AlternateContent xmlns:mc="http://schemas.openxmlformats.org/markup-compatibility/2006">
               <mc:Choice xmlns:v="urn:schemas-microsoft-com:vml" Requires="v">
-                <p:oleObj spid="_x0000_s4119" name="Visio" r:id="rId3" imgW="6749898" imgH="5289535" progId="Visio.Drawing.15">
+                <p:oleObj spid="_x0000_s4121" name="Visio" r:id="rId3" imgW="6749898" imgH="5289535" progId="Visio.Drawing.15">
                   <p:embed/>
                 </p:oleObj>
               </mc:Choice>
@@ -9211,7 +9116,7 @@
         </p:nvSpPr>
         <p:spPr>
           <a:xfrm>
-            <a:off x="625576" y="221411"/>
+            <a:off x="625576" y="0"/>
             <a:ext cx="9389692" cy="615351"/>
           </a:xfrm>
         </p:spPr>
@@ -9291,73 +9196,30 @@
           </a:p>
         </p:txBody>
       </p:sp>
-      <p:graphicFrame>
-        <p:nvGraphicFramePr>
-          <p:cNvPr id="4" name="Object 3"/>
-          <p:cNvGraphicFramePr>
-            <a:graphicFrameLocks noChangeAspect="1"/>
-          </p:cNvGraphicFramePr>
-          <p:nvPr>
-            <p:extLst>
-              <p:ext uri="{D42A27DB-BD31-4B8C-83A1-F6EECF244321}">
-                <p14:modId xmlns:p14="http://schemas.microsoft.com/office/powerpoint/2010/main" val="173023853"/>
-              </p:ext>
-            </p:extLst>
-          </p:nvPr>
-        </p:nvGraphicFramePr>
-        <p:xfrm>
-          <a:off x="724619" y="923026"/>
-          <a:ext cx="8669625" cy="5676181"/>
-        </p:xfrm>
-        <a:graphic>
-          <a:graphicData uri="http://schemas.openxmlformats.org/presentationml/2006/ole">
-            <mc:AlternateContent xmlns:mc="http://schemas.openxmlformats.org/markup-compatibility/2006">
-              <mc:Choice xmlns:v="urn:schemas-microsoft-com:vml" Requires="v">
-                <p:oleObj spid="_x0000_s5141" name="Visio" r:id="rId3" imgW="13167360" imgH="8610537" progId="Visio.Drawing.15">
-                  <p:embed/>
-                </p:oleObj>
-              </mc:Choice>
-              <mc:Fallback>
-                <p:oleObj name="Visio" r:id="rId3" imgW="13167360" imgH="8610537" progId="Visio.Drawing.15">
-                  <p:embed/>
-                  <p:pic>
-                    <p:nvPicPr>
-                      <p:cNvPr id="0" name="Object 1"/>
-                      <p:cNvPicPr>
-                        <a:picLocks noChangeAspect="1" noChangeArrowheads="1"/>
-                      </p:cNvPicPr>
-                      <p:nvPr/>
-                    </p:nvPicPr>
-                    <p:blipFill>
-                      <a:blip r:embed="rId4">
-                        <a:extLst>
-                          <a:ext uri="{28A0092B-C50C-407E-A947-70E740481C1C}">
-                            <a14:useLocalDpi xmlns:a14="http://schemas.microsoft.com/office/drawing/2010/main" val="0"/>
-                          </a:ext>
-                        </a:extLst>
-                      </a:blip>
-                      <a:srcRect/>
-                      <a:stretch>
-                        <a:fillRect/>
-                      </a:stretch>
-                    </p:blipFill>
-                    <p:spPr bwMode="auto">
-                      <a:xfrm>
-                        <a:off x="724619" y="923026"/>
-                        <a:ext cx="8669625" cy="5676181"/>
-                      </a:xfrm>
-                      <a:prstGeom prst="rect">
-                        <a:avLst/>
-                      </a:prstGeom>
-                      <a:noFill/>
-                    </p:spPr>
-                  </p:pic>
-                </p:oleObj>
-              </mc:Fallback>
-            </mc:AlternateContent>
-          </a:graphicData>
-        </a:graphic>
-      </p:graphicFrame>
+      <p:pic>
+        <p:nvPicPr>
+          <p:cNvPr id="5" name="Picture 4"/>
+          <p:cNvPicPr>
+            <a:picLocks noChangeAspect="1"/>
+          </p:cNvPicPr>
+          <p:nvPr/>
+        </p:nvPicPr>
+        <p:blipFill>
+          <a:blip r:embed="rId2"/>
+          <a:stretch>
+            <a:fillRect/>
+          </a:stretch>
+        </p:blipFill>
+        <p:spPr>
+          <a:xfrm>
+            <a:off x="0" y="482005"/>
+            <a:ext cx="8902358" cy="6375995"/>
+          </a:xfrm>
+          <a:prstGeom prst="rect">
+            <a:avLst/>
+          </a:prstGeom>
+        </p:spPr>
+      </p:pic>
     </p:spTree>
     <p:extLst>
       <p:ext uri="{BB962C8B-B14F-4D97-AF65-F5344CB8AC3E}">
@@ -9559,7 +9421,7 @@
         <p:spPr/>
         <p:txBody>
           <a:bodyPr>
-            <a:normAutofit lnSpcReduction="10000"/>
+            <a:normAutofit fontScale="92500" lnSpcReduction="10000"/>
           </a:bodyPr>
           <a:lstStyle/>
           <a:p>
@@ -9571,7 +9433,15 @@
           <a:p>
             <a:r>
               <a:rPr lang="en-US" dirty="0"/>
-              <a:t>The Client-Server pattern was chosen for the remote installation.</a:t>
+              <a:t>The </a:t>
+            </a:r>
+            <a:r>
+              <a:rPr lang="en-US" dirty="0" smtClean="0"/>
+              <a:t>Multi-tier Client-Server </a:t>
+            </a:r>
+            <a:r>
+              <a:rPr lang="en-US" dirty="0"/>
+              <a:t>pattern was chosen for the remote installation.</a:t>
             </a:r>
           </a:p>
           <a:p>
@@ -9624,8 +9494,13 @@
           <a:p>
             <a:r>
               <a:rPr lang="en-US" dirty="0"/>
-              <a:t>The Test Engine(s) are resources consumed by the Test Framework System.</a:t>
-            </a:r>
+              <a:t>The Test Engine(s) are resources consumed by the Test Framework </a:t>
+            </a:r>
+            <a:r>
+              <a:rPr lang="en-US" dirty="0" smtClean="0"/>
+              <a:t>System and can be considered another tier of the Client Server Pattern.</a:t>
+            </a:r>
+            <a:endParaRPr lang="en-US" dirty="0"/>
           </a:p>
           <a:p>
             <a:endParaRPr lang="en-US" dirty="0"/>
@@ -9672,7 +9547,12 @@
             <p:ph type="title"/>
           </p:nvPr>
         </p:nvSpPr>
-        <p:spPr/>
+        <p:spPr>
+          <a:xfrm>
+            <a:off x="599696" y="137065"/>
+            <a:ext cx="8596668" cy="682444"/>
+          </a:xfrm>
+        </p:spPr>
         <p:txBody>
           <a:bodyPr/>
           <a:lstStyle/>
@@ -9696,13 +9576,13 @@
         </p:nvSpPr>
         <p:spPr>
           <a:xfrm>
-            <a:off x="677334" y="1457865"/>
-            <a:ext cx="8596668" cy="4583498"/>
+            <a:off x="677334" y="1017916"/>
+            <a:ext cx="8596668" cy="5469147"/>
           </a:xfrm>
         </p:spPr>
         <p:txBody>
           <a:bodyPr>
-            <a:normAutofit fontScale="92500" lnSpcReduction="10000"/>
+            <a:normAutofit fontScale="92500" lnSpcReduction="20000"/>
           </a:bodyPr>
           <a:lstStyle/>
           <a:p>
@@ -9720,8 +9600,20 @@
           <a:p>
             <a:r>
               <a:rPr lang="en-US" dirty="0"/>
-              <a:t>In this case this architecture pattern was chosen as the view is the GUI and separate from the test engine</a:t>
-            </a:r>
+              <a:t>In this case this architecture pattern was chosen as the view is the GUI and separate from the test </a:t>
+            </a:r>
+            <a:r>
+              <a:rPr lang="en-US" dirty="0" smtClean="0"/>
+              <a:t>engine.</a:t>
+            </a:r>
+          </a:p>
+          <a:p>
+            <a:pPr lvl="1"/>
+            <a:r>
+              <a:rPr lang="en-US" dirty="0" smtClean="0"/>
+              <a:t>View changes as test data / test results are updated.</a:t>
+            </a:r>
+            <a:endParaRPr lang="en-US" dirty="0"/>
           </a:p>
           <a:p>
             <a:r>
@@ -9745,15 +9637,46 @@
             <a:pPr lvl="1"/>
             <a:r>
               <a:rPr lang="en-US" dirty="0"/>
-              <a:t>Deliver sufficient performance.</a:t>
+              <a:t>Deliver sufficient performance</a:t>
+            </a:r>
+            <a:r>
+              <a:rPr lang="en-US" dirty="0" smtClean="0"/>
+              <a:t>.</a:t>
             </a:r>
           </a:p>
           <a:p>
             <a:pPr lvl="1"/>
             <a:r>
-              <a:rPr lang="en-US" dirty="0"/>
-              <a:t>Allow for loose coupling to make modifications and maintenance of the system easier.</a:t>
-            </a:r>
+              <a:rPr lang="en-US" dirty="0" smtClean="0"/>
+              <a:t>Allows for some level of scalability on a single machine.</a:t>
+            </a:r>
+          </a:p>
+          <a:p>
+            <a:pPr lvl="2"/>
+            <a:r>
+              <a:rPr lang="en-US" dirty="0" smtClean="0"/>
+              <a:t>Increase the thread count.</a:t>
+            </a:r>
+          </a:p>
+          <a:p>
+            <a:pPr lvl="2"/>
+            <a:r>
+              <a:rPr lang="en-US" dirty="0" smtClean="0"/>
+              <a:t>Run multiple instantiations on multiple cores.</a:t>
+            </a:r>
+            <a:endParaRPr lang="en-US" dirty="0"/>
+          </a:p>
+          <a:p>
+            <a:pPr lvl="1"/>
+            <a:r>
+              <a:rPr lang="en-US" dirty="0"/>
+              <a:t>Allow for loose coupling to make modifications and maintenance of the system easier</a:t>
+            </a:r>
+            <a:r>
+              <a:rPr lang="en-US" dirty="0" smtClean="0"/>
+              <a:t>.  Easier maintainability.</a:t>
+            </a:r>
+            <a:endParaRPr lang="en-US" dirty="0"/>
           </a:p>
           <a:p>
             <a:pPr lvl="1"/>
@@ -9919,7 +9842,7 @@
           <a:graphicData uri="http://schemas.openxmlformats.org/presentationml/2006/ole">
             <mc:AlternateContent xmlns:mc="http://schemas.openxmlformats.org/markup-compatibility/2006">
               <mc:Choice xmlns:v="urn:schemas-microsoft-com:vml" Requires="v">
-                <p:oleObj spid="_x0000_s6169" name="Visio" r:id="rId3" imgW="5210104" imgH="3724541" progId="Visio.Drawing.15">
+                <p:oleObj spid="_x0000_s6171" name="Visio" r:id="rId3" imgW="5210104" imgH="3724541" progId="Visio.Drawing.15">
                   <p:embed/>
                 </p:oleObj>
               </mc:Choice>
@@ -10010,7 +9933,7 @@
         </p:nvGraphicFramePr>
         <p:xfrm>
           <a:off x="1604513" y="138024"/>
-          <a:ext cx="6409427" cy="6686110"/>
+          <a:ext cx="6409427" cy="6730352"/>
         </p:xfrm>
         <a:graphic>
           <a:graphicData uri="http://schemas.openxmlformats.org/drawingml/2006/table">
@@ -11240,7 +11163,7 @@
           <p:cNvPr id="6" name="Picture 5">
             <a:extLst>
               <a:ext uri="{FF2B5EF4-FFF2-40B4-BE49-F238E27FC236}">
-                <a16:creationId xmlns="" xmlns:a16="http://schemas.microsoft.com/office/drawing/2014/main" id="{42F62902-0B99-45F6-8313-405C7CFCB586}"/>
+                <a16:creationId xmlns:a16="http://schemas.microsoft.com/office/drawing/2014/main" xmlns="" id="{42F62902-0B99-45F6-8313-405C7CFCB586}"/>
               </a:ext>
             </a:extLst>
           </p:cNvPr>
@@ -11559,7 +11482,7 @@
           <a:graphicData uri="http://schemas.openxmlformats.org/presentationml/2006/ole">
             <mc:AlternateContent xmlns:mc="http://schemas.openxmlformats.org/markup-compatibility/2006">
               <mc:Choice xmlns:v="urn:schemas-microsoft-com:vml" Requires="v">
-                <p:oleObj spid="_x0000_s7187" name="Visio" r:id="rId3" imgW="5549798" imgH="3727121" progId="Visio.Drawing.15">
+                <p:oleObj spid="_x0000_s7189" name="Visio" r:id="rId3" imgW="5549798" imgH="3727121" progId="Visio.Drawing.15">
                   <p:embed/>
                 </p:oleObj>
               </mc:Choice>
@@ -11663,14 +11586,14 @@
                 <a:gridCol w="1534570">
                   <a:extLst>
                     <a:ext uri="{9D8B030D-6E8A-4147-A177-3AD203B41FA5}">
-                      <a16:colId xmlns="" xmlns:a16="http://schemas.microsoft.com/office/drawing/2014/main" val="20000"/>
+                      <a16:colId xmlns:a16="http://schemas.microsoft.com/office/drawing/2014/main" xmlns="" val="20000"/>
                     </a:ext>
                   </a:extLst>
                 </a:gridCol>
                 <a:gridCol w="7885379">
                   <a:extLst>
                     <a:ext uri="{9D8B030D-6E8A-4147-A177-3AD203B41FA5}">
-                      <a16:colId xmlns="" xmlns:a16="http://schemas.microsoft.com/office/drawing/2014/main" val="20001"/>
+                      <a16:colId xmlns:a16="http://schemas.microsoft.com/office/drawing/2014/main" xmlns="" val="20001"/>
                     </a:ext>
                   </a:extLst>
                 </a:gridCol>
@@ -11742,7 +11665,7 @@
                 </a:tc>
                 <a:extLst>
                   <a:ext uri="{0D108BD9-81ED-4DB2-BD59-A6C34878D82A}">
-                    <a16:rowId xmlns="" xmlns:a16="http://schemas.microsoft.com/office/drawing/2014/main" val="10000"/>
+                    <a16:rowId xmlns:a16="http://schemas.microsoft.com/office/drawing/2014/main" xmlns="" val="10000"/>
                   </a:ext>
                 </a:extLst>
               </a:tr>
@@ -11807,7 +11730,7 @@
                 </a:tc>
                 <a:extLst>
                   <a:ext uri="{0D108BD9-81ED-4DB2-BD59-A6C34878D82A}">
-                    <a16:rowId xmlns="" xmlns:a16="http://schemas.microsoft.com/office/drawing/2014/main" val="10001"/>
+                    <a16:rowId xmlns:a16="http://schemas.microsoft.com/office/drawing/2014/main" xmlns="" val="10001"/>
                   </a:ext>
                 </a:extLst>
               </a:tr>
@@ -11878,7 +11801,7 @@
                 </a:tc>
                 <a:extLst>
                   <a:ext uri="{0D108BD9-81ED-4DB2-BD59-A6C34878D82A}">
-                    <a16:rowId xmlns="" xmlns:a16="http://schemas.microsoft.com/office/drawing/2014/main" val="10002"/>
+                    <a16:rowId xmlns:a16="http://schemas.microsoft.com/office/drawing/2014/main" xmlns="" val="10002"/>
                   </a:ext>
                 </a:extLst>
               </a:tr>
@@ -11949,7 +11872,7 @@
                 </a:tc>
                 <a:extLst>
                   <a:ext uri="{0D108BD9-81ED-4DB2-BD59-A6C34878D82A}">
-                    <a16:rowId xmlns="" xmlns:a16="http://schemas.microsoft.com/office/drawing/2014/main" val="10003"/>
+                    <a16:rowId xmlns:a16="http://schemas.microsoft.com/office/drawing/2014/main" xmlns="" val="10003"/>
                   </a:ext>
                 </a:extLst>
               </a:tr>
@@ -12020,7 +11943,7 @@
                 </a:tc>
                 <a:extLst>
                   <a:ext uri="{0D108BD9-81ED-4DB2-BD59-A6C34878D82A}">
-                    <a16:rowId xmlns="" xmlns:a16="http://schemas.microsoft.com/office/drawing/2014/main" val="10004"/>
+                    <a16:rowId xmlns:a16="http://schemas.microsoft.com/office/drawing/2014/main" xmlns="" val="10004"/>
                   </a:ext>
                 </a:extLst>
               </a:tr>
@@ -12238,7 +12161,7 @@
                 </a:tc>
                 <a:extLst>
                   <a:ext uri="{0D108BD9-81ED-4DB2-BD59-A6C34878D82A}">
-                    <a16:rowId xmlns="" xmlns:a16="http://schemas.microsoft.com/office/drawing/2014/main" val="10005"/>
+                    <a16:rowId xmlns:a16="http://schemas.microsoft.com/office/drawing/2014/main" xmlns="" val="10005"/>
                   </a:ext>
                 </a:extLst>
               </a:tr>
@@ -12444,7 +12367,7 @@
                 </a:tc>
                 <a:extLst>
                   <a:ext uri="{0D108BD9-81ED-4DB2-BD59-A6C34878D82A}">
-                    <a16:rowId xmlns="" xmlns:a16="http://schemas.microsoft.com/office/drawing/2014/main" val="10006"/>
+                    <a16:rowId xmlns:a16="http://schemas.microsoft.com/office/drawing/2014/main" xmlns="" val="10006"/>
                   </a:ext>
                 </a:extLst>
               </a:tr>
@@ -12617,7 +12540,7 @@
                 </a:tc>
                 <a:extLst>
                   <a:ext uri="{0D108BD9-81ED-4DB2-BD59-A6C34878D82A}">
-                    <a16:rowId xmlns="" xmlns:a16="http://schemas.microsoft.com/office/drawing/2014/main" val="10007"/>
+                    <a16:rowId xmlns:a16="http://schemas.microsoft.com/office/drawing/2014/main" xmlns="" val="10007"/>
                   </a:ext>
                 </a:extLst>
               </a:tr>
@@ -12688,7 +12611,7 @@
                 </a:tc>
                 <a:extLst>
                   <a:ext uri="{0D108BD9-81ED-4DB2-BD59-A6C34878D82A}">
-                    <a16:rowId xmlns="" xmlns:a16="http://schemas.microsoft.com/office/drawing/2014/main" val="10008"/>
+                    <a16:rowId xmlns:a16="http://schemas.microsoft.com/office/drawing/2014/main" xmlns="" val="10008"/>
                   </a:ext>
                 </a:extLst>
               </a:tr>
@@ -12833,7 +12756,7 @@
           <a:graphicData uri="http://schemas.openxmlformats.org/presentationml/2006/ole">
             <mc:AlternateContent xmlns:mc="http://schemas.openxmlformats.org/markup-compatibility/2006">
               <mc:Choice xmlns:v="urn:schemas-microsoft-com:vml" Requires="v">
-                <p:oleObj spid="_x0000_s9235" name="Visio" r:id="rId3" imgW="6749898" imgH="5289535" progId="Visio.Drawing.15">
+                <p:oleObj spid="_x0000_s9237" name="Visio" r:id="rId3" imgW="6749898" imgH="5289535" progId="Visio.Drawing.15">
                   <p:embed/>
                 </p:oleObj>
               </mc:Choice>
@@ -13019,7 +12942,7 @@
           <a:graphicData uri="http://schemas.openxmlformats.org/presentationml/2006/ole">
             <mc:AlternateContent xmlns:mc="http://schemas.openxmlformats.org/markup-compatibility/2006">
               <mc:Choice xmlns:v="urn:schemas-microsoft-com:vml" Requires="v">
-                <p:oleObj spid="_x0000_s10260" name="Visio" r:id="rId3" imgW="6699098" imgH="5816391" progId="Visio.Drawing.15">
+                <p:oleObj spid="_x0000_s10262" name="Visio" r:id="rId3" imgW="6699098" imgH="5816391" progId="Visio.Drawing.15">
                   <p:embed/>
                 </p:oleObj>
               </mc:Choice>
@@ -13205,7 +13128,7 @@
           <a:graphicData uri="http://schemas.openxmlformats.org/presentationml/2006/ole">
             <mc:AlternateContent xmlns:mc="http://schemas.openxmlformats.org/markup-compatibility/2006">
               <mc:Choice xmlns:v="urn:schemas-microsoft-com:vml" Requires="v">
-                <p:oleObj spid="_x0000_s11285" name="Visio" r:id="rId3" imgW="5975299" imgH="4419376" progId="Visio.Drawing.15">
+                <p:oleObj spid="_x0000_s11287" name="Visio" r:id="rId3" imgW="5975299" imgH="4419376" progId="Visio.Drawing.15">
                   <p:embed/>
                 </p:oleObj>
               </mc:Choice>
@@ -13387,7 +13310,7 @@
           <a:graphicData uri="http://schemas.openxmlformats.org/presentationml/2006/ole">
             <mc:AlternateContent xmlns:mc="http://schemas.openxmlformats.org/markup-compatibility/2006">
               <mc:Choice xmlns:v="urn:schemas-microsoft-com:vml" Requires="v">
-                <p:oleObj spid="_x0000_s12307" name="Visio" r:id="rId3" imgW="5975299" imgH="5860766" progId="Visio.Drawing.15">
+                <p:oleObj spid="_x0000_s12309" name="Visio" r:id="rId3" imgW="5975299" imgH="5860766" progId="Visio.Drawing.15">
                   <p:embed/>
                 </p:oleObj>
               </mc:Choice>
@@ -13565,7 +13488,7 @@
           <p:nvPr>
             <p:extLst>
               <p:ext uri="{D42A27DB-BD31-4B8C-83A1-F6EECF244321}">
-                <p14:modId xmlns:p14="http://schemas.microsoft.com/office/powerpoint/2010/main" val="3215720085"/>
+                <p14:modId xmlns:p14="http://schemas.microsoft.com/office/powerpoint/2010/main" val="2017291953"/>
               </p:ext>
             </p:extLst>
           </p:nvPr>
@@ -13578,12 +13501,12 @@
           <a:graphicData uri="http://schemas.openxmlformats.org/presentationml/2006/ole">
             <mc:AlternateContent xmlns:mc="http://schemas.openxmlformats.org/markup-compatibility/2006">
               <mc:Choice xmlns:v="urn:schemas-microsoft-com:vml" Requires="v">
-                <p:oleObj spid="_x0000_s13333" name="Visio" r:id="rId3" imgW="6718198" imgH="5562645" progId="Visio.Drawing.15">
+                <p:oleObj spid="_x0000_s13335" name="Visio" r:id="rId3" imgW="6713397" imgH="5554980" progId="Visio.Drawing.15">
                   <p:embed/>
                 </p:oleObj>
               </mc:Choice>
               <mc:Fallback>
-                <p:oleObj name="Visio" r:id="rId3" imgW="6718198" imgH="5562645" progId="Visio.Drawing.15">
+                <p:oleObj name="Visio" r:id="rId3" imgW="6713397" imgH="5554980" progId="Visio.Drawing.15">
                   <p:embed/>
                   <p:pic>
                     <p:nvPicPr>
@@ -13594,13 +13517,7 @@
                       <p:nvPr/>
                     </p:nvPicPr>
                     <p:blipFill>
-                      <a:blip r:embed="rId4">
-                        <a:extLst>
-                          <a:ext uri="{28A0092B-C50C-407E-A947-70E740481C1C}">
-                            <a14:useLocalDpi xmlns:a14="http://schemas.microsoft.com/office/drawing/2010/main" val="0"/>
-                          </a:ext>
-                        </a:extLst>
-                      </a:blip>
+                      <a:blip r:embed="rId4"/>
                       <a:srcRect/>
                       <a:stretch>
                         <a:fillRect/>
@@ -13760,7 +13677,7 @@
           <a:graphicData uri="http://schemas.openxmlformats.org/presentationml/2006/ole">
             <mc:AlternateContent xmlns:mc="http://schemas.openxmlformats.org/markup-compatibility/2006">
               <mc:Choice xmlns:v="urn:schemas-microsoft-com:vml" Requires="v">
-                <p:oleObj spid="_x0000_s14357" name="Visio" r:id="rId3" imgW="8984086" imgH="5235129" progId="Visio.Drawing.15">
+                <p:oleObj spid="_x0000_s14359" name="Visio" r:id="rId3" imgW="8984086" imgH="5235129" progId="Visio.Drawing.15">
                   <p:embed/>
                 </p:oleObj>
               </mc:Choice>
@@ -14132,7 +14049,7 @@
           <a:graphicData uri="http://schemas.openxmlformats.org/presentationml/2006/ole">
             <mc:AlternateContent xmlns:mc="http://schemas.openxmlformats.org/markup-compatibility/2006">
               <mc:Choice xmlns:v="urn:schemas-microsoft-com:vml" Requires="v">
-                <p:oleObj spid="_x0000_s15378" name="Visio" r:id="rId3" imgW="4667213" imgH="5038832" progId="Visio.Drawing.15">
+                <p:oleObj spid="_x0000_s15380" name="Visio" r:id="rId3" imgW="4667213" imgH="5038832" progId="Visio.Drawing.15">
                   <p:embed/>
                 </p:oleObj>
               </mc:Choice>
@@ -14232,7 +14149,7 @@
         </p:nvGraphicFramePr>
         <p:xfrm>
           <a:off x="1325592" y="33867"/>
-          <a:ext cx="6478438" cy="6643746"/>
+          <a:ext cx="6478438" cy="6702876"/>
         </p:xfrm>
         <a:graphic>
           <a:graphicData uri="http://schemas.openxmlformats.org/drawingml/2006/table">
@@ -15562,7 +15479,7 @@
           <a:graphicData uri="http://schemas.openxmlformats.org/presentationml/2006/ole">
             <mc:AlternateContent xmlns:mc="http://schemas.openxmlformats.org/markup-compatibility/2006">
               <mc:Choice xmlns:v="urn:schemas-microsoft-com:vml" Requires="v">
-                <p:oleObj spid="_x0000_s16404" name="Visio" r:id="rId3" imgW="6172290" imgH="5562533" progId="Visio.Drawing.15">
+                <p:oleObj spid="_x0000_s16406" name="Visio" r:id="rId3" imgW="6172290" imgH="5562533" progId="Visio.Drawing.15">
                   <p:embed/>
                 </p:oleObj>
               </mc:Choice>
@@ -15811,7 +15728,7 @@
           <a:graphicData uri="http://schemas.openxmlformats.org/presentationml/2006/ole">
             <mc:AlternateContent xmlns:mc="http://schemas.openxmlformats.org/markup-compatibility/2006">
               <mc:Choice xmlns:v="urn:schemas-microsoft-com:vml" Requires="v">
-                <p:oleObj spid="_x0000_s18452" name="Visio" r:id="rId3" imgW="6172290" imgH="5562533" progId="Visio.Drawing.15">
+                <p:oleObj spid="_x0000_s18454" name="Visio" r:id="rId3" imgW="6172290" imgH="5562533" progId="Visio.Drawing.15">
                   <p:embed/>
                 </p:oleObj>
               </mc:Choice>
@@ -15993,7 +15910,7 @@
           <a:graphicData uri="http://schemas.openxmlformats.org/presentationml/2006/ole">
             <mc:AlternateContent xmlns:mc="http://schemas.openxmlformats.org/markup-compatibility/2006">
               <mc:Choice xmlns:v="urn:schemas-microsoft-com:vml" Requires="v">
-                <p:oleObj spid="_x0000_s20498" name="Visio" r:id="rId3" imgW="6735938" imgH="5280519" progId="Visio.Drawing.15">
+                <p:oleObj spid="_x0000_s20500" name="Visio" r:id="rId3" imgW="6735938" imgH="5280519" progId="Visio.Drawing.15">
                   <p:embed/>
                 </p:oleObj>
               </mc:Choice>
@@ -16239,7 +16156,7 @@
           <a:graphicData uri="http://schemas.openxmlformats.org/presentationml/2006/ole">
             <mc:AlternateContent xmlns:mc="http://schemas.openxmlformats.org/markup-compatibility/2006">
               <mc:Choice xmlns:v="urn:schemas-microsoft-com:vml" Requires="v">
-                <p:oleObj spid="_x0000_s21526" name="Visio" r:id="rId3" imgW="6086419" imgH="4419813" progId="Visio.Drawing.15">
+                <p:oleObj spid="_x0000_s21528" name="Visio" r:id="rId3" imgW="6086419" imgH="4419813" progId="Visio.Drawing.15">
                   <p:embed/>
                 </p:oleObj>
               </mc:Choice>
@@ -16471,7 +16388,7 @@
           <p:nvPr>
             <p:extLst>
               <p:ext uri="{D42A27DB-BD31-4B8C-83A1-F6EECF244321}">
-                <p14:modId xmlns:p14="http://schemas.microsoft.com/office/powerpoint/2010/main" val="3839018449"/>
+                <p14:modId xmlns:p14="http://schemas.microsoft.com/office/powerpoint/2010/main" val="3816104527"/>
               </p:ext>
             </p:extLst>
           </p:nvPr>
@@ -16484,12 +16401,12 @@
           <a:graphicData uri="http://schemas.openxmlformats.org/presentationml/2006/ole">
             <mc:AlternateContent xmlns:mc="http://schemas.openxmlformats.org/markup-compatibility/2006">
               <mc:Choice xmlns:v="urn:schemas-microsoft-com:vml" Requires="v">
-                <p:oleObj spid="_x0000_s22550" name="Visio" r:id="rId3" imgW="6715181" imgH="5562533" progId="Visio.Drawing.15">
+                <p:oleObj spid="_x0000_s22552" name="Visio" r:id="rId3" imgW="6713397" imgH="5554980" progId="Visio.Drawing.15">
                   <p:embed/>
                 </p:oleObj>
               </mc:Choice>
               <mc:Fallback>
-                <p:oleObj name="Visio" r:id="rId3" imgW="6715181" imgH="5562533" progId="Visio.Drawing.15">
+                <p:oleObj name="Visio" r:id="rId3" imgW="6713397" imgH="5554980" progId="Visio.Drawing.15">
                   <p:embed/>
                   <p:pic>
                     <p:nvPicPr>
@@ -16500,13 +16417,7 @@
                       <p:nvPr/>
                     </p:nvPicPr>
                     <p:blipFill>
-                      <a:blip r:embed="rId4">
-                        <a:extLst>
-                          <a:ext uri="{28A0092B-C50C-407E-A947-70E740481C1C}">
-                            <a14:useLocalDpi xmlns:a14="http://schemas.microsoft.com/office/drawing/2010/main" val="0"/>
-                          </a:ext>
-                        </a:extLst>
-                      </a:blip>
+                      <a:blip r:embed="rId4"/>
                       <a:srcRect/>
                       <a:stretch>
                         <a:fillRect/>
@@ -16729,7 +16640,7 @@
           <a:graphicData uri="http://schemas.openxmlformats.org/presentationml/2006/ole">
             <mc:AlternateContent xmlns:mc="http://schemas.openxmlformats.org/markup-compatibility/2006">
               <mc:Choice xmlns:v="urn:schemas-microsoft-com:vml" Requires="v">
-                <p:oleObj spid="_x0000_s23572" name="Visio" r:id="rId3" imgW="6696139" imgH="5819708" progId="Visio.Drawing.15">
+                <p:oleObj spid="_x0000_s23574" name="Visio" r:id="rId3" imgW="6696139" imgH="5819708" progId="Visio.Drawing.15">
                   <p:embed/>
                 </p:oleObj>
               </mc:Choice>
@@ -16911,7 +16822,7 @@
           <a:graphicData uri="http://schemas.openxmlformats.org/presentationml/2006/ole">
             <mc:AlternateContent xmlns:mc="http://schemas.openxmlformats.org/markup-compatibility/2006">
               <mc:Choice xmlns:v="urn:schemas-microsoft-com:vml" Requires="v">
-                <p:oleObj spid="_x0000_s24594" name="Visio" r:id="rId3" imgW="8984086" imgH="5943553" progId="Visio.Drawing.15">
+                <p:oleObj spid="_x0000_s24596" name="Visio" r:id="rId3" imgW="8984086" imgH="5943553" progId="Visio.Drawing.15">
                   <p:embed/>
                 </p:oleObj>
               </mc:Choice>
@@ -19582,7 +19493,7 @@
           <a:graphicData uri="http://schemas.openxmlformats.org/presentationml/2006/ole">
             <mc:AlternateContent xmlns:mc="http://schemas.openxmlformats.org/markup-compatibility/2006">
               <mc:Choice xmlns:v="urn:schemas-microsoft-com:vml" Requires="v">
-                <p:oleObj spid="_x0000_s17426" name="Visio" r:id="rId3" imgW="6393145" imgH="5554980" progId="Visio.Drawing.15">
+                <p:oleObj spid="_x0000_s17428" name="Visio" r:id="rId3" imgW="6393145" imgH="5554980" progId="Visio.Drawing.15">
                   <p:embed/>
                 </p:oleObj>
               </mc:Choice>
@@ -19778,7 +19689,7 @@
           <a:graphicData uri="http://schemas.openxmlformats.org/presentationml/2006/ole">
             <mc:AlternateContent xmlns:mc="http://schemas.openxmlformats.org/markup-compatibility/2006">
               <mc:Choice xmlns:v="urn:schemas-microsoft-com:vml" Requires="v">
-                <p:oleObj spid="_x0000_s19474" name="Visio" r:id="rId3" imgW="6164757" imgH="5554980" progId="Visio.Drawing.15">
+                <p:oleObj spid="_x0000_s19476" name="Visio" r:id="rId3" imgW="6164757" imgH="5554980" progId="Visio.Drawing.15">
                   <p:embed/>
                 </p:oleObj>
               </mc:Choice>

</xml_diff>